<commit_message>
* Updated Final Presentation/Slides.pptx
</commit_message>
<xml_diff>
--- a/doc/Final Presentation/Slides.pptx
+++ b/doc/Final Presentation/Slides.pptx
@@ -2,23 +2,12 @@
 <file path=ppt/presentation.xml><?xml version="1.0" encoding="utf-8"?>
 <p:presentation xmlns:a="http://schemas.openxmlformats.org/drawingml/2006/main" xmlns:r="http://schemas.openxmlformats.org/officeDocument/2006/relationships" xmlns:p="http://schemas.openxmlformats.org/presentationml/2006/main" saveSubsetFonts="1">
   <p:sldMasterIdLst>
-    <p:sldMasterId id="2147483756" r:id="rId1"/>
+    <p:sldMasterId id="2147483648" r:id="rId1"/>
   </p:sldMasterIdLst>
-  <p:notesMasterIdLst>
-    <p:notesMasterId r:id="rId13"/>
-  </p:notesMasterIdLst>
   <p:sldIdLst>
     <p:sldId id="256" r:id="rId2"/>
-    <p:sldId id="261" r:id="rId3"/>
+    <p:sldId id="257" r:id="rId3"/>
     <p:sldId id="258" r:id="rId4"/>
-    <p:sldId id="268" r:id="rId5"/>
-    <p:sldId id="257" r:id="rId6"/>
-    <p:sldId id="262" r:id="rId7"/>
-    <p:sldId id="266" r:id="rId8"/>
-    <p:sldId id="263" r:id="rId9"/>
-    <p:sldId id="267" r:id="rId10"/>
-    <p:sldId id="264" r:id="rId11"/>
-    <p:sldId id="265" r:id="rId12"/>
   </p:sldIdLst>
   <p:sldSz cx="9144000" cy="6858000" type="screen4x3"/>
   <p:notesSz cx="6858000" cy="9144000"/>
@@ -120,996 +109,6 @@
 </p:presentation>
 </file>
 
-<file path=ppt/charts/chart1.xml><?xml version="1.0" encoding="utf-8"?>
-<c:chartSpace xmlns:c="http://schemas.openxmlformats.org/drawingml/2006/chart" xmlns:a="http://schemas.openxmlformats.org/drawingml/2006/main" xmlns:r="http://schemas.openxmlformats.org/officeDocument/2006/relationships">
-  <c:date1904 val="0"/>
-  <c:lang val="en-GB"/>
-  <c:roundedCorners val="0"/>
-  <mc:AlternateContent xmlns:mc="http://schemas.openxmlformats.org/markup-compatibility/2006">
-    <mc:Choice xmlns:c14="http://schemas.microsoft.com/office/drawing/2007/8/2/chart" Requires="c14">
-      <c14:style val="102"/>
-    </mc:Choice>
-    <mc:Fallback>
-      <c:style val="2"/>
-    </mc:Fallback>
-  </mc:AlternateContent>
-  <c:chart>
-    <c:title>
-      <c:tx>
-        <c:rich>
-          <a:bodyPr/>
-          <a:lstStyle/>
-          <a:p>
-            <a:pPr>
-              <a:defRPr sz="2500" baseline="0"/>
-            </a:pPr>
-            <a:r>
-              <a:rPr lang="en-GB" altLang="zh-TW" sz="2500" b="1" i="0" baseline="0"/>
-              <a:t>Actual time spent distribution till 3rd March 2012</a:t>
-            </a:r>
-            <a:endParaRPr lang="zh-TW" altLang="zh-TW" sz="2500" b="1" i="0" baseline="0"/>
-          </a:p>
-        </c:rich>
-      </c:tx>
-      <c:layout/>
-      <c:overlay val="0"/>
-    </c:title>
-    <c:autoTitleDeleted val="0"/>
-    <c:plotArea>
-      <c:layout/>
-      <c:pieChart>
-        <c:varyColors val="1"/>
-        <c:ser>
-          <c:idx val="0"/>
-          <c:order val="0"/>
-          <c:dLbls>
-            <c:txPr>
-              <a:bodyPr/>
-              <a:lstStyle/>
-              <a:p>
-                <a:pPr>
-                  <a:defRPr sz="2000" baseline="0"/>
-                </a:pPr>
-                <a:endParaRPr lang="en-US"/>
-              </a:p>
-            </c:txPr>
-            <c:showLegendKey val="0"/>
-            <c:showVal val="1"/>
-            <c:showCatName val="0"/>
-            <c:showSerName val="0"/>
-            <c:showPercent val="0"/>
-            <c:showBubbleSize val="0"/>
-            <c:showLeaderLines val="1"/>
-          </c:dLbls>
-          <c:cat>
-            <c:strRef>
-              <c:f>Sheet1!$A$3:$E$3</c:f>
-              <c:strCache>
-                <c:ptCount val="5"/>
-                <c:pt idx="0">
-                  <c:v>Edward</c:v>
-                </c:pt>
-                <c:pt idx="1">
-                  <c:v>Kristian</c:v>
-                </c:pt>
-                <c:pt idx="2">
-                  <c:v>Brian</c:v>
-                </c:pt>
-                <c:pt idx="3">
-                  <c:v>Oscar</c:v>
-                </c:pt>
-                <c:pt idx="4">
-                  <c:v>Kelvin</c:v>
-                </c:pt>
-              </c:strCache>
-            </c:strRef>
-          </c:cat>
-          <c:val>
-            <c:numRef>
-              <c:f>Sheet1!$A$4:$E$4</c:f>
-              <c:numCache>
-                <c:formatCode>General</c:formatCode>
-                <c:ptCount val="5"/>
-                <c:pt idx="0">
-                  <c:v>12.5</c:v>
-                </c:pt>
-                <c:pt idx="1">
-                  <c:v>15</c:v>
-                </c:pt>
-                <c:pt idx="2">
-                  <c:v>8</c:v>
-                </c:pt>
-                <c:pt idx="3">
-                  <c:v>14.75</c:v>
-                </c:pt>
-                <c:pt idx="4">
-                  <c:v>12</c:v>
-                </c:pt>
-              </c:numCache>
-            </c:numRef>
-          </c:val>
-        </c:ser>
-        <c:dLbls>
-          <c:showLegendKey val="0"/>
-          <c:showVal val="0"/>
-          <c:showCatName val="0"/>
-          <c:showSerName val="0"/>
-          <c:showPercent val="0"/>
-          <c:showBubbleSize val="0"/>
-          <c:showLeaderLines val="1"/>
-        </c:dLbls>
-        <c:firstSliceAng val="0"/>
-      </c:pieChart>
-    </c:plotArea>
-    <c:legend>
-      <c:legendPos val="r"/>
-      <c:layout>
-        <c:manualLayout>
-          <c:xMode val="edge"/>
-          <c:yMode val="edge"/>
-          <c:x val="0.72001361885616322"/>
-          <c:y val="0.27082634831936353"/>
-          <c:w val="0.18445160964315752"/>
-          <c:h val="0.54069511472356313"/>
-        </c:manualLayout>
-      </c:layout>
-      <c:overlay val="0"/>
-      <c:txPr>
-        <a:bodyPr/>
-        <a:lstStyle/>
-        <a:p>
-          <a:pPr>
-            <a:defRPr sz="2000" baseline="0"/>
-          </a:pPr>
-          <a:endParaRPr lang="en-US"/>
-        </a:p>
-      </c:txPr>
-    </c:legend>
-    <c:plotVisOnly val="1"/>
-    <c:dispBlanksAs val="zero"/>
-    <c:showDLblsOverMax val="0"/>
-  </c:chart>
-  <c:externalData r:id="rId1">
-    <c:autoUpdate val="0"/>
-  </c:externalData>
-</c:chartSpace>
-</file>
-
-<file path=ppt/charts/chart2.xml><?xml version="1.0" encoding="utf-8"?>
-<c:chartSpace xmlns:c="http://schemas.openxmlformats.org/drawingml/2006/chart" xmlns:a="http://schemas.openxmlformats.org/drawingml/2006/main" xmlns:r="http://schemas.openxmlformats.org/officeDocument/2006/relationships">
-  <c:date1904 val="0"/>
-  <c:lang val="en-GB"/>
-  <c:roundedCorners val="0"/>
-  <mc:AlternateContent xmlns:mc="http://schemas.openxmlformats.org/markup-compatibility/2006">
-    <mc:Choice xmlns:c14="http://schemas.microsoft.com/office/drawing/2007/8/2/chart" Requires="c14">
-      <c14:style val="102"/>
-    </mc:Choice>
-    <mc:Fallback>
-      <c:style val="2"/>
-    </mc:Fallback>
-  </mc:AlternateContent>
-  <c:chart>
-    <c:title>
-      <c:tx>
-        <c:rich>
-          <a:bodyPr/>
-          <a:lstStyle/>
-          <a:p>
-            <a:pPr>
-              <a:defRPr sz="2500" baseline="0"/>
-            </a:pPr>
-            <a:r>
-              <a:rPr lang="en-GB" altLang="zh-TW" sz="2500" baseline="0"/>
-              <a:t>Actual time spent and expected time spent till 3 March</a:t>
-            </a:r>
-            <a:endParaRPr lang="zh-TW" altLang="en-US" sz="2500" baseline="0"/>
-          </a:p>
-        </c:rich>
-      </c:tx>
-      <c:layout/>
-      <c:overlay val="0"/>
-    </c:title>
-    <c:autoTitleDeleted val="0"/>
-    <c:plotArea>
-      <c:layout>
-        <c:manualLayout>
-          <c:layoutTarget val="inner"/>
-          <c:xMode val="edge"/>
-          <c:yMode val="edge"/>
-          <c:x val="6.7119203849518833E-2"/>
-          <c:y val="0.16030545094906617"/>
-          <c:w val="0.65812773403324598"/>
-          <c:h val="0.70810015595876608"/>
-        </c:manualLayout>
-      </c:layout>
-      <c:lineChart>
-        <c:grouping val="standard"/>
-        <c:varyColors val="0"/>
-        <c:ser>
-          <c:idx val="0"/>
-          <c:order val="0"/>
-          <c:tx>
-            <c:strRef>
-              <c:f>Sheet1!$H$3</c:f>
-              <c:strCache>
-                <c:ptCount val="1"/>
-                <c:pt idx="0">
-                  <c:v>Actual time spent  (Weekly / Total)</c:v>
-                </c:pt>
-              </c:strCache>
-            </c:strRef>
-          </c:tx>
-          <c:marker>
-            <c:symbol val="none"/>
-          </c:marker>
-          <c:dLbls>
-            <c:dLbl>
-              <c:idx val="0"/>
-              <c:layout>
-                <c:manualLayout>
-                  <c:x val="1.3888888888888894E-3"/>
-                  <c:y val="4.1095890410958895E-2"/>
-                </c:manualLayout>
-              </c:layout>
-              <c:showLegendKey val="0"/>
-              <c:showVal val="1"/>
-              <c:showCatName val="0"/>
-              <c:showSerName val="0"/>
-              <c:showPercent val="0"/>
-              <c:showBubbleSize val="0"/>
-            </c:dLbl>
-            <c:dLbl>
-              <c:idx val="1"/>
-              <c:layout>
-                <c:manualLayout>
-                  <c:x val="5.5555555555555558E-3"/>
-                  <c:y val="1.5981735159817354E-2"/>
-                </c:manualLayout>
-              </c:layout>
-              <c:showLegendKey val="0"/>
-              <c:showVal val="1"/>
-              <c:showCatName val="0"/>
-              <c:showSerName val="0"/>
-              <c:showPercent val="0"/>
-              <c:showBubbleSize val="0"/>
-            </c:dLbl>
-            <c:dLbl>
-              <c:idx val="2"/>
-              <c:layout>
-                <c:manualLayout>
-                  <c:x val="-1.8055555555555557E-2"/>
-                  <c:y val="-5.2511415525114152E-2"/>
-                </c:manualLayout>
-              </c:layout>
-              <c:showLegendKey val="0"/>
-              <c:showVal val="1"/>
-              <c:showCatName val="0"/>
-              <c:showSerName val="0"/>
-              <c:showPercent val="0"/>
-              <c:showBubbleSize val="0"/>
-            </c:dLbl>
-            <c:txPr>
-              <a:bodyPr/>
-              <a:lstStyle/>
-              <a:p>
-                <a:pPr>
-                  <a:defRPr sz="1500" baseline="0"/>
-                </a:pPr>
-                <a:endParaRPr lang="en-US"/>
-              </a:p>
-            </c:txPr>
-            <c:showLegendKey val="0"/>
-            <c:showVal val="1"/>
-            <c:showCatName val="0"/>
-            <c:showSerName val="0"/>
-            <c:showPercent val="0"/>
-            <c:showBubbleSize val="0"/>
-            <c:showLeaderLines val="0"/>
-          </c:dLbls>
-          <c:cat>
-            <c:numRef>
-              <c:f>Sheet1!$I$2:$L$2</c:f>
-              <c:numCache>
-                <c:formatCode>d\-mmm</c:formatCode>
-                <c:ptCount val="4"/>
-                <c:pt idx="0">
-                  <c:v>40949</c:v>
-                </c:pt>
-                <c:pt idx="1">
-                  <c:v>40955</c:v>
-                </c:pt>
-                <c:pt idx="2">
-                  <c:v>40962</c:v>
-                </c:pt>
-                <c:pt idx="3">
-                  <c:v>40971</c:v>
-                </c:pt>
-              </c:numCache>
-            </c:numRef>
-          </c:cat>
-          <c:val>
-            <c:numRef>
-              <c:f>Sheet1!$I$3:$L$3</c:f>
-              <c:numCache>
-                <c:formatCode>General</c:formatCode>
-                <c:ptCount val="4"/>
-                <c:pt idx="0">
-                  <c:v>18.5</c:v>
-                </c:pt>
-                <c:pt idx="1">
-                  <c:v>25</c:v>
-                </c:pt>
-                <c:pt idx="2">
-                  <c:v>44.75</c:v>
-                </c:pt>
-                <c:pt idx="3">
-                  <c:v>62.25</c:v>
-                </c:pt>
-              </c:numCache>
-            </c:numRef>
-          </c:val>
-          <c:smooth val="0"/>
-        </c:ser>
-        <c:ser>
-          <c:idx val="1"/>
-          <c:order val="1"/>
-          <c:tx>
-            <c:strRef>
-              <c:f>Sheet1!$H$4</c:f>
-              <c:strCache>
-                <c:ptCount val="1"/>
-                <c:pt idx="0">
-                  <c:v>Expected time spent (Weekly / Total)</c:v>
-                </c:pt>
-              </c:strCache>
-            </c:strRef>
-          </c:tx>
-          <c:marker>
-            <c:symbol val="none"/>
-          </c:marker>
-          <c:dLbls>
-            <c:dLbl>
-              <c:idx val="0"/>
-              <c:layout>
-                <c:manualLayout>
-                  <c:x val="1.3888888888888889E-3"/>
-                  <c:y val="-2.7397260273972601E-2"/>
-                </c:manualLayout>
-              </c:layout>
-              <c:showLegendKey val="0"/>
-              <c:showVal val="1"/>
-              <c:showCatName val="0"/>
-              <c:showSerName val="0"/>
-              <c:showPercent val="0"/>
-              <c:showBubbleSize val="0"/>
-            </c:dLbl>
-            <c:dLbl>
-              <c:idx val="1"/>
-              <c:layout>
-                <c:manualLayout>
-                  <c:x val="-1.3888888888888894E-3"/>
-                  <c:y val="-6.3926940639269486E-2"/>
-                </c:manualLayout>
-              </c:layout>
-              <c:showLegendKey val="0"/>
-              <c:showVal val="1"/>
-              <c:showCatName val="0"/>
-              <c:showSerName val="0"/>
-              <c:showPercent val="0"/>
-              <c:showBubbleSize val="0"/>
-            </c:dLbl>
-            <c:txPr>
-              <a:bodyPr/>
-              <a:lstStyle/>
-              <a:p>
-                <a:pPr>
-                  <a:defRPr sz="1500" baseline="0"/>
-                </a:pPr>
-                <a:endParaRPr lang="en-US"/>
-              </a:p>
-            </c:txPr>
-            <c:showLegendKey val="0"/>
-            <c:showVal val="1"/>
-            <c:showCatName val="0"/>
-            <c:showSerName val="0"/>
-            <c:showPercent val="0"/>
-            <c:showBubbleSize val="0"/>
-            <c:showLeaderLines val="0"/>
-          </c:dLbls>
-          <c:cat>
-            <c:numRef>
-              <c:f>Sheet1!$I$2:$L$2</c:f>
-              <c:numCache>
-                <c:formatCode>d\-mmm</c:formatCode>
-                <c:ptCount val="4"/>
-                <c:pt idx="0">
-                  <c:v>40949</c:v>
-                </c:pt>
-                <c:pt idx="1">
-                  <c:v>40955</c:v>
-                </c:pt>
-                <c:pt idx="2">
-                  <c:v>40962</c:v>
-                </c:pt>
-                <c:pt idx="3">
-                  <c:v>40971</c:v>
-                </c:pt>
-              </c:numCache>
-            </c:numRef>
-          </c:cat>
-          <c:val>
-            <c:numRef>
-              <c:f>Sheet1!$I$4:$L$4</c:f>
-              <c:numCache>
-                <c:formatCode>General</c:formatCode>
-                <c:ptCount val="4"/>
-                <c:pt idx="0">
-                  <c:v>24</c:v>
-                </c:pt>
-                <c:pt idx="1">
-                  <c:v>27.5</c:v>
-                </c:pt>
-                <c:pt idx="2">
-                  <c:v>42</c:v>
-                </c:pt>
-                <c:pt idx="3">
-                  <c:v>78</c:v>
-                </c:pt>
-              </c:numCache>
-            </c:numRef>
-          </c:val>
-          <c:smooth val="0"/>
-        </c:ser>
-        <c:dLbls>
-          <c:showLegendKey val="0"/>
-          <c:showVal val="0"/>
-          <c:showCatName val="0"/>
-          <c:showSerName val="0"/>
-          <c:showPercent val="0"/>
-          <c:showBubbleSize val="0"/>
-        </c:dLbls>
-        <c:marker val="1"/>
-        <c:smooth val="0"/>
-        <c:axId val="83694336"/>
-        <c:axId val="83695872"/>
-      </c:lineChart>
-      <c:dateAx>
-        <c:axId val="83694336"/>
-        <c:scaling>
-          <c:orientation val="minMax"/>
-        </c:scaling>
-        <c:delete val="0"/>
-        <c:axPos val="b"/>
-        <c:numFmt formatCode="d\-mmm" sourceLinked="1"/>
-        <c:majorTickMark val="out"/>
-        <c:minorTickMark val="none"/>
-        <c:tickLblPos val="nextTo"/>
-        <c:txPr>
-          <a:bodyPr/>
-          <a:lstStyle/>
-          <a:p>
-            <a:pPr>
-              <a:defRPr sz="1500" baseline="0"/>
-            </a:pPr>
-            <a:endParaRPr lang="en-US"/>
-          </a:p>
-        </c:txPr>
-        <c:crossAx val="83695872"/>
-        <c:crosses val="autoZero"/>
-        <c:auto val="1"/>
-        <c:lblOffset val="100"/>
-        <c:baseTimeUnit val="days"/>
-      </c:dateAx>
-      <c:valAx>
-        <c:axId val="83695872"/>
-        <c:scaling>
-          <c:orientation val="minMax"/>
-        </c:scaling>
-        <c:delete val="0"/>
-        <c:axPos val="l"/>
-        <c:majorGridlines/>
-        <c:numFmt formatCode="General" sourceLinked="1"/>
-        <c:majorTickMark val="out"/>
-        <c:minorTickMark val="none"/>
-        <c:tickLblPos val="nextTo"/>
-        <c:txPr>
-          <a:bodyPr/>
-          <a:lstStyle/>
-          <a:p>
-            <a:pPr>
-              <a:defRPr sz="2000" baseline="0"/>
-            </a:pPr>
-            <a:endParaRPr lang="en-US"/>
-          </a:p>
-        </c:txPr>
-        <c:crossAx val="83694336"/>
-        <c:crosses val="autoZero"/>
-        <c:crossBetween val="between"/>
-      </c:valAx>
-    </c:plotArea>
-    <c:legend>
-      <c:legendPos val="r"/>
-      <c:layout>
-        <c:manualLayout>
-          <c:xMode val="edge"/>
-          <c:yMode val="edge"/>
-          <c:x val="0.74414523184601922"/>
-          <c:y val="0.38238557509078497"/>
-          <c:w val="0.2542902449693788"/>
-          <c:h val="0.40572825657066841"/>
-        </c:manualLayout>
-      </c:layout>
-      <c:overlay val="0"/>
-      <c:txPr>
-        <a:bodyPr/>
-        <a:lstStyle/>
-        <a:p>
-          <a:pPr>
-            <a:defRPr sz="1800" baseline="0"/>
-          </a:pPr>
-          <a:endParaRPr lang="en-US"/>
-        </a:p>
-      </c:txPr>
-    </c:legend>
-    <c:plotVisOnly val="1"/>
-    <c:dispBlanksAs val="gap"/>
-    <c:showDLblsOverMax val="0"/>
-  </c:chart>
-  <c:externalData r:id="rId1">
-    <c:autoUpdate val="0"/>
-  </c:externalData>
-</c:chartSpace>
-</file>
-
-<file path=ppt/notesMasters/notesMaster1.xml><?xml version="1.0" encoding="utf-8"?>
-<p:notesMaster xmlns:a="http://schemas.openxmlformats.org/drawingml/2006/main" xmlns:r="http://schemas.openxmlformats.org/officeDocument/2006/relationships" xmlns:p="http://schemas.openxmlformats.org/presentationml/2006/main">
-  <p:cSld>
-    <p:bg>
-      <p:bgRef idx="1001">
-        <a:schemeClr val="bg1"/>
-      </p:bgRef>
-    </p:bg>
-    <p:spTree>
-      <p:nvGrpSpPr>
-        <p:cNvPr id="1" name=""/>
-        <p:cNvGrpSpPr/>
-        <p:nvPr/>
-      </p:nvGrpSpPr>
-      <p:grpSpPr>
-        <a:xfrm>
-          <a:off x="0" y="0"/>
-          <a:ext cx="0" cy="0"/>
-          <a:chOff x="0" y="0"/>
-          <a:chExt cx="0" cy="0"/>
-        </a:xfrm>
-      </p:grpSpPr>
-      <p:sp>
-        <p:nvSpPr>
-          <p:cNvPr id="2" name="Header Placeholder 1"/>
-          <p:cNvSpPr>
-            <a:spLocks noGrp="1"/>
-          </p:cNvSpPr>
-          <p:nvPr>
-            <p:ph type="hdr" sz="quarter"/>
-          </p:nvPr>
-        </p:nvSpPr>
-        <p:spPr>
-          <a:xfrm>
-            <a:off x="0" y="0"/>
-            <a:ext cx="2971800" cy="457200"/>
-          </a:xfrm>
-          <a:prstGeom prst="rect">
-            <a:avLst/>
-          </a:prstGeom>
-        </p:spPr>
-        <p:txBody>
-          <a:bodyPr vert="horz" lIns="91440" tIns="45720" rIns="91440" bIns="45720" rtlCol="0"/>
-          <a:lstStyle>
-            <a:lvl1pPr algn="l">
-              <a:defRPr sz="1200"/>
-            </a:lvl1pPr>
-          </a:lstStyle>
-          <a:p>
-            <a:endParaRPr lang="en-US"/>
-          </a:p>
-        </p:txBody>
-      </p:sp>
-      <p:sp>
-        <p:nvSpPr>
-          <p:cNvPr id="3" name="Date Placeholder 2"/>
-          <p:cNvSpPr>
-            <a:spLocks noGrp="1"/>
-          </p:cNvSpPr>
-          <p:nvPr>
-            <p:ph type="dt" idx="1"/>
-          </p:nvPr>
-        </p:nvSpPr>
-        <p:spPr>
-          <a:xfrm>
-            <a:off x="3884613" y="0"/>
-            <a:ext cx="2971800" cy="457200"/>
-          </a:xfrm>
-          <a:prstGeom prst="rect">
-            <a:avLst/>
-          </a:prstGeom>
-        </p:spPr>
-        <p:txBody>
-          <a:bodyPr vert="horz" lIns="91440" tIns="45720" rIns="91440" bIns="45720" rtlCol="0"/>
-          <a:lstStyle>
-            <a:lvl1pPr algn="r">
-              <a:defRPr sz="1200"/>
-            </a:lvl1pPr>
-          </a:lstStyle>
-          <a:p>
-            <a:fld id="{CE8F3FB3-3A97-408F-8F2C-779D9619247B}" type="datetimeFigureOut">
-              <a:rPr lang="en-US" smtClean="0"/>
-              <a:pPr/>
-              <a:t>4/22/2012</a:t>
-            </a:fld>
-            <a:endParaRPr lang="en-US"/>
-          </a:p>
-        </p:txBody>
-      </p:sp>
-      <p:sp>
-        <p:nvSpPr>
-          <p:cNvPr id="4" name="Slide Image Placeholder 3"/>
-          <p:cNvSpPr>
-            <a:spLocks noGrp="1" noRot="1" noChangeAspect="1"/>
-          </p:cNvSpPr>
-          <p:nvPr>
-            <p:ph type="sldImg" idx="2"/>
-          </p:nvPr>
-        </p:nvSpPr>
-        <p:spPr>
-          <a:xfrm>
-            <a:off x="1143000" y="685800"/>
-            <a:ext cx="4572000" cy="3429000"/>
-          </a:xfrm>
-          <a:prstGeom prst="rect">
-            <a:avLst/>
-          </a:prstGeom>
-          <a:noFill/>
-          <a:ln w="12700">
-            <a:solidFill>
-              <a:prstClr val="black"/>
-            </a:solidFill>
-          </a:ln>
-        </p:spPr>
-        <p:txBody>
-          <a:bodyPr vert="horz" lIns="91440" tIns="45720" rIns="91440" bIns="45720" rtlCol="0" anchor="ctr"/>
-          <a:lstStyle/>
-          <a:p>
-            <a:endParaRPr lang="en-US"/>
-          </a:p>
-        </p:txBody>
-      </p:sp>
-      <p:sp>
-        <p:nvSpPr>
-          <p:cNvPr id="5" name="Notes Placeholder 4"/>
-          <p:cNvSpPr>
-            <a:spLocks noGrp="1"/>
-          </p:cNvSpPr>
-          <p:nvPr>
-            <p:ph type="body" sz="quarter" idx="3"/>
-          </p:nvPr>
-        </p:nvSpPr>
-        <p:spPr>
-          <a:xfrm>
-            <a:off x="685800" y="4343400"/>
-            <a:ext cx="5486400" cy="4114800"/>
-          </a:xfrm>
-          <a:prstGeom prst="rect">
-            <a:avLst/>
-          </a:prstGeom>
-        </p:spPr>
-        <p:txBody>
-          <a:bodyPr vert="horz" lIns="91440" tIns="45720" rIns="91440" bIns="45720" rtlCol="0"/>
-          <a:lstStyle/>
-          <a:p>
-            <a:pPr lvl="0"/>
-            <a:r>
-              <a:rPr lang="en-US" smtClean="0"/>
-              <a:t>Click to edit Master text styles</a:t>
-            </a:r>
-          </a:p>
-          <a:p>
-            <a:pPr lvl="1"/>
-            <a:r>
-              <a:rPr lang="en-US" smtClean="0"/>
-              <a:t>Second level</a:t>
-            </a:r>
-          </a:p>
-          <a:p>
-            <a:pPr lvl="2"/>
-            <a:r>
-              <a:rPr lang="en-US" smtClean="0"/>
-              <a:t>Third level</a:t>
-            </a:r>
-          </a:p>
-          <a:p>
-            <a:pPr lvl="3"/>
-            <a:r>
-              <a:rPr lang="en-US" smtClean="0"/>
-              <a:t>Fourth level</a:t>
-            </a:r>
-          </a:p>
-          <a:p>
-            <a:pPr lvl="4"/>
-            <a:r>
-              <a:rPr lang="en-US" smtClean="0"/>
-              <a:t>Fifth level</a:t>
-            </a:r>
-            <a:endParaRPr lang="en-US"/>
-          </a:p>
-        </p:txBody>
-      </p:sp>
-      <p:sp>
-        <p:nvSpPr>
-          <p:cNvPr id="6" name="Footer Placeholder 5"/>
-          <p:cNvSpPr>
-            <a:spLocks noGrp="1"/>
-          </p:cNvSpPr>
-          <p:nvPr>
-            <p:ph type="ftr" sz="quarter" idx="4"/>
-          </p:nvPr>
-        </p:nvSpPr>
-        <p:spPr>
-          <a:xfrm>
-            <a:off x="0" y="8685213"/>
-            <a:ext cx="2971800" cy="457200"/>
-          </a:xfrm>
-          <a:prstGeom prst="rect">
-            <a:avLst/>
-          </a:prstGeom>
-        </p:spPr>
-        <p:txBody>
-          <a:bodyPr vert="horz" lIns="91440" tIns="45720" rIns="91440" bIns="45720" rtlCol="0" anchor="b"/>
-          <a:lstStyle>
-            <a:lvl1pPr algn="l">
-              <a:defRPr sz="1200"/>
-            </a:lvl1pPr>
-          </a:lstStyle>
-          <a:p>
-            <a:endParaRPr lang="en-US"/>
-          </a:p>
-        </p:txBody>
-      </p:sp>
-      <p:sp>
-        <p:nvSpPr>
-          <p:cNvPr id="7" name="Slide Number Placeholder 6"/>
-          <p:cNvSpPr>
-            <a:spLocks noGrp="1"/>
-          </p:cNvSpPr>
-          <p:nvPr>
-            <p:ph type="sldNum" sz="quarter" idx="5"/>
-          </p:nvPr>
-        </p:nvSpPr>
-        <p:spPr>
-          <a:xfrm>
-            <a:off x="3884613" y="8685213"/>
-            <a:ext cx="2971800" cy="457200"/>
-          </a:xfrm>
-          <a:prstGeom prst="rect">
-            <a:avLst/>
-          </a:prstGeom>
-        </p:spPr>
-        <p:txBody>
-          <a:bodyPr vert="horz" lIns="91440" tIns="45720" rIns="91440" bIns="45720" rtlCol="0" anchor="b"/>
-          <a:lstStyle>
-            <a:lvl1pPr algn="r">
-              <a:defRPr sz="1200"/>
-            </a:lvl1pPr>
-          </a:lstStyle>
-          <a:p>
-            <a:fld id="{EC6078B8-B29D-44C4-8B20-495FFF114CDA}" type="slidenum">
-              <a:rPr lang="en-US" smtClean="0"/>
-              <a:pPr/>
-              <a:t>‹#›</a:t>
-            </a:fld>
-            <a:endParaRPr lang="en-US"/>
-          </a:p>
-        </p:txBody>
-      </p:sp>
-    </p:spTree>
-    <p:extLst>
-      <p:ext uri="{BB962C8B-B14F-4D97-AF65-F5344CB8AC3E}">
-        <p14:creationId xmlns:p14="http://schemas.microsoft.com/office/powerpoint/2010/main" val="1229168759"/>
-      </p:ext>
-    </p:extLst>
-  </p:cSld>
-  <p:clrMap bg1="lt1" tx1="dk1" bg2="lt2" tx2="dk2" accent1="accent1" accent2="accent2" accent3="accent3" accent4="accent4" accent5="accent5" accent6="accent6" hlink="hlink" folHlink="folHlink"/>
-  <p:notesStyle>
-    <a:lvl1pPr marL="0" algn="l" defTabSz="914400" rtl="0" eaLnBrk="1" latinLnBrk="0" hangingPunct="1">
-      <a:defRPr sz="1200" kern="1200">
-        <a:solidFill>
-          <a:schemeClr val="tx1"/>
-        </a:solidFill>
-        <a:latin typeface="+mn-lt"/>
-        <a:ea typeface="+mn-ea"/>
-        <a:cs typeface="+mn-cs"/>
-      </a:defRPr>
-    </a:lvl1pPr>
-    <a:lvl2pPr marL="457200" algn="l" defTabSz="914400" rtl="0" eaLnBrk="1" latinLnBrk="0" hangingPunct="1">
-      <a:defRPr sz="1200" kern="1200">
-        <a:solidFill>
-          <a:schemeClr val="tx1"/>
-        </a:solidFill>
-        <a:latin typeface="+mn-lt"/>
-        <a:ea typeface="+mn-ea"/>
-        <a:cs typeface="+mn-cs"/>
-      </a:defRPr>
-    </a:lvl2pPr>
-    <a:lvl3pPr marL="914400" algn="l" defTabSz="914400" rtl="0" eaLnBrk="1" latinLnBrk="0" hangingPunct="1">
-      <a:defRPr sz="1200" kern="1200">
-        <a:solidFill>
-          <a:schemeClr val="tx1"/>
-        </a:solidFill>
-        <a:latin typeface="+mn-lt"/>
-        <a:ea typeface="+mn-ea"/>
-        <a:cs typeface="+mn-cs"/>
-      </a:defRPr>
-    </a:lvl3pPr>
-    <a:lvl4pPr marL="1371600" algn="l" defTabSz="914400" rtl="0" eaLnBrk="1" latinLnBrk="0" hangingPunct="1">
-      <a:defRPr sz="1200" kern="1200">
-        <a:solidFill>
-          <a:schemeClr val="tx1"/>
-        </a:solidFill>
-        <a:latin typeface="+mn-lt"/>
-        <a:ea typeface="+mn-ea"/>
-        <a:cs typeface="+mn-cs"/>
-      </a:defRPr>
-    </a:lvl4pPr>
-    <a:lvl5pPr marL="1828800" algn="l" defTabSz="914400" rtl="0" eaLnBrk="1" latinLnBrk="0" hangingPunct="1">
-      <a:defRPr sz="1200" kern="1200">
-        <a:solidFill>
-          <a:schemeClr val="tx1"/>
-        </a:solidFill>
-        <a:latin typeface="+mn-lt"/>
-        <a:ea typeface="+mn-ea"/>
-        <a:cs typeface="+mn-cs"/>
-      </a:defRPr>
-    </a:lvl5pPr>
-    <a:lvl6pPr marL="2286000" algn="l" defTabSz="914400" rtl="0" eaLnBrk="1" latinLnBrk="0" hangingPunct="1">
-      <a:defRPr sz="1200" kern="1200">
-        <a:solidFill>
-          <a:schemeClr val="tx1"/>
-        </a:solidFill>
-        <a:latin typeface="+mn-lt"/>
-        <a:ea typeface="+mn-ea"/>
-        <a:cs typeface="+mn-cs"/>
-      </a:defRPr>
-    </a:lvl6pPr>
-    <a:lvl7pPr marL="2743200" algn="l" defTabSz="914400" rtl="0" eaLnBrk="1" latinLnBrk="0" hangingPunct="1">
-      <a:defRPr sz="1200" kern="1200">
-        <a:solidFill>
-          <a:schemeClr val="tx1"/>
-        </a:solidFill>
-        <a:latin typeface="+mn-lt"/>
-        <a:ea typeface="+mn-ea"/>
-        <a:cs typeface="+mn-cs"/>
-      </a:defRPr>
-    </a:lvl7pPr>
-    <a:lvl8pPr marL="3200400" algn="l" defTabSz="914400" rtl="0" eaLnBrk="1" latinLnBrk="0" hangingPunct="1">
-      <a:defRPr sz="1200" kern="1200">
-        <a:solidFill>
-          <a:schemeClr val="tx1"/>
-        </a:solidFill>
-        <a:latin typeface="+mn-lt"/>
-        <a:ea typeface="+mn-ea"/>
-        <a:cs typeface="+mn-cs"/>
-      </a:defRPr>
-    </a:lvl8pPr>
-    <a:lvl9pPr marL="3657600" algn="l" defTabSz="914400" rtl="0" eaLnBrk="1" latinLnBrk="0" hangingPunct="1">
-      <a:defRPr sz="1200" kern="1200">
-        <a:solidFill>
-          <a:schemeClr val="tx1"/>
-        </a:solidFill>
-        <a:latin typeface="+mn-lt"/>
-        <a:ea typeface="+mn-ea"/>
-        <a:cs typeface="+mn-cs"/>
-      </a:defRPr>
-    </a:lvl9pPr>
-  </p:notesStyle>
-</p:notesMaster>
-</file>
-
-<file path=ppt/notesSlides/notesSlide1.xml><?xml version="1.0" encoding="utf-8"?>
-<p:notes xmlns:a="http://schemas.openxmlformats.org/drawingml/2006/main" xmlns:r="http://schemas.openxmlformats.org/officeDocument/2006/relationships" xmlns:p="http://schemas.openxmlformats.org/presentationml/2006/main">
-  <p:cSld>
-    <p:spTree>
-      <p:nvGrpSpPr>
-        <p:cNvPr id="1" name=""/>
-        <p:cNvGrpSpPr/>
-        <p:nvPr/>
-      </p:nvGrpSpPr>
-      <p:grpSpPr>
-        <a:xfrm>
-          <a:off x="0" y="0"/>
-          <a:ext cx="0" cy="0"/>
-          <a:chOff x="0" y="0"/>
-          <a:chExt cx="0" cy="0"/>
-        </a:xfrm>
-      </p:grpSpPr>
-      <p:sp>
-        <p:nvSpPr>
-          <p:cNvPr id="2" name="Slide Image Placeholder 1"/>
-          <p:cNvSpPr>
-            <a:spLocks noGrp="1" noRot="1" noChangeAspect="1"/>
-          </p:cNvSpPr>
-          <p:nvPr>
-            <p:ph type="sldImg"/>
-          </p:nvPr>
-        </p:nvSpPr>
-        <p:spPr/>
-      </p:sp>
-      <p:sp>
-        <p:nvSpPr>
-          <p:cNvPr id="3" name="Notes Placeholder 2"/>
-          <p:cNvSpPr>
-            <a:spLocks noGrp="1"/>
-          </p:cNvSpPr>
-          <p:nvPr>
-            <p:ph type="body" idx="1"/>
-          </p:nvPr>
-        </p:nvSpPr>
-        <p:spPr/>
-        <p:txBody>
-          <a:bodyPr/>
-          <a:lstStyle/>
-          <a:p>
-            <a:r>
-              <a:rPr lang="en-US" dirty="0" smtClean="0"/>
-              <a:t>Middle </a:t>
-            </a:r>
-            <a:r>
-              <a:rPr lang="en-US" dirty="0" err="1" smtClean="0"/>
-              <a:t>gantt</a:t>
-            </a:r>
-            <a:r>
-              <a:rPr lang="en-US" baseline="0" dirty="0" smtClean="0"/>
-              <a:t> chart</a:t>
-            </a:r>
-            <a:endParaRPr lang="en-US" dirty="0"/>
-          </a:p>
-        </p:txBody>
-      </p:sp>
-      <p:sp>
-        <p:nvSpPr>
-          <p:cNvPr id="4" name="Slide Number Placeholder 3"/>
-          <p:cNvSpPr>
-            <a:spLocks noGrp="1"/>
-          </p:cNvSpPr>
-          <p:nvPr>
-            <p:ph type="sldNum" sz="quarter" idx="10"/>
-          </p:nvPr>
-        </p:nvSpPr>
-        <p:spPr/>
-        <p:txBody>
-          <a:bodyPr/>
-          <a:lstStyle/>
-          <a:p>
-            <a:fld id="{EC6078B8-B29D-44C4-8B20-495FFF114CDA}" type="slidenum">
-              <a:rPr lang="en-US" smtClean="0"/>
-              <a:pPr/>
-              <a:t>8</a:t>
-            </a:fld>
-            <a:endParaRPr lang="en-US"/>
-          </a:p>
-        </p:txBody>
-      </p:sp>
-    </p:spTree>
-    <p:extLst>
-      <p:ext uri="{BB962C8B-B14F-4D97-AF65-F5344CB8AC3E}">
-        <p14:creationId xmlns:p14="http://schemas.microsoft.com/office/powerpoint/2010/main" val="558691801"/>
-      </p:ext>
-    </p:extLst>
-  </p:cSld>
-  <p:clrMapOvr>
-    <a:masterClrMapping/>
-  </p:clrMapOvr>
-</p:notes>
-</file>
-
 <file path=ppt/slideLayouts/slideLayout1.xml><?xml version="1.0" encoding="utf-8"?>
 <p:sldLayout xmlns:a="http://schemas.openxmlformats.org/drawingml/2006/main" xmlns:r="http://schemas.openxmlformats.org/officeDocument/2006/relationships" xmlns:p="http://schemas.openxmlformats.org/presentationml/2006/main" type="title" preserve="1">
   <p:cSld name="Title Slide">
@@ -1151,7 +150,7 @@
               <a:rPr lang="en-US" smtClean="0"/>
               <a:t>Click to edit Master title style</a:t>
             </a:r>
-            <a:endParaRPr lang="en-GB"/>
+            <a:endParaRPr lang="en-US"/>
           </a:p>
         </p:txBody>
       </p:sp>
@@ -1270,7 +269,7 @@
               <a:rPr lang="en-US" smtClean="0"/>
               <a:t>Click to edit Master subtitle style</a:t>
             </a:r>
-            <a:endParaRPr lang="en-GB"/>
+            <a:endParaRPr lang="en-US"/>
           </a:p>
         </p:txBody>
       </p:sp>
@@ -1289,10 +288,9 @@
           <a:bodyPr/>
           <a:lstStyle/>
           <a:p>
-            <a:fld id="{172E3D70-980A-4389-BA3F-762755736F44}" type="datetimeFigureOut">
-              <a:rPr lang="en-US" smtClean="0"/>
-              <a:pPr/>
-              <a:t>4/22/2012</a:t>
+            <a:fld id="{89FD1625-AD4B-4B8A-9B1A-7AD19B728197}" type="datetimeFigureOut">
+              <a:rPr lang="en-US" smtClean="0"/>
+              <a:t>5/9/2012</a:t>
             </a:fld>
             <a:endParaRPr lang="en-US"/>
           </a:p>
@@ -1332,9 +330,8 @@
           <a:bodyPr/>
           <a:lstStyle/>
           <a:p>
-            <a:fld id="{AAA90905-6BAF-4082-B6EA-A73746DD0083}" type="slidenum">
-              <a:rPr lang="en-US" smtClean="0"/>
-              <a:pPr/>
+            <a:fld id="{267F394E-3E26-4328-B1B6-5668F54459FF}" type="slidenum">
+              <a:rPr lang="en-US" smtClean="0"/>
               <a:t>‹#›</a:t>
             </a:fld>
             <a:endParaRPr lang="en-US"/>
@@ -1344,21 +341,13 @@
     </p:spTree>
     <p:extLst>
       <p:ext uri="{BB962C8B-B14F-4D97-AF65-F5344CB8AC3E}">
-        <p14:creationId xmlns:p14="http://schemas.microsoft.com/office/powerpoint/2010/main" val="912485160"/>
+        <p14:creationId xmlns:p14="http://schemas.microsoft.com/office/powerpoint/2010/main" val="1655906393"/>
       </p:ext>
     </p:extLst>
   </p:cSld>
   <p:clrMapOvr>
     <a:masterClrMapping/>
   </p:clrMapOvr>
-  <mc:AlternateContent xmlns:mc="http://schemas.openxmlformats.org/markup-compatibility/2006" xmlns:p14="http://schemas.microsoft.com/office/powerpoint/2010/main">
-    <mc:Choice Requires="p14">
-      <p:transition p14:dur="0"/>
-    </mc:Choice>
-    <mc:Fallback xmlns="">
-      <p:transition/>
-    </mc:Fallback>
-  </mc:AlternateContent>
 </p:sldLayout>
 </file>
 
@@ -1398,7 +387,7 @@
               <a:rPr lang="en-US" smtClean="0"/>
               <a:t>Click to edit Master title style</a:t>
             </a:r>
-            <a:endParaRPr lang="en-GB"/>
+            <a:endParaRPr lang="en-US"/>
           </a:p>
         </p:txBody>
       </p:sp>
@@ -1450,7 +439,7 @@
               <a:rPr lang="en-US" smtClean="0"/>
               <a:t>Fifth level</a:t>
             </a:r>
-            <a:endParaRPr lang="en-GB"/>
+            <a:endParaRPr lang="en-US"/>
           </a:p>
         </p:txBody>
       </p:sp>
@@ -1469,10 +458,9 @@
           <a:bodyPr/>
           <a:lstStyle/>
           <a:p>
-            <a:fld id="{172E3D70-980A-4389-BA3F-762755736F44}" type="datetimeFigureOut">
-              <a:rPr lang="en-US" smtClean="0"/>
-              <a:pPr/>
-              <a:t>4/22/2012</a:t>
+            <a:fld id="{89FD1625-AD4B-4B8A-9B1A-7AD19B728197}" type="datetimeFigureOut">
+              <a:rPr lang="en-US" smtClean="0"/>
+              <a:t>5/9/2012</a:t>
             </a:fld>
             <a:endParaRPr lang="en-US"/>
           </a:p>
@@ -1512,9 +500,8 @@
           <a:bodyPr/>
           <a:lstStyle/>
           <a:p>
-            <a:fld id="{AAA90905-6BAF-4082-B6EA-A73746DD0083}" type="slidenum">
-              <a:rPr lang="en-US" smtClean="0"/>
-              <a:pPr/>
+            <a:fld id="{267F394E-3E26-4328-B1B6-5668F54459FF}" type="slidenum">
+              <a:rPr lang="en-US" smtClean="0"/>
               <a:t>‹#›</a:t>
             </a:fld>
             <a:endParaRPr lang="en-US"/>
@@ -1524,21 +511,13 @@
     </p:spTree>
     <p:extLst>
       <p:ext uri="{BB962C8B-B14F-4D97-AF65-F5344CB8AC3E}">
-        <p14:creationId xmlns:p14="http://schemas.microsoft.com/office/powerpoint/2010/main" val="735022636"/>
+        <p14:creationId xmlns:p14="http://schemas.microsoft.com/office/powerpoint/2010/main" val="3396855467"/>
       </p:ext>
     </p:extLst>
   </p:cSld>
   <p:clrMapOvr>
     <a:masterClrMapping/>
   </p:clrMapOvr>
-  <mc:AlternateContent xmlns:mc="http://schemas.openxmlformats.org/markup-compatibility/2006" xmlns:p14="http://schemas.microsoft.com/office/powerpoint/2010/main">
-    <mc:Choice Requires="p14">
-      <p:transition p14:dur="0"/>
-    </mc:Choice>
-    <mc:Fallback xmlns="">
-      <p:transition/>
-    </mc:Fallback>
-  </mc:AlternateContent>
 </p:sldLayout>
 </file>
 
@@ -1583,7 +562,7 @@
               <a:rPr lang="en-US" smtClean="0"/>
               <a:t>Click to edit Master title style</a:t>
             </a:r>
-            <a:endParaRPr lang="en-GB"/>
+            <a:endParaRPr lang="en-US"/>
           </a:p>
         </p:txBody>
       </p:sp>
@@ -1640,7 +619,7 @@
               <a:rPr lang="en-US" smtClean="0"/>
               <a:t>Fifth level</a:t>
             </a:r>
-            <a:endParaRPr lang="en-GB"/>
+            <a:endParaRPr lang="en-US"/>
           </a:p>
         </p:txBody>
       </p:sp>
@@ -1659,10 +638,9 @@
           <a:bodyPr/>
           <a:lstStyle/>
           <a:p>
-            <a:fld id="{172E3D70-980A-4389-BA3F-762755736F44}" type="datetimeFigureOut">
-              <a:rPr lang="en-US" smtClean="0"/>
-              <a:pPr/>
-              <a:t>4/22/2012</a:t>
+            <a:fld id="{89FD1625-AD4B-4B8A-9B1A-7AD19B728197}" type="datetimeFigureOut">
+              <a:rPr lang="en-US" smtClean="0"/>
+              <a:t>5/9/2012</a:t>
             </a:fld>
             <a:endParaRPr lang="en-US"/>
           </a:p>
@@ -1702,9 +680,8 @@
           <a:bodyPr/>
           <a:lstStyle/>
           <a:p>
-            <a:fld id="{AAA90905-6BAF-4082-B6EA-A73746DD0083}" type="slidenum">
-              <a:rPr lang="en-US" smtClean="0"/>
-              <a:pPr/>
+            <a:fld id="{267F394E-3E26-4328-B1B6-5668F54459FF}" type="slidenum">
+              <a:rPr lang="en-US" smtClean="0"/>
               <a:t>‹#›</a:t>
             </a:fld>
             <a:endParaRPr lang="en-US"/>
@@ -1714,21 +691,13 @@
     </p:spTree>
     <p:extLst>
       <p:ext uri="{BB962C8B-B14F-4D97-AF65-F5344CB8AC3E}">
-        <p14:creationId xmlns:p14="http://schemas.microsoft.com/office/powerpoint/2010/main" val="3882791656"/>
+        <p14:creationId xmlns:p14="http://schemas.microsoft.com/office/powerpoint/2010/main" val="1868002614"/>
       </p:ext>
     </p:extLst>
   </p:cSld>
   <p:clrMapOvr>
     <a:masterClrMapping/>
   </p:clrMapOvr>
-  <mc:AlternateContent xmlns:mc="http://schemas.openxmlformats.org/markup-compatibility/2006" xmlns:p14="http://schemas.microsoft.com/office/powerpoint/2010/main">
-    <mc:Choice Requires="p14">
-      <p:transition p14:dur="0"/>
-    </mc:Choice>
-    <mc:Fallback xmlns="">
-      <p:transition/>
-    </mc:Fallback>
-  </mc:AlternateContent>
 </p:sldLayout>
 </file>
 
@@ -1768,7 +737,7 @@
               <a:rPr lang="en-US" smtClean="0"/>
               <a:t>Click to edit Master title style</a:t>
             </a:r>
-            <a:endParaRPr lang="en-GB"/>
+            <a:endParaRPr lang="en-US"/>
           </a:p>
         </p:txBody>
       </p:sp>
@@ -1820,7 +789,7 @@
               <a:rPr lang="en-US" smtClean="0"/>
               <a:t>Fifth level</a:t>
             </a:r>
-            <a:endParaRPr lang="en-GB"/>
+            <a:endParaRPr lang="en-US"/>
           </a:p>
         </p:txBody>
       </p:sp>
@@ -1839,10 +808,9 @@
           <a:bodyPr/>
           <a:lstStyle/>
           <a:p>
-            <a:fld id="{172E3D70-980A-4389-BA3F-762755736F44}" type="datetimeFigureOut">
-              <a:rPr lang="en-US" smtClean="0"/>
-              <a:pPr/>
-              <a:t>4/22/2012</a:t>
+            <a:fld id="{89FD1625-AD4B-4B8A-9B1A-7AD19B728197}" type="datetimeFigureOut">
+              <a:rPr lang="en-US" smtClean="0"/>
+              <a:t>5/9/2012</a:t>
             </a:fld>
             <a:endParaRPr lang="en-US"/>
           </a:p>
@@ -1882,9 +850,8 @@
           <a:bodyPr/>
           <a:lstStyle/>
           <a:p>
-            <a:fld id="{AAA90905-6BAF-4082-B6EA-A73746DD0083}" type="slidenum">
-              <a:rPr lang="en-US" smtClean="0"/>
-              <a:pPr/>
+            <a:fld id="{267F394E-3E26-4328-B1B6-5668F54459FF}" type="slidenum">
+              <a:rPr lang="en-US" smtClean="0"/>
               <a:t>‹#›</a:t>
             </a:fld>
             <a:endParaRPr lang="en-US"/>
@@ -1894,21 +861,13 @@
     </p:spTree>
     <p:extLst>
       <p:ext uri="{BB962C8B-B14F-4D97-AF65-F5344CB8AC3E}">
-        <p14:creationId xmlns:p14="http://schemas.microsoft.com/office/powerpoint/2010/main" val="1548358692"/>
+        <p14:creationId xmlns:p14="http://schemas.microsoft.com/office/powerpoint/2010/main" val="1124045049"/>
       </p:ext>
     </p:extLst>
   </p:cSld>
   <p:clrMapOvr>
     <a:masterClrMapping/>
   </p:clrMapOvr>
-  <mc:AlternateContent xmlns:mc="http://schemas.openxmlformats.org/markup-compatibility/2006" xmlns:p14="http://schemas.microsoft.com/office/powerpoint/2010/main">
-    <mc:Choice Requires="p14">
-      <p:transition p14:dur="0"/>
-    </mc:Choice>
-    <mc:Fallback xmlns="">
-      <p:transition/>
-    </mc:Fallback>
-  </mc:AlternateContent>
 </p:sldLayout>
 </file>
 
@@ -1957,7 +916,7 @@
               <a:rPr lang="en-US" smtClean="0"/>
               <a:t>Click to edit Master title style</a:t>
             </a:r>
-            <a:endParaRPr lang="en-GB"/>
+            <a:endParaRPr lang="en-US"/>
           </a:p>
         </p:txBody>
       </p:sp>
@@ -2095,10 +1054,9 @@
           <a:bodyPr/>
           <a:lstStyle/>
           <a:p>
-            <a:fld id="{172E3D70-980A-4389-BA3F-762755736F44}" type="datetimeFigureOut">
-              <a:rPr lang="en-US" smtClean="0"/>
-              <a:pPr/>
-              <a:t>4/22/2012</a:t>
+            <a:fld id="{89FD1625-AD4B-4B8A-9B1A-7AD19B728197}" type="datetimeFigureOut">
+              <a:rPr lang="en-US" smtClean="0"/>
+              <a:t>5/9/2012</a:t>
             </a:fld>
             <a:endParaRPr lang="en-US"/>
           </a:p>
@@ -2138,9 +1096,8 @@
           <a:bodyPr/>
           <a:lstStyle/>
           <a:p>
-            <a:fld id="{AAA90905-6BAF-4082-B6EA-A73746DD0083}" type="slidenum">
-              <a:rPr lang="en-US" smtClean="0"/>
-              <a:pPr/>
+            <a:fld id="{267F394E-3E26-4328-B1B6-5668F54459FF}" type="slidenum">
+              <a:rPr lang="en-US" smtClean="0"/>
               <a:t>‹#›</a:t>
             </a:fld>
             <a:endParaRPr lang="en-US"/>
@@ -2150,21 +1107,13 @@
     </p:spTree>
     <p:extLst>
       <p:ext uri="{BB962C8B-B14F-4D97-AF65-F5344CB8AC3E}">
-        <p14:creationId xmlns:p14="http://schemas.microsoft.com/office/powerpoint/2010/main" val="2204643936"/>
+        <p14:creationId xmlns:p14="http://schemas.microsoft.com/office/powerpoint/2010/main" val="516271336"/>
       </p:ext>
     </p:extLst>
   </p:cSld>
   <p:clrMapOvr>
     <a:masterClrMapping/>
   </p:clrMapOvr>
-  <mc:AlternateContent xmlns:mc="http://schemas.openxmlformats.org/markup-compatibility/2006" xmlns:p14="http://schemas.microsoft.com/office/powerpoint/2010/main">
-    <mc:Choice Requires="p14">
-      <p:transition p14:dur="0"/>
-    </mc:Choice>
-    <mc:Fallback xmlns="">
-      <p:transition/>
-    </mc:Fallback>
-  </mc:AlternateContent>
 </p:sldLayout>
 </file>
 
@@ -2204,7 +1153,7 @@
               <a:rPr lang="en-US" smtClean="0"/>
               <a:t>Click to edit Master title style</a:t>
             </a:r>
-            <a:endParaRPr lang="en-GB"/>
+            <a:endParaRPr lang="en-US"/>
           </a:p>
         </p:txBody>
       </p:sp>
@@ -2289,7 +1238,7 @@
               <a:rPr lang="en-US" smtClean="0"/>
               <a:t>Fifth level</a:t>
             </a:r>
-            <a:endParaRPr lang="en-GB"/>
+            <a:endParaRPr lang="en-US"/>
           </a:p>
         </p:txBody>
       </p:sp>
@@ -2374,7 +1323,7 @@
               <a:rPr lang="en-US" smtClean="0"/>
               <a:t>Fifth level</a:t>
             </a:r>
-            <a:endParaRPr lang="en-GB"/>
+            <a:endParaRPr lang="en-US"/>
           </a:p>
         </p:txBody>
       </p:sp>
@@ -2393,10 +1342,9 @@
           <a:bodyPr/>
           <a:lstStyle/>
           <a:p>
-            <a:fld id="{172E3D70-980A-4389-BA3F-762755736F44}" type="datetimeFigureOut">
-              <a:rPr lang="en-US" smtClean="0"/>
-              <a:pPr/>
-              <a:t>4/22/2012</a:t>
+            <a:fld id="{89FD1625-AD4B-4B8A-9B1A-7AD19B728197}" type="datetimeFigureOut">
+              <a:rPr lang="en-US" smtClean="0"/>
+              <a:t>5/9/2012</a:t>
             </a:fld>
             <a:endParaRPr lang="en-US"/>
           </a:p>
@@ -2436,9 +1384,8 @@
           <a:bodyPr/>
           <a:lstStyle/>
           <a:p>
-            <a:fld id="{AAA90905-6BAF-4082-B6EA-A73746DD0083}" type="slidenum">
-              <a:rPr lang="en-US" smtClean="0"/>
-              <a:pPr/>
+            <a:fld id="{267F394E-3E26-4328-B1B6-5668F54459FF}" type="slidenum">
+              <a:rPr lang="en-US" smtClean="0"/>
               <a:t>‹#›</a:t>
             </a:fld>
             <a:endParaRPr lang="en-US"/>
@@ -2448,21 +1395,13 @@
     </p:spTree>
     <p:extLst>
       <p:ext uri="{BB962C8B-B14F-4D97-AF65-F5344CB8AC3E}">
-        <p14:creationId xmlns:p14="http://schemas.microsoft.com/office/powerpoint/2010/main" val="3364290513"/>
+        <p14:creationId xmlns:p14="http://schemas.microsoft.com/office/powerpoint/2010/main" val="4161784363"/>
       </p:ext>
     </p:extLst>
   </p:cSld>
   <p:clrMapOvr>
     <a:masterClrMapping/>
   </p:clrMapOvr>
-  <mc:AlternateContent xmlns:mc="http://schemas.openxmlformats.org/markup-compatibility/2006" xmlns:p14="http://schemas.microsoft.com/office/powerpoint/2010/main">
-    <mc:Choice Requires="p14">
-      <p:transition p14:dur="0"/>
-    </mc:Choice>
-    <mc:Fallback xmlns="">
-      <p:transition/>
-    </mc:Fallback>
-  </mc:AlternateContent>
 </p:sldLayout>
 </file>
 
@@ -2506,7 +1445,7 @@
               <a:rPr lang="en-US" smtClean="0"/>
               <a:t>Click to edit Master title style</a:t>
             </a:r>
-            <a:endParaRPr lang="en-GB"/>
+            <a:endParaRPr lang="en-US"/>
           </a:p>
         </p:txBody>
       </p:sp>
@@ -2656,7 +1595,7 @@
               <a:rPr lang="en-US" smtClean="0"/>
               <a:t>Fifth level</a:t>
             </a:r>
-            <a:endParaRPr lang="en-GB"/>
+            <a:endParaRPr lang="en-US"/>
           </a:p>
         </p:txBody>
       </p:sp>
@@ -2806,7 +1745,7 @@
               <a:rPr lang="en-US" smtClean="0"/>
               <a:t>Fifth level</a:t>
             </a:r>
-            <a:endParaRPr lang="en-GB"/>
+            <a:endParaRPr lang="en-US"/>
           </a:p>
         </p:txBody>
       </p:sp>
@@ -2825,10 +1764,9 @@
           <a:bodyPr/>
           <a:lstStyle/>
           <a:p>
-            <a:fld id="{172E3D70-980A-4389-BA3F-762755736F44}" type="datetimeFigureOut">
-              <a:rPr lang="en-US" smtClean="0"/>
-              <a:pPr/>
-              <a:t>4/22/2012</a:t>
+            <a:fld id="{89FD1625-AD4B-4B8A-9B1A-7AD19B728197}" type="datetimeFigureOut">
+              <a:rPr lang="en-US" smtClean="0"/>
+              <a:t>5/9/2012</a:t>
             </a:fld>
             <a:endParaRPr lang="en-US"/>
           </a:p>
@@ -2868,9 +1806,8 @@
           <a:bodyPr/>
           <a:lstStyle/>
           <a:p>
-            <a:fld id="{AAA90905-6BAF-4082-B6EA-A73746DD0083}" type="slidenum">
-              <a:rPr lang="en-US" smtClean="0"/>
-              <a:pPr/>
+            <a:fld id="{267F394E-3E26-4328-B1B6-5668F54459FF}" type="slidenum">
+              <a:rPr lang="en-US" smtClean="0"/>
               <a:t>‹#›</a:t>
             </a:fld>
             <a:endParaRPr lang="en-US"/>
@@ -2880,21 +1817,13 @@
     </p:spTree>
     <p:extLst>
       <p:ext uri="{BB962C8B-B14F-4D97-AF65-F5344CB8AC3E}">
-        <p14:creationId xmlns:p14="http://schemas.microsoft.com/office/powerpoint/2010/main" val="3061895688"/>
+        <p14:creationId xmlns:p14="http://schemas.microsoft.com/office/powerpoint/2010/main" val="3026287708"/>
       </p:ext>
     </p:extLst>
   </p:cSld>
   <p:clrMapOvr>
     <a:masterClrMapping/>
   </p:clrMapOvr>
-  <mc:AlternateContent xmlns:mc="http://schemas.openxmlformats.org/markup-compatibility/2006" xmlns:p14="http://schemas.microsoft.com/office/powerpoint/2010/main">
-    <mc:Choice Requires="p14">
-      <p:transition p14:dur="0"/>
-    </mc:Choice>
-    <mc:Fallback xmlns="">
-      <p:transition/>
-    </mc:Fallback>
-  </mc:AlternateContent>
 </p:sldLayout>
 </file>
 
@@ -2934,7 +1863,7 @@
               <a:rPr lang="en-US" smtClean="0"/>
               <a:t>Click to edit Master title style</a:t>
             </a:r>
-            <a:endParaRPr lang="en-GB"/>
+            <a:endParaRPr lang="en-US"/>
           </a:p>
         </p:txBody>
       </p:sp>
@@ -2953,10 +1882,9 @@
           <a:bodyPr/>
           <a:lstStyle/>
           <a:p>
-            <a:fld id="{172E3D70-980A-4389-BA3F-762755736F44}" type="datetimeFigureOut">
-              <a:rPr lang="en-US" smtClean="0"/>
-              <a:pPr/>
-              <a:t>4/22/2012</a:t>
+            <a:fld id="{89FD1625-AD4B-4B8A-9B1A-7AD19B728197}" type="datetimeFigureOut">
+              <a:rPr lang="en-US" smtClean="0"/>
+              <a:t>5/9/2012</a:t>
             </a:fld>
             <a:endParaRPr lang="en-US"/>
           </a:p>
@@ -2996,9 +1924,8 @@
           <a:bodyPr/>
           <a:lstStyle/>
           <a:p>
-            <a:fld id="{AAA90905-6BAF-4082-B6EA-A73746DD0083}" type="slidenum">
-              <a:rPr lang="en-US" smtClean="0"/>
-              <a:pPr/>
+            <a:fld id="{267F394E-3E26-4328-B1B6-5668F54459FF}" type="slidenum">
+              <a:rPr lang="en-US" smtClean="0"/>
               <a:t>‹#›</a:t>
             </a:fld>
             <a:endParaRPr lang="en-US"/>
@@ -3008,21 +1935,13 @@
     </p:spTree>
     <p:extLst>
       <p:ext uri="{BB962C8B-B14F-4D97-AF65-F5344CB8AC3E}">
-        <p14:creationId xmlns:p14="http://schemas.microsoft.com/office/powerpoint/2010/main" val="2535646022"/>
+        <p14:creationId xmlns:p14="http://schemas.microsoft.com/office/powerpoint/2010/main" val="2839176310"/>
       </p:ext>
     </p:extLst>
   </p:cSld>
   <p:clrMapOvr>
     <a:masterClrMapping/>
   </p:clrMapOvr>
-  <mc:AlternateContent xmlns:mc="http://schemas.openxmlformats.org/markup-compatibility/2006" xmlns:p14="http://schemas.microsoft.com/office/powerpoint/2010/main">
-    <mc:Choice Requires="p14">
-      <p:transition p14:dur="0"/>
-    </mc:Choice>
-    <mc:Fallback xmlns="">
-      <p:transition/>
-    </mc:Fallback>
-  </mc:AlternateContent>
 </p:sldLayout>
 </file>
 
@@ -3058,10 +1977,9 @@
           <a:bodyPr/>
           <a:lstStyle/>
           <a:p>
-            <a:fld id="{172E3D70-980A-4389-BA3F-762755736F44}" type="datetimeFigureOut">
-              <a:rPr lang="en-US" smtClean="0"/>
-              <a:pPr/>
-              <a:t>4/22/2012</a:t>
+            <a:fld id="{89FD1625-AD4B-4B8A-9B1A-7AD19B728197}" type="datetimeFigureOut">
+              <a:rPr lang="en-US" smtClean="0"/>
+              <a:t>5/9/2012</a:t>
             </a:fld>
             <a:endParaRPr lang="en-US"/>
           </a:p>
@@ -3101,9 +2019,8 @@
           <a:bodyPr/>
           <a:lstStyle/>
           <a:p>
-            <a:fld id="{AAA90905-6BAF-4082-B6EA-A73746DD0083}" type="slidenum">
-              <a:rPr lang="en-US" smtClean="0"/>
-              <a:pPr/>
+            <a:fld id="{267F394E-3E26-4328-B1B6-5668F54459FF}" type="slidenum">
+              <a:rPr lang="en-US" smtClean="0"/>
               <a:t>‹#›</a:t>
             </a:fld>
             <a:endParaRPr lang="en-US"/>
@@ -3113,21 +2030,13 @@
     </p:spTree>
     <p:extLst>
       <p:ext uri="{BB962C8B-B14F-4D97-AF65-F5344CB8AC3E}">
-        <p14:creationId xmlns:p14="http://schemas.microsoft.com/office/powerpoint/2010/main" val="2904577763"/>
+        <p14:creationId xmlns:p14="http://schemas.microsoft.com/office/powerpoint/2010/main" val="3178643038"/>
       </p:ext>
     </p:extLst>
   </p:cSld>
   <p:clrMapOvr>
     <a:masterClrMapping/>
   </p:clrMapOvr>
-  <mc:AlternateContent xmlns:mc="http://schemas.openxmlformats.org/markup-compatibility/2006" xmlns:p14="http://schemas.microsoft.com/office/powerpoint/2010/main">
-    <mc:Choice Requires="p14">
-      <p:transition p14:dur="0"/>
-    </mc:Choice>
-    <mc:Fallback xmlns="">
-      <p:transition/>
-    </mc:Fallback>
-  </mc:AlternateContent>
 </p:sldLayout>
 </file>
 
@@ -3176,7 +2085,7 @@
               <a:rPr lang="en-US" smtClean="0"/>
               <a:t>Click to edit Master title style</a:t>
             </a:r>
-            <a:endParaRPr lang="en-GB"/>
+            <a:endParaRPr lang="en-US"/>
           </a:p>
         </p:txBody>
       </p:sp>
@@ -3261,7 +2170,7 @@
               <a:rPr lang="en-US" smtClean="0"/>
               <a:t>Fifth level</a:t>
             </a:r>
-            <a:endParaRPr lang="en-GB"/>
+            <a:endParaRPr lang="en-US"/>
           </a:p>
         </p:txBody>
       </p:sp>
@@ -3345,10 +2254,9 @@
           <a:bodyPr/>
           <a:lstStyle/>
           <a:p>
-            <a:fld id="{172E3D70-980A-4389-BA3F-762755736F44}" type="datetimeFigureOut">
-              <a:rPr lang="en-US" smtClean="0"/>
-              <a:pPr/>
-              <a:t>4/22/2012</a:t>
+            <a:fld id="{89FD1625-AD4B-4B8A-9B1A-7AD19B728197}" type="datetimeFigureOut">
+              <a:rPr lang="en-US" smtClean="0"/>
+              <a:t>5/9/2012</a:t>
             </a:fld>
             <a:endParaRPr lang="en-US"/>
           </a:p>
@@ -3388,9 +2296,8 @@
           <a:bodyPr/>
           <a:lstStyle/>
           <a:p>
-            <a:fld id="{AAA90905-6BAF-4082-B6EA-A73746DD0083}" type="slidenum">
-              <a:rPr lang="en-US" smtClean="0"/>
-              <a:pPr/>
+            <a:fld id="{267F394E-3E26-4328-B1B6-5668F54459FF}" type="slidenum">
+              <a:rPr lang="en-US" smtClean="0"/>
               <a:t>‹#›</a:t>
             </a:fld>
             <a:endParaRPr lang="en-US"/>
@@ -3400,21 +2307,13 @@
     </p:spTree>
     <p:extLst>
       <p:ext uri="{BB962C8B-B14F-4D97-AF65-F5344CB8AC3E}">
-        <p14:creationId xmlns:p14="http://schemas.microsoft.com/office/powerpoint/2010/main" val="952417034"/>
+        <p14:creationId xmlns:p14="http://schemas.microsoft.com/office/powerpoint/2010/main" val="2498363110"/>
       </p:ext>
     </p:extLst>
   </p:cSld>
   <p:clrMapOvr>
     <a:masterClrMapping/>
   </p:clrMapOvr>
-  <mc:AlternateContent xmlns:mc="http://schemas.openxmlformats.org/markup-compatibility/2006" xmlns:p14="http://schemas.microsoft.com/office/powerpoint/2010/main">
-    <mc:Choice Requires="p14">
-      <p:transition p14:dur="0"/>
-    </mc:Choice>
-    <mc:Fallback xmlns="">
-      <p:transition/>
-    </mc:Fallback>
-  </mc:AlternateContent>
 </p:sldLayout>
 </file>
 
@@ -3463,7 +2362,7 @@
               <a:rPr lang="en-US" smtClean="0"/>
               <a:t>Click to edit Master title style</a:t>
             </a:r>
-            <a:endParaRPr lang="en-GB"/>
+            <a:endParaRPr lang="en-US"/>
           </a:p>
         </p:txBody>
       </p:sp>
@@ -3524,7 +2423,7 @@
             </a:lvl9pPr>
           </a:lstStyle>
           <a:p>
-            <a:endParaRPr lang="en-GB"/>
+            <a:endParaRPr lang="en-US"/>
           </a:p>
         </p:txBody>
       </p:sp>
@@ -3608,10 +2507,9 @@
           <a:bodyPr/>
           <a:lstStyle/>
           <a:p>
-            <a:fld id="{172E3D70-980A-4389-BA3F-762755736F44}" type="datetimeFigureOut">
-              <a:rPr lang="en-US" smtClean="0"/>
-              <a:pPr/>
-              <a:t>4/22/2012</a:t>
+            <a:fld id="{89FD1625-AD4B-4B8A-9B1A-7AD19B728197}" type="datetimeFigureOut">
+              <a:rPr lang="en-US" smtClean="0"/>
+              <a:t>5/9/2012</a:t>
             </a:fld>
             <a:endParaRPr lang="en-US"/>
           </a:p>
@@ -3651,9 +2549,8 @@
           <a:bodyPr/>
           <a:lstStyle/>
           <a:p>
-            <a:fld id="{AAA90905-6BAF-4082-B6EA-A73746DD0083}" type="slidenum">
-              <a:rPr lang="en-US" smtClean="0"/>
-              <a:pPr/>
+            <a:fld id="{267F394E-3E26-4328-B1B6-5668F54459FF}" type="slidenum">
+              <a:rPr lang="en-US" smtClean="0"/>
               <a:t>‹#›</a:t>
             </a:fld>
             <a:endParaRPr lang="en-US"/>
@@ -3663,21 +2560,13 @@
     </p:spTree>
     <p:extLst>
       <p:ext uri="{BB962C8B-B14F-4D97-AF65-F5344CB8AC3E}">
-        <p14:creationId xmlns:p14="http://schemas.microsoft.com/office/powerpoint/2010/main" val="1836398859"/>
+        <p14:creationId xmlns:p14="http://schemas.microsoft.com/office/powerpoint/2010/main" val="1033427959"/>
       </p:ext>
     </p:extLst>
   </p:cSld>
   <p:clrMapOvr>
     <a:masterClrMapping/>
   </p:clrMapOvr>
-  <mc:AlternateContent xmlns:mc="http://schemas.openxmlformats.org/markup-compatibility/2006" xmlns:p14="http://schemas.microsoft.com/office/powerpoint/2010/main">
-    <mc:Choice Requires="p14">
-      <p:transition p14:dur="0"/>
-    </mc:Choice>
-    <mc:Fallback xmlns="">
-      <p:transition/>
-    </mc:Fallback>
-  </mc:AlternateContent>
 </p:sldLayout>
 </file>
 
@@ -3689,15 +2578,14 @@
         <a:gradFill flip="none" rotWithShape="1">
           <a:gsLst>
             <a:gs pos="0">
-              <a:schemeClr val="bg1">
-                <a:tint val="80000"/>
-                <a:satMod val="300000"/>
+              <a:schemeClr val="tx1">
+                <a:lumMod val="65000"/>
               </a:schemeClr>
             </a:gs>
-            <a:gs pos="100000">
+            <a:gs pos="52000">
               <a:schemeClr val="bg1">
-                <a:shade val="30000"/>
-                <a:satMod val="200000"/>
+                <a:lumMod val="75000"/>
+                <a:lumOff val="25000"/>
               </a:schemeClr>
             </a:gs>
           </a:gsLst>
@@ -3750,7 +2638,7 @@
               <a:rPr lang="en-US" smtClean="0"/>
               <a:t>Click to edit Master title style</a:t>
             </a:r>
-            <a:endParaRPr lang="en-GB"/>
+            <a:endParaRPr lang="en-US"/>
           </a:p>
         </p:txBody>
       </p:sp>
@@ -3812,7 +2700,7 @@
               <a:rPr lang="en-US" smtClean="0"/>
               <a:t>Fifth level</a:t>
             </a:r>
-            <a:endParaRPr lang="en-GB"/>
+            <a:endParaRPr lang="en-US"/>
           </a:p>
         </p:txBody>
       </p:sp>
@@ -3849,10 +2737,9 @@
             </a:lvl1pPr>
           </a:lstStyle>
           <a:p>
-            <a:fld id="{172E3D70-980A-4389-BA3F-762755736F44}" type="datetimeFigureOut">
-              <a:rPr lang="en-US" smtClean="0"/>
-              <a:pPr/>
-              <a:t>4/22/2012</a:t>
+            <a:fld id="{89FD1625-AD4B-4B8A-9B1A-7AD19B728197}" type="datetimeFigureOut">
+              <a:rPr lang="en-US" smtClean="0"/>
+              <a:t>5/9/2012</a:t>
             </a:fld>
             <a:endParaRPr lang="en-US"/>
           </a:p>
@@ -3928,82 +2815,35 @@
             </a:lvl1pPr>
           </a:lstStyle>
           <a:p>
-            <a:fld id="{AAA90905-6BAF-4082-B6EA-A73746DD0083}" type="slidenum">
-              <a:rPr lang="en-US" smtClean="0"/>
-              <a:pPr/>
+            <a:fld id="{267F394E-3E26-4328-B1B6-5668F54459FF}" type="slidenum">
+              <a:rPr lang="en-US" smtClean="0"/>
               <a:t>‹#›</a:t>
             </a:fld>
             <a:endParaRPr lang="en-US"/>
-          </a:p>
-        </p:txBody>
-      </p:sp>
-      <p:sp>
-        <p:nvSpPr>
-          <p:cNvPr id="7" name="TextBox 6"/>
-          <p:cNvSpPr txBox="1"/>
-          <p:nvPr userDrawn="1"/>
-        </p:nvSpPr>
-        <p:spPr>
-          <a:xfrm>
-            <a:off x="152400" y="76200"/>
-            <a:ext cx="8894294" cy="584775"/>
-          </a:xfrm>
-          <a:prstGeom prst="rect">
-            <a:avLst/>
-          </a:prstGeom>
-          <a:noFill/>
-        </p:spPr>
-        <p:txBody>
-          <a:bodyPr wrap="none" rtlCol="0">
-            <a:spAutoFit/>
-          </a:bodyPr>
-          <a:lstStyle/>
-          <a:p>
-            <a:r>
-              <a:rPr lang="en-GB" sz="3200" b="1" dirty="0" smtClean="0">
-                <a:solidFill>
-                  <a:srgbClr val="FF0000"/>
-                </a:solidFill>
-              </a:rPr>
-              <a:t>THIS IS JUST A COPY OF THE OLD PRESENTATION!!!!</a:t>
-            </a:r>
-            <a:endParaRPr lang="en-GB" sz="3200" b="1" dirty="0">
-              <a:solidFill>
-                <a:srgbClr val="FF0000"/>
-              </a:solidFill>
-            </a:endParaRPr>
           </a:p>
         </p:txBody>
       </p:sp>
     </p:spTree>
     <p:extLst>
       <p:ext uri="{BB962C8B-B14F-4D97-AF65-F5344CB8AC3E}">
-        <p14:creationId xmlns:p14="http://schemas.microsoft.com/office/powerpoint/2010/main" val="4244202142"/>
+        <p14:creationId xmlns:p14="http://schemas.microsoft.com/office/powerpoint/2010/main" val="2280963937"/>
       </p:ext>
     </p:extLst>
   </p:cSld>
   <p:clrMap bg1="dk1" tx1="lt1" bg2="dk2" tx2="lt2" accent1="accent1" accent2="accent2" accent3="accent3" accent4="accent4" accent5="accent5" accent6="accent6" hlink="hlink" folHlink="folHlink"/>
   <p:sldLayoutIdLst>
-    <p:sldLayoutId id="2147483757" r:id="rId1"/>
-    <p:sldLayoutId id="2147483758" r:id="rId2"/>
-    <p:sldLayoutId id="2147483759" r:id="rId3"/>
-    <p:sldLayoutId id="2147483760" r:id="rId4"/>
-    <p:sldLayoutId id="2147483761" r:id="rId5"/>
-    <p:sldLayoutId id="2147483762" r:id="rId6"/>
-    <p:sldLayoutId id="2147483763" r:id="rId7"/>
-    <p:sldLayoutId id="2147483764" r:id="rId8"/>
-    <p:sldLayoutId id="2147483765" r:id="rId9"/>
-    <p:sldLayoutId id="2147483766" r:id="rId10"/>
-    <p:sldLayoutId id="2147483767" r:id="rId11"/>
+    <p:sldLayoutId id="2147483649" r:id="rId1"/>
+    <p:sldLayoutId id="2147483650" r:id="rId2"/>
+    <p:sldLayoutId id="2147483651" r:id="rId3"/>
+    <p:sldLayoutId id="2147483652" r:id="rId4"/>
+    <p:sldLayoutId id="2147483653" r:id="rId5"/>
+    <p:sldLayoutId id="2147483654" r:id="rId6"/>
+    <p:sldLayoutId id="2147483655" r:id="rId7"/>
+    <p:sldLayoutId id="2147483656" r:id="rId8"/>
+    <p:sldLayoutId id="2147483657" r:id="rId9"/>
+    <p:sldLayoutId id="2147483658" r:id="rId10"/>
+    <p:sldLayoutId id="2147483659" r:id="rId11"/>
   </p:sldLayoutIdLst>
-  <mc:AlternateContent xmlns:mc="http://schemas.openxmlformats.org/markup-compatibility/2006" xmlns:p14="http://schemas.microsoft.com/office/powerpoint/2010/main">
-    <mc:Choice Requires="p14">
-      <p:transition p14:dur="0"/>
-    </mc:Choice>
-    <mc:Fallback xmlns="">
-      <p:transition/>
-    </mc:Fallback>
-  </mc:AlternateContent>
   <p:txStyles>
     <p:titleStyle>
       <a:lvl1pPr algn="ctr" defTabSz="914400" rtl="0" eaLnBrk="1" latinLnBrk="0" hangingPunct="1">
@@ -4291,67 +3131,39 @@
           <a:p>
             <a:r>
               <a:rPr lang="en-US" dirty="0" smtClean="0"/>
-              <a:t>D5 </a:t>
-            </a:r>
+              <a:t>D5 – Presentation</a:t>
+            </a:r>
+            <a:endParaRPr lang="en-US" dirty="0"/>
+          </a:p>
+        </p:txBody>
+      </p:sp>
+      <p:sp>
+        <p:nvSpPr>
+          <p:cNvPr id="3" name="Subtitle 2"/>
+          <p:cNvSpPr>
+            <a:spLocks noGrp="1"/>
+          </p:cNvSpPr>
+          <p:nvPr>
+            <p:ph type="subTitle" idx="1"/>
+          </p:nvPr>
+        </p:nvSpPr>
+        <p:spPr/>
+        <p:txBody>
+          <a:bodyPr/>
+          <a:lstStyle/>
+          <a:p>
             <a:r>
               <a:rPr lang="en-US" dirty="0" smtClean="0"/>
-              <a:t>– Presentation</a:t>
-            </a:r>
-            <a:endParaRPr lang="en-US" dirty="0"/>
-          </a:p>
-        </p:txBody>
-      </p:sp>
-      <p:sp>
-        <p:nvSpPr>
-          <p:cNvPr id="3" name="Subtitle 2"/>
-          <p:cNvSpPr>
-            <a:spLocks noGrp="1"/>
-          </p:cNvSpPr>
-          <p:nvPr>
-            <p:ph type="subTitle" idx="1"/>
-          </p:nvPr>
-        </p:nvSpPr>
-        <p:spPr>
-          <a:xfrm>
-            <a:off x="990600" y="3810000"/>
-            <a:ext cx="7086600" cy="1752600"/>
-          </a:xfrm>
-        </p:spPr>
-        <p:txBody>
-          <a:bodyPr/>
-          <a:lstStyle/>
+              <a:t>Group 9</a:t>
+            </a:r>
+          </a:p>
           <a:p>
             <a:r>
               <a:rPr lang="en-US" dirty="0" smtClean="0"/>
-              <a:t>Group </a:t>
-            </a:r>
-            <a:r>
-              <a:rPr lang="en-US" dirty="0" smtClean="0"/>
-              <a:t>9</a:t>
-            </a:r>
-            <a:endParaRPr lang="en-US" dirty="0" smtClean="0"/>
-          </a:p>
-          <a:p>
-            <a:r>
-              <a:rPr lang="en-US" dirty="0" smtClean="0"/>
-              <a:t>Brian</a:t>
-            </a:r>
-            <a:r>
-              <a:rPr lang="en-US" dirty="0"/>
-              <a:t>, Edward, Oscar, </a:t>
-            </a:r>
-            <a:r>
-              <a:rPr lang="en-US" dirty="0" err="1"/>
-              <a:t>Kristian</a:t>
-            </a:r>
-            <a:r>
-              <a:rPr lang="en-US" dirty="0"/>
-              <a:t>, </a:t>
-            </a:r>
-            <a:r>
-              <a:rPr lang="en-US" dirty="0" smtClean="0"/>
-              <a:t>Kelvin</a:t>
-            </a:r>
+              <a:t>Brian, Edward, Oscar, Kristian, Kelvin</a:t>
+            </a:r>
+          </a:p>
+          <a:p>
             <a:endParaRPr lang="en-US" dirty="0"/>
           </a:p>
         </p:txBody>
@@ -4359,284 +3171,13 @@
     </p:spTree>
     <p:extLst>
       <p:ext uri="{BB962C8B-B14F-4D97-AF65-F5344CB8AC3E}">
-        <p14:creationId xmlns:p14="http://schemas.microsoft.com/office/powerpoint/2010/main" val="1786804303"/>
+        <p14:creationId xmlns:p14="http://schemas.microsoft.com/office/powerpoint/2010/main" val="640056204"/>
       </p:ext>
     </p:extLst>
   </p:cSld>
   <p:clrMapOvr>
     <a:masterClrMapping/>
   </p:clrMapOvr>
-  <mc:AlternateContent xmlns:mc="http://schemas.openxmlformats.org/markup-compatibility/2006" xmlns:p14="http://schemas.microsoft.com/office/powerpoint/2010/main">
-    <mc:Choice Requires="p14">
-      <p:transition p14:dur="0"/>
-    </mc:Choice>
-    <mc:Fallback xmlns="">
-      <p:transition/>
-    </mc:Fallback>
-  </mc:AlternateContent>
-  <p:timing>
-    <p:tnLst>
-      <p:par>
-        <p:cTn id="1" dur="indefinite" restart="never" nodeType="tmRoot"/>
-      </p:par>
-    </p:tnLst>
-  </p:timing>
-</p:sld>
-</file>
-
-<file path=ppt/slides/slide10.xml><?xml version="1.0" encoding="utf-8"?>
-<p:sld xmlns:a="http://schemas.openxmlformats.org/drawingml/2006/main" xmlns:r="http://schemas.openxmlformats.org/officeDocument/2006/relationships" xmlns:p="http://schemas.openxmlformats.org/presentationml/2006/main">
-  <p:cSld>
-    <p:spTree>
-      <p:nvGrpSpPr>
-        <p:cNvPr id="1" name=""/>
-        <p:cNvGrpSpPr/>
-        <p:nvPr/>
-      </p:nvGrpSpPr>
-      <p:grpSpPr>
-        <a:xfrm>
-          <a:off x="0" y="0"/>
-          <a:ext cx="0" cy="0"/>
-          <a:chOff x="0" y="0"/>
-          <a:chExt cx="0" cy="0"/>
-        </a:xfrm>
-      </p:grpSpPr>
-      <p:sp>
-        <p:nvSpPr>
-          <p:cNvPr id="2" name="Title 1"/>
-          <p:cNvSpPr>
-            <a:spLocks noGrp="1"/>
-          </p:cNvSpPr>
-          <p:nvPr>
-            <p:ph type="title"/>
-          </p:nvPr>
-        </p:nvSpPr>
-        <p:spPr>
-          <a:xfrm>
-            <a:off x="457200" y="0"/>
-            <a:ext cx="8229600" cy="1143000"/>
-          </a:xfrm>
-        </p:spPr>
-        <p:txBody>
-          <a:bodyPr/>
-          <a:lstStyle/>
-          <a:p>
-            <a:r>
-              <a:rPr lang="en-US" dirty="0" smtClean="0"/>
-              <a:t>Time spent</a:t>
-            </a:r>
-            <a:endParaRPr lang="en-US" dirty="0"/>
-          </a:p>
-        </p:txBody>
-      </p:sp>
-      <p:graphicFrame>
-        <p:nvGraphicFramePr>
-          <p:cNvPr id="5" name="圖表 4"/>
-          <p:cNvGraphicFramePr/>
-          <p:nvPr/>
-        </p:nvGraphicFramePr>
-        <p:xfrm>
-          <a:off x="457200" y="1295400"/>
-          <a:ext cx="8458200" cy="5105400"/>
-        </p:xfrm>
-        <a:graphic>
-          <a:graphicData uri="http://schemas.openxmlformats.org/drawingml/2006/chart">
-            <c:chart xmlns:c="http://schemas.openxmlformats.org/drawingml/2006/chart" xmlns:r="http://schemas.openxmlformats.org/officeDocument/2006/relationships" r:id="rId2"/>
-          </a:graphicData>
-        </a:graphic>
-      </p:graphicFrame>
-      <p:sp>
-        <p:nvSpPr>
-          <p:cNvPr id="6" name="Title 1"/>
-          <p:cNvSpPr txBox="1">
-            <a:spLocks/>
-          </p:cNvSpPr>
-          <p:nvPr/>
-        </p:nvSpPr>
-        <p:spPr>
-          <a:xfrm>
-            <a:off x="0" y="6096000"/>
-            <a:ext cx="4191000" cy="762000"/>
-          </a:xfrm>
-          <a:prstGeom prst="rect">
-            <a:avLst/>
-          </a:prstGeom>
-        </p:spPr>
-        <p:txBody>
-          <a:bodyPr vert="horz" lIns="91440" tIns="45720" rIns="91440" bIns="45720" rtlCol="0" anchor="ctr">
-            <a:normAutofit/>
-          </a:bodyPr>
-          <a:lstStyle/>
-          <a:p>
-            <a:pPr marL="0" marR="0" lvl="0" indent="0" algn="ctr" defTabSz="914400" rtl="0" eaLnBrk="1" fontAlgn="auto" latinLnBrk="0" hangingPunct="1">
-              <a:lnSpc>
-                <a:spcPct val="100000"/>
-              </a:lnSpc>
-              <a:spcBef>
-                <a:spcPct val="0"/>
-              </a:spcBef>
-              <a:spcAft>
-                <a:spcPts val="0"/>
-              </a:spcAft>
-              <a:buClrTx/>
-              <a:buSzTx/>
-              <a:buFontTx/>
-              <a:buNone/>
-              <a:tabLst/>
-              <a:defRPr/>
-            </a:pPr>
-            <a:r>
-              <a:rPr kumimoji="0" lang="en-US" sz="2000" b="0" i="0" u="none" strike="noStrike" kern="1200" cap="none" spc="0" normalizeH="0" baseline="0" noProof="0" dirty="0" smtClean="0">
-                <a:ln>
-                  <a:noFill/>
-                </a:ln>
-                <a:solidFill>
-                  <a:schemeClr val="tx1"/>
-                </a:solidFill>
-                <a:effectLst/>
-                <a:uLnTx/>
-                <a:uFillTx/>
-                <a:latin typeface="+mj-lt"/>
-                <a:ea typeface="+mj-ea"/>
-                <a:cs typeface="+mj-cs"/>
-              </a:rPr>
-              <a:t>P.S. Expected time spent / Person : 16</a:t>
-            </a:r>
-            <a:endParaRPr kumimoji="0" lang="en-US" sz="2000" b="0" i="0" u="none" strike="noStrike" kern="1200" cap="none" spc="0" normalizeH="0" baseline="0" noProof="0" dirty="0">
-              <a:ln>
-                <a:noFill/>
-              </a:ln>
-              <a:solidFill>
-                <a:schemeClr val="tx1"/>
-              </a:solidFill>
-              <a:effectLst/>
-              <a:uLnTx/>
-              <a:uFillTx/>
-              <a:latin typeface="+mj-lt"/>
-              <a:ea typeface="+mj-ea"/>
-              <a:cs typeface="+mj-cs"/>
-            </a:endParaRPr>
-          </a:p>
-        </p:txBody>
-      </p:sp>
-    </p:spTree>
-    <p:extLst>
-      <p:ext uri="{BB962C8B-B14F-4D97-AF65-F5344CB8AC3E}">
-        <p14:creationId xmlns:p14="http://schemas.microsoft.com/office/powerpoint/2010/main" val="3838499978"/>
-      </p:ext>
-    </p:extLst>
-  </p:cSld>
-  <p:clrMapOvr>
-    <a:masterClrMapping/>
-  </p:clrMapOvr>
-  <mc:AlternateContent xmlns:mc="http://schemas.openxmlformats.org/markup-compatibility/2006" xmlns:p14="http://schemas.microsoft.com/office/powerpoint/2010/main">
-    <mc:Choice Requires="p14">
-      <p:transition p14:dur="0"/>
-    </mc:Choice>
-    <mc:Fallback xmlns="">
-      <p:transition/>
-    </mc:Fallback>
-  </mc:AlternateContent>
-  <p:timing>
-    <p:tnLst>
-      <p:par>
-        <p:cTn id="1" dur="indefinite" restart="never" nodeType="tmRoot"/>
-      </p:par>
-    </p:tnLst>
-  </p:timing>
-</p:sld>
-</file>
-
-<file path=ppt/slides/slide11.xml><?xml version="1.0" encoding="utf-8"?>
-<p:sld xmlns:a="http://schemas.openxmlformats.org/drawingml/2006/main" xmlns:r="http://schemas.openxmlformats.org/officeDocument/2006/relationships" xmlns:p="http://schemas.openxmlformats.org/presentationml/2006/main">
-  <p:cSld>
-    <p:spTree>
-      <p:nvGrpSpPr>
-        <p:cNvPr id="1" name=""/>
-        <p:cNvGrpSpPr/>
-        <p:nvPr/>
-      </p:nvGrpSpPr>
-      <p:grpSpPr>
-        <a:xfrm>
-          <a:off x="0" y="0"/>
-          <a:ext cx="0" cy="0"/>
-          <a:chOff x="0" y="0"/>
-          <a:chExt cx="0" cy="0"/>
-        </a:xfrm>
-      </p:grpSpPr>
-      <p:sp>
-        <p:nvSpPr>
-          <p:cNvPr id="2" name="Title 1"/>
-          <p:cNvSpPr>
-            <a:spLocks noGrp="1"/>
-          </p:cNvSpPr>
-          <p:nvPr>
-            <p:ph type="title"/>
-          </p:nvPr>
-        </p:nvSpPr>
-        <p:spPr>
-          <a:xfrm>
-            <a:off x="457200" y="0"/>
-            <a:ext cx="8229600" cy="1143000"/>
-          </a:xfrm>
-        </p:spPr>
-        <p:txBody>
-          <a:bodyPr/>
-          <a:lstStyle/>
-          <a:p>
-            <a:r>
-              <a:rPr lang="en-US" dirty="0" smtClean="0"/>
-              <a:t>Time spent</a:t>
-            </a:r>
-            <a:endParaRPr lang="en-US" dirty="0"/>
-          </a:p>
-        </p:txBody>
-      </p:sp>
-      <p:graphicFrame>
-        <p:nvGraphicFramePr>
-          <p:cNvPr id="6" name="內容版面配置區 5"/>
-          <p:cNvGraphicFramePr>
-            <a:graphicFrameLocks noGrp="1"/>
-          </p:cNvGraphicFramePr>
-          <p:nvPr>
-            <p:ph idx="1"/>
-          </p:nvPr>
-        </p:nvGraphicFramePr>
-        <p:xfrm>
-          <a:off x="0" y="1066800"/>
-          <a:ext cx="9144000" cy="5562600"/>
-        </p:xfrm>
-        <a:graphic>
-          <a:graphicData uri="http://schemas.openxmlformats.org/drawingml/2006/chart">
-            <c:chart xmlns:c="http://schemas.openxmlformats.org/drawingml/2006/chart" xmlns:r="http://schemas.openxmlformats.org/officeDocument/2006/relationships" r:id="rId2"/>
-          </a:graphicData>
-        </a:graphic>
-      </p:graphicFrame>
-    </p:spTree>
-    <p:extLst>
-      <p:ext uri="{BB962C8B-B14F-4D97-AF65-F5344CB8AC3E}">
-        <p14:creationId xmlns:p14="http://schemas.microsoft.com/office/powerpoint/2010/main" val="520266324"/>
-      </p:ext>
-    </p:extLst>
-  </p:cSld>
-  <p:clrMapOvr>
-    <a:masterClrMapping/>
-  </p:clrMapOvr>
-  <mc:AlternateContent xmlns:mc="http://schemas.openxmlformats.org/markup-compatibility/2006" xmlns:p14="http://schemas.microsoft.com/office/powerpoint/2010/main">
-    <mc:Choice Requires="p14">
-      <p:transition p14:dur="0"/>
-    </mc:Choice>
-    <mc:Fallback xmlns="">
-      <p:transition/>
-    </mc:Fallback>
-  </mc:AlternateContent>
-  <p:timing>
-    <p:tnLst>
-      <p:par>
-        <p:cTn id="1" dur="indefinite" restart="never" nodeType="tmRoot"/>
-      </p:par>
-    </p:tnLst>
-  </p:timing>
 </p:sld>
 </file>
 
@@ -4674,7 +3215,7 @@
           <a:p>
             <a:r>
               <a:rPr lang="en-US" dirty="0" smtClean="0"/>
-              <a:t>About our group</a:t>
+              <a:t>Who we are</a:t>
             </a:r>
             <a:endParaRPr lang="en-US" dirty="0"/>
           </a:p>
@@ -4697,29 +3238,22 @@
           <a:p>
             <a:r>
               <a:rPr lang="en-US" dirty="0" smtClean="0"/>
-              <a:t>Meetings – weekly formal meeting plus additional informal meetings throughout the working week</a:t>
+              <a:t>Spiral model</a:t>
             </a:r>
           </a:p>
           <a:p>
             <a:r>
               <a:rPr lang="en-US" dirty="0" smtClean="0"/>
-              <a:t>Dynamics – we get on well (we stormed during sad. Now we are performing). Smooth progression so far.</a:t>
-            </a:r>
-          </a:p>
-          <a:p>
+              <a:t>Using Google </a:t>
+            </a:r>
+            <a:r>
+              <a:rPr lang="en-US" dirty="0" err="1" smtClean="0"/>
+              <a:t>WBPro</a:t>
+            </a:r>
             <a:r>
               <a:rPr lang="en-US" dirty="0" smtClean="0"/>
-              <a:t>Spiral development model</a:t>
-            </a:r>
-          </a:p>
-          <a:p>
-            <a:endParaRPr lang="en-US" dirty="0" smtClean="0"/>
-          </a:p>
-          <a:p>
-            <a:endParaRPr lang="en-US" dirty="0" smtClean="0"/>
-          </a:p>
-          <a:p>
-            <a:endParaRPr lang="en-US" dirty="0" smtClean="0"/>
+              <a:t> to build GUI</a:t>
+            </a:r>
           </a:p>
           <a:p>
             <a:endParaRPr lang="en-US" dirty="0" smtClean="0"/>
@@ -4732,28 +3266,13 @@
     </p:spTree>
     <p:extLst>
       <p:ext uri="{BB962C8B-B14F-4D97-AF65-F5344CB8AC3E}">
-        <p14:creationId xmlns:p14="http://schemas.microsoft.com/office/powerpoint/2010/main" val="3707052916"/>
+        <p14:creationId xmlns:p14="http://schemas.microsoft.com/office/powerpoint/2010/main" val="1777702177"/>
       </p:ext>
     </p:extLst>
   </p:cSld>
   <p:clrMapOvr>
     <a:masterClrMapping/>
   </p:clrMapOvr>
-  <mc:AlternateContent xmlns:mc="http://schemas.openxmlformats.org/markup-compatibility/2006" xmlns:p14="http://schemas.microsoft.com/office/powerpoint/2010/main">
-    <mc:Choice Requires="p14">
-      <p:transition p14:dur="0"/>
-    </mc:Choice>
-    <mc:Fallback xmlns="">
-      <p:transition/>
-    </mc:Fallback>
-  </mc:AlternateContent>
-  <p:timing>
-    <p:tnLst>
-      <p:par>
-        <p:cTn id="1" dur="indefinite" restart="never" nodeType="tmRoot"/>
-      </p:par>
-    </p:tnLst>
-  </p:timing>
 </p:sld>
 </file>
 
@@ -4786,100 +3305,100 @@
         </p:nvSpPr>
         <p:spPr/>
         <p:txBody>
+          <a:bodyPr/>
+          <a:lstStyle/>
+          <a:p>
+            <a:r>
+              <a:rPr lang="en-US" dirty="0" smtClean="0"/>
+              <a:t>Broad design decisions</a:t>
+            </a:r>
+            <a:endParaRPr lang="en-US" dirty="0"/>
+          </a:p>
+        </p:txBody>
+      </p:sp>
+      <p:sp>
+        <p:nvSpPr>
+          <p:cNvPr id="3" name="Content Placeholder 2"/>
+          <p:cNvSpPr>
+            <a:spLocks noGrp="1"/>
+          </p:cNvSpPr>
+          <p:nvPr>
+            <p:ph idx="1"/>
+          </p:nvPr>
+        </p:nvSpPr>
+        <p:spPr/>
+        <p:txBody>
           <a:bodyPr>
-            <a:normAutofit fontScale="90000"/>
+            <a:normAutofit lnSpcReduction="10000"/>
           </a:bodyPr>
           <a:lstStyle/>
           <a:p>
             <a:r>
               <a:rPr lang="en-US" dirty="0" smtClean="0"/>
-              <a:t>Language and tools for development</a:t>
-            </a:r>
-            <a:endParaRPr lang="en-US" dirty="0"/>
-          </a:p>
-        </p:txBody>
-      </p:sp>
-      <p:sp>
-        <p:nvSpPr>
-          <p:cNvPr id="3" name="Content Placeholder 2"/>
-          <p:cNvSpPr>
-            <a:spLocks noGrp="1"/>
-          </p:cNvSpPr>
-          <p:nvPr>
-            <p:ph idx="1"/>
-          </p:nvPr>
-        </p:nvSpPr>
-        <p:spPr/>
-        <p:txBody>
-          <a:bodyPr>
-            <a:normAutofit/>
-          </a:bodyPr>
-          <a:lstStyle/>
+              <a:t>Simple and minimalistic</a:t>
+            </a:r>
+          </a:p>
           <a:p>
             <a:r>
               <a:rPr lang="en-US" dirty="0" smtClean="0"/>
-              <a:t>SVN: Unix: terminal; Windows: </a:t>
+              <a:t>We aim to unclutter the information shown</a:t>
+            </a:r>
+          </a:p>
+          <a:p>
+            <a:pPr lvl="1"/>
+            <a:r>
+              <a:rPr lang="en-US" dirty="0" smtClean="0"/>
+              <a:t>By hiding data entry inside menus &amp; dialogs</a:t>
+            </a:r>
+          </a:p>
+          <a:p>
+            <a:pPr lvl="1"/>
+            <a:r>
+              <a:rPr lang="en-US" dirty="0" smtClean="0"/>
+              <a:t>By </a:t>
             </a:r>
             <a:r>
               <a:rPr lang="en-US" dirty="0" err="1" smtClean="0"/>
-              <a:t>TortoiseSVN</a:t>
-            </a:r>
-            <a:endParaRPr lang="en-US" dirty="0" smtClean="0"/>
-          </a:p>
-          <a:p>
+              <a:t>organising</a:t>
+            </a:r>
             <a:r>
               <a:rPr lang="en-US" dirty="0" smtClean="0"/>
-              <a:t>Eclipse</a:t>
+              <a:t> the main view to show in formation</a:t>
+            </a:r>
+          </a:p>
+          <a:p>
+            <a:r>
+              <a:rPr lang="en-US" dirty="0" smtClean="0"/>
+              <a:t>We aim to provide flexibility and utility</a:t>
             </a:r>
           </a:p>
           <a:p>
             <a:pPr lvl="1"/>
             <a:r>
               <a:rPr lang="en-US" dirty="0" smtClean="0"/>
-              <a:t>Plugin: Google </a:t>
-            </a:r>
+              <a:t>Zoom, panning and scale </a:t>
+            </a:r>
+          </a:p>
+          <a:p>
+            <a:pPr lvl="1"/>
             <a:r>
               <a:rPr lang="en-US" dirty="0" err="1" smtClean="0"/>
-              <a:t>WBPro</a:t>
+              <a:t>Colour</a:t>
             </a:r>
             <a:r>
               <a:rPr lang="en-US" dirty="0" smtClean="0"/>
-              <a:t>, SVN team</a:t>
-            </a:r>
-          </a:p>
-          <a:p>
+              <a:t> coded keys for values</a:t>
+            </a:r>
+          </a:p>
+          <a:p>
+            <a:pPr lvl="1"/>
             <a:r>
               <a:rPr lang="en-US" dirty="0" smtClean="0"/>
-              <a:t>Java</a:t>
+              <a:t>Advanced runway parameters and XML address books</a:t>
             </a:r>
           </a:p>
           <a:p>
             <a:pPr lvl="1"/>
-            <a:r>
-              <a:rPr lang="en-US" dirty="0" smtClean="0"/>
-              <a:t>GUI: Swing</a:t>
-            </a:r>
-          </a:p>
-          <a:p>
-            <a:pPr lvl="2"/>
-            <a:r>
-              <a:rPr lang="en-US" dirty="0" smtClean="0"/>
-              <a:t>Lightweight</a:t>
-            </a:r>
-          </a:p>
-          <a:p>
-            <a:pPr lvl="2"/>
-            <a:r>
-              <a:rPr lang="en-US" dirty="0" smtClean="0"/>
-              <a:t>Multi platform compatibility</a:t>
-            </a:r>
-          </a:p>
-          <a:p>
-            <a:pPr lvl="1"/>
-            <a:r>
-              <a:rPr lang="en-US" dirty="0" smtClean="0"/>
-              <a:t>Model: XML</a:t>
-            </a:r>
             <a:endParaRPr lang="en-US" dirty="0"/>
           </a:p>
         </p:txBody>
@@ -4887,908 +3406,17 @@
     </p:spTree>
     <p:extLst>
       <p:ext uri="{BB962C8B-B14F-4D97-AF65-F5344CB8AC3E}">
-        <p14:creationId xmlns:p14="http://schemas.microsoft.com/office/powerpoint/2010/main" val="2599285141"/>
+        <p14:creationId xmlns:p14="http://schemas.microsoft.com/office/powerpoint/2010/main" val="1321375335"/>
       </p:ext>
     </p:extLst>
   </p:cSld>
   <p:clrMapOvr>
     <a:masterClrMapping/>
   </p:clrMapOvr>
-  <mc:AlternateContent xmlns:mc="http://schemas.openxmlformats.org/markup-compatibility/2006" xmlns:p14="http://schemas.microsoft.com/office/powerpoint/2010/main">
-    <mc:Choice Requires="p14">
-      <p:transition p14:dur="0"/>
-    </mc:Choice>
-    <mc:Fallback xmlns="">
-      <p:transition/>
-    </mc:Fallback>
-  </mc:AlternateContent>
-  <p:timing>
-    <p:tnLst>
-      <p:par>
-        <p:cTn id="1" dur="indefinite" restart="never" nodeType="tmRoot"/>
-      </p:par>
-    </p:tnLst>
-  </p:timing>
-</p:sld>
-</file>
-
-<file path=ppt/slides/slide4.xml><?xml version="1.0" encoding="utf-8"?>
-<p:sld xmlns:a="http://schemas.openxmlformats.org/drawingml/2006/main" xmlns:r="http://schemas.openxmlformats.org/officeDocument/2006/relationships" xmlns:p="http://schemas.openxmlformats.org/presentationml/2006/main">
-  <p:cSld>
-    <p:spTree>
-      <p:nvGrpSpPr>
-        <p:cNvPr id="1" name=""/>
-        <p:cNvGrpSpPr/>
-        <p:nvPr/>
-      </p:nvGrpSpPr>
-      <p:grpSpPr>
-        <a:xfrm>
-          <a:off x="0" y="0"/>
-          <a:ext cx="0" cy="0"/>
-          <a:chOff x="0" y="0"/>
-          <a:chExt cx="0" cy="0"/>
-        </a:xfrm>
-      </p:grpSpPr>
-      <p:pic>
-        <p:nvPicPr>
-          <p:cNvPr id="1026" name="Picture 2" descr="D:\DropBox\Dropbox\Soton\YR2 SEM2\COMP2012 SEG\Sources Files\seg2012gp9\doc\Analysis Design Testing\SEG_use_case_diagram.jpg"/>
-          <p:cNvPicPr>
-            <a:picLocks noChangeAspect="1" noChangeArrowheads="1"/>
-          </p:cNvPicPr>
-          <p:nvPr/>
-        </p:nvPicPr>
-        <p:blipFill>
-          <a:blip r:embed="rId2" cstate="print"/>
-          <a:srcRect t="9079"/>
-          <a:stretch>
-            <a:fillRect/>
-          </a:stretch>
-        </p:blipFill>
-        <p:spPr bwMode="auto">
-          <a:xfrm>
-            <a:off x="1219200" y="-9525"/>
-            <a:ext cx="6920906" cy="6867525"/>
-          </a:xfrm>
-          <a:prstGeom prst="rect">
-            <a:avLst/>
-          </a:prstGeom>
-          <a:noFill/>
-        </p:spPr>
-      </p:pic>
-    </p:spTree>
-  </p:cSld>
-  <p:clrMapOvr>
-    <a:masterClrMapping/>
-  </p:clrMapOvr>
-  <mc:AlternateContent xmlns:mc="http://schemas.openxmlformats.org/markup-compatibility/2006" xmlns:p14="http://schemas.microsoft.com/office/powerpoint/2010/main">
-    <mc:Choice Requires="p14">
-      <p:transition p14:dur="0"/>
-    </mc:Choice>
-    <mc:Fallback xmlns="">
-      <p:transition/>
-    </mc:Fallback>
-  </mc:AlternateContent>
-  <p:timing>
-    <p:tnLst>
-      <p:par>
-        <p:cTn id="1" dur="indefinite" restart="never" nodeType="tmRoot"/>
-      </p:par>
-    </p:tnLst>
-  </p:timing>
-</p:sld>
-</file>
-
-<file path=ppt/slides/slide5.xml><?xml version="1.0" encoding="utf-8"?>
-<p:sld xmlns:a="http://schemas.openxmlformats.org/drawingml/2006/main" xmlns:r="http://schemas.openxmlformats.org/officeDocument/2006/relationships" xmlns:p="http://schemas.openxmlformats.org/presentationml/2006/main">
-  <p:cSld>
-    <p:spTree>
-      <p:nvGrpSpPr>
-        <p:cNvPr id="1" name=""/>
-        <p:cNvGrpSpPr/>
-        <p:nvPr/>
-      </p:nvGrpSpPr>
-      <p:grpSpPr>
-        <a:xfrm>
-          <a:off x="0" y="0"/>
-          <a:ext cx="0" cy="0"/>
-          <a:chOff x="0" y="0"/>
-          <a:chExt cx="0" cy="0"/>
-        </a:xfrm>
-      </p:grpSpPr>
-      <p:sp>
-        <p:nvSpPr>
-          <p:cNvPr id="2" name="Title 1"/>
-          <p:cNvSpPr>
-            <a:spLocks noGrp="1"/>
-          </p:cNvSpPr>
-          <p:nvPr>
-            <p:ph type="title"/>
-          </p:nvPr>
-        </p:nvSpPr>
-        <p:spPr/>
-        <p:txBody>
-          <a:bodyPr>
-            <a:normAutofit/>
-          </a:bodyPr>
-          <a:lstStyle/>
-          <a:p>
-            <a:r>
-              <a:rPr lang="en-US" dirty="0"/>
-              <a:t>E</a:t>
-            </a:r>
-            <a:r>
-              <a:rPr lang="en-US" dirty="0" smtClean="0"/>
-              <a:t>vidence </a:t>
-            </a:r>
-            <a:r>
-              <a:rPr lang="en-US" dirty="0"/>
-              <a:t>of early analysis &amp; design</a:t>
-            </a:r>
-          </a:p>
-        </p:txBody>
-      </p:sp>
-      <p:sp>
-        <p:nvSpPr>
-          <p:cNvPr id="3" name="Content Placeholder 2"/>
-          <p:cNvSpPr>
-            <a:spLocks noGrp="1"/>
-          </p:cNvSpPr>
-          <p:nvPr>
-            <p:ph idx="1"/>
-          </p:nvPr>
-        </p:nvSpPr>
-        <p:spPr/>
-        <p:txBody>
-          <a:bodyPr/>
-          <a:lstStyle/>
-          <a:p>
-            <a:r>
-              <a:rPr lang="en-US" dirty="0" smtClean="0"/>
-              <a:t>MVC formed the core of our project</a:t>
-            </a:r>
-          </a:p>
-          <a:p>
-            <a:pPr lvl="1"/>
-            <a:r>
-              <a:rPr lang="en-US" dirty="0" smtClean="0"/>
-              <a:t>Project planning</a:t>
-            </a:r>
-          </a:p>
-          <a:p>
-            <a:pPr lvl="1"/>
-            <a:r>
-              <a:rPr lang="en-US" dirty="0" smtClean="0"/>
-              <a:t>Design</a:t>
-            </a:r>
-          </a:p>
-          <a:p>
-            <a:r>
-              <a:rPr lang="en-US" dirty="0" smtClean="0"/>
-              <a:t>General analysis and design: class diagrams and use case diagrams</a:t>
-            </a:r>
-          </a:p>
-        </p:txBody>
-      </p:sp>
-    </p:spTree>
-    <p:extLst>
-      <p:ext uri="{BB962C8B-B14F-4D97-AF65-F5344CB8AC3E}">
-        <p14:creationId xmlns:p14="http://schemas.microsoft.com/office/powerpoint/2010/main" val="1684329172"/>
-      </p:ext>
-    </p:extLst>
-  </p:cSld>
-  <p:clrMapOvr>
-    <a:masterClrMapping/>
-  </p:clrMapOvr>
-  <mc:AlternateContent xmlns:mc="http://schemas.openxmlformats.org/markup-compatibility/2006" xmlns:p14="http://schemas.microsoft.com/office/powerpoint/2010/main">
-    <mc:Choice Requires="p14">
-      <p:transition p14:dur="0"/>
-    </mc:Choice>
-    <mc:Fallback xmlns="">
-      <p:transition/>
-    </mc:Fallback>
-  </mc:AlternateContent>
-  <p:timing>
-    <p:tnLst>
-      <p:par>
-        <p:cTn id="1" dur="indefinite" restart="never" nodeType="tmRoot"/>
-      </p:par>
-    </p:tnLst>
-  </p:timing>
-</p:sld>
-</file>
-
-<file path=ppt/slides/slide6.xml><?xml version="1.0" encoding="utf-8"?>
-<p:sld xmlns:a="http://schemas.openxmlformats.org/drawingml/2006/main" xmlns:r="http://schemas.openxmlformats.org/officeDocument/2006/relationships" xmlns:p="http://schemas.openxmlformats.org/presentationml/2006/main">
-  <p:cSld>
-    <p:spTree>
-      <p:nvGrpSpPr>
-        <p:cNvPr id="1" name=""/>
-        <p:cNvGrpSpPr/>
-        <p:nvPr/>
-      </p:nvGrpSpPr>
-      <p:grpSpPr>
-        <a:xfrm>
-          <a:off x="0" y="0"/>
-          <a:ext cx="0" cy="0"/>
-          <a:chOff x="0" y="0"/>
-          <a:chExt cx="0" cy="0"/>
-        </a:xfrm>
-      </p:grpSpPr>
-      <p:sp>
-        <p:nvSpPr>
-          <p:cNvPr id="2" name="Title 1"/>
-          <p:cNvSpPr>
-            <a:spLocks noGrp="1"/>
-          </p:cNvSpPr>
-          <p:nvPr>
-            <p:ph type="title"/>
-          </p:nvPr>
-        </p:nvSpPr>
-        <p:spPr/>
-        <p:txBody>
-          <a:bodyPr/>
-          <a:lstStyle/>
-          <a:p>
-            <a:r>
-              <a:rPr lang="en-US" dirty="0" smtClean="0"/>
-              <a:t>Architectural concepts</a:t>
-            </a:r>
-            <a:endParaRPr lang="en-US" dirty="0"/>
-          </a:p>
-        </p:txBody>
-      </p:sp>
-      <p:pic>
-        <p:nvPicPr>
-          <p:cNvPr id="1027" name="Picture 3" descr="C:\Users\edward\Dropbox\src\year2\seg2012gp9\src\ClassDiagrams\img\classDiagram.png"/>
-          <p:cNvPicPr>
-            <a:picLocks noChangeAspect="1" noChangeArrowheads="1"/>
-          </p:cNvPicPr>
-          <p:nvPr/>
-        </p:nvPicPr>
-        <p:blipFill>
-          <a:blip r:embed="rId2" cstate="print">
-            <a:extLst>
-              <a:ext uri="{28A0092B-C50C-407E-A947-70E740481C1C}">
-                <a14:useLocalDpi xmlns:a14="http://schemas.microsoft.com/office/drawing/2010/main" val="0"/>
-              </a:ext>
-            </a:extLst>
-          </a:blip>
-          <a:srcRect/>
-          <a:stretch>
-            <a:fillRect/>
-          </a:stretch>
-        </p:blipFill>
-        <p:spPr bwMode="auto">
-          <a:xfrm>
-            <a:off x="228600" y="1828800"/>
-            <a:ext cx="8681578" cy="3971925"/>
-          </a:xfrm>
-          <a:prstGeom prst="rect">
-            <a:avLst/>
-          </a:prstGeom>
-        </p:spPr>
-        <p:style>
-          <a:lnRef idx="2">
-            <a:schemeClr val="accent5"/>
-          </a:lnRef>
-          <a:fillRef idx="1">
-            <a:schemeClr val="lt1"/>
-          </a:fillRef>
-          <a:effectRef idx="0">
-            <a:schemeClr val="accent5"/>
-          </a:effectRef>
-          <a:fontRef idx="minor">
-            <a:schemeClr val="dk1"/>
-          </a:fontRef>
-        </p:style>
-      </p:pic>
-    </p:spTree>
-    <p:extLst>
-      <p:ext uri="{BB962C8B-B14F-4D97-AF65-F5344CB8AC3E}">
-        <p14:creationId xmlns:p14="http://schemas.microsoft.com/office/powerpoint/2010/main" val="869076350"/>
-      </p:ext>
-    </p:extLst>
-  </p:cSld>
-  <p:clrMapOvr>
-    <a:masterClrMapping/>
-  </p:clrMapOvr>
-  <mc:AlternateContent xmlns:mc="http://schemas.openxmlformats.org/markup-compatibility/2006" xmlns:p14="http://schemas.microsoft.com/office/powerpoint/2010/main">
-    <mc:Choice Requires="p14">
-      <p:transition p14:dur="0"/>
-    </mc:Choice>
-    <mc:Fallback xmlns="">
-      <p:transition/>
-    </mc:Fallback>
-  </mc:AlternateContent>
-  <p:timing>
-    <p:tnLst>
-      <p:par>
-        <p:cTn id="1" dur="indefinite" restart="never" nodeType="tmRoot"/>
-      </p:par>
-    </p:tnLst>
-  </p:timing>
-</p:sld>
-</file>
-
-<file path=ppt/slides/slide7.xml><?xml version="1.0" encoding="utf-8"?>
-<p:sld xmlns:a="http://schemas.openxmlformats.org/drawingml/2006/main" xmlns:r="http://schemas.openxmlformats.org/officeDocument/2006/relationships" xmlns:p="http://schemas.openxmlformats.org/presentationml/2006/main">
-  <p:cSld>
-    <p:spTree>
-      <p:nvGrpSpPr>
-        <p:cNvPr id="1" name=""/>
-        <p:cNvGrpSpPr/>
-        <p:nvPr/>
-      </p:nvGrpSpPr>
-      <p:grpSpPr>
-        <a:xfrm>
-          <a:off x="0" y="0"/>
-          <a:ext cx="0" cy="0"/>
-          <a:chOff x="0" y="0"/>
-          <a:chExt cx="0" cy="0"/>
-        </a:xfrm>
-      </p:grpSpPr>
-      <p:sp>
-        <p:nvSpPr>
-          <p:cNvPr id="4" name="Rectangle 3"/>
-          <p:cNvSpPr/>
-          <p:nvPr/>
-        </p:nvSpPr>
-        <p:spPr>
-          <a:xfrm>
-            <a:off x="3124200" y="2514600"/>
-            <a:ext cx="4419600" cy="1015663"/>
-          </a:xfrm>
-          <a:prstGeom prst="rect">
-            <a:avLst/>
-          </a:prstGeom>
-        </p:spPr>
-        <p:txBody>
-          <a:bodyPr wrap="square">
-            <a:spAutoFit/>
-          </a:bodyPr>
-          <a:lstStyle/>
-          <a:p>
-            <a:r>
-              <a:rPr lang="en-US" sz="6000" i="1" spc="-300" dirty="0" smtClean="0">
-                <a:latin typeface="Comic Sans MS" pitchFamily="66" charset="0"/>
-              </a:rPr>
-              <a:t>Demo</a:t>
-            </a:r>
-          </a:p>
-        </p:txBody>
-      </p:sp>
-    </p:spTree>
-    <p:extLst>
-      <p:ext uri="{BB962C8B-B14F-4D97-AF65-F5344CB8AC3E}">
-        <p14:creationId xmlns:p14="http://schemas.microsoft.com/office/powerpoint/2010/main" val="1161608251"/>
-      </p:ext>
-    </p:extLst>
-  </p:cSld>
-  <p:clrMapOvr>
-    <a:masterClrMapping/>
-  </p:clrMapOvr>
-  <mc:AlternateContent xmlns:mc="http://schemas.openxmlformats.org/markup-compatibility/2006" xmlns:p14="http://schemas.microsoft.com/office/powerpoint/2010/main">
-    <mc:Choice Requires="p14">
-      <p:transition p14:dur="0"/>
-    </mc:Choice>
-    <mc:Fallback xmlns="">
-      <p:transition/>
-    </mc:Fallback>
-  </mc:AlternateContent>
-  <p:timing>
-    <p:tnLst>
-      <p:par>
-        <p:cTn id="1" dur="indefinite" restart="never" nodeType="tmRoot"/>
-      </p:par>
-    </p:tnLst>
-  </p:timing>
-</p:sld>
-</file>
-
-<file path=ppt/slides/slide8.xml><?xml version="1.0" encoding="utf-8"?>
-<p:sld xmlns:a="http://schemas.openxmlformats.org/drawingml/2006/main" xmlns:r="http://schemas.openxmlformats.org/officeDocument/2006/relationships" xmlns:p="http://schemas.openxmlformats.org/presentationml/2006/main">
-  <p:cSld>
-    <p:spTree>
-      <p:nvGrpSpPr>
-        <p:cNvPr id="1" name=""/>
-        <p:cNvGrpSpPr/>
-        <p:nvPr/>
-      </p:nvGrpSpPr>
-      <p:grpSpPr>
-        <a:xfrm>
-          <a:off x="0" y="0"/>
-          <a:ext cx="0" cy="0"/>
-          <a:chOff x="0" y="0"/>
-          <a:chExt cx="0" cy="0"/>
-        </a:xfrm>
-      </p:grpSpPr>
-      <p:sp>
-        <p:nvSpPr>
-          <p:cNvPr id="2" name="Title 1"/>
-          <p:cNvSpPr>
-            <a:spLocks noGrp="1"/>
-          </p:cNvSpPr>
-          <p:nvPr>
-            <p:ph type="title"/>
-          </p:nvPr>
-        </p:nvSpPr>
-        <p:spPr/>
-        <p:txBody>
-          <a:bodyPr/>
-          <a:lstStyle/>
-          <a:p>
-            <a:r>
-              <a:rPr lang="en-US" dirty="0" smtClean="0"/>
-              <a:t>Project so far</a:t>
-            </a:r>
-            <a:endParaRPr lang="en-US" dirty="0"/>
-          </a:p>
-        </p:txBody>
-      </p:sp>
-      <p:sp>
-        <p:nvSpPr>
-          <p:cNvPr id="3" name="Content Placeholder 2"/>
-          <p:cNvSpPr>
-            <a:spLocks noGrp="1"/>
-          </p:cNvSpPr>
-          <p:nvPr>
-            <p:ph idx="1"/>
-          </p:nvPr>
-        </p:nvSpPr>
-        <p:spPr/>
-        <p:txBody>
-          <a:bodyPr/>
-          <a:lstStyle/>
-          <a:p>
-            <a:r>
-              <a:rPr lang="en-US" dirty="0" smtClean="0"/>
-              <a:t>Current state: programming, testing, refining analysis and design</a:t>
-            </a:r>
-          </a:p>
-          <a:p>
-            <a:r>
-              <a:rPr lang="en-US" dirty="0" smtClean="0"/>
-              <a:t>Plans: We are on target in terms of the work allocations and Gantt chart times</a:t>
-            </a:r>
-          </a:p>
-          <a:p>
-            <a:r>
-              <a:rPr lang="en-US" dirty="0" smtClean="0"/>
-              <a:t>Time budget: On budget</a:t>
-            </a:r>
-            <a:endParaRPr lang="en-US" dirty="0"/>
-          </a:p>
-        </p:txBody>
-      </p:sp>
-    </p:spTree>
-    <p:extLst>
-      <p:ext uri="{BB962C8B-B14F-4D97-AF65-F5344CB8AC3E}">
-        <p14:creationId xmlns:p14="http://schemas.microsoft.com/office/powerpoint/2010/main" val="68516678"/>
-      </p:ext>
-    </p:extLst>
-  </p:cSld>
-  <p:clrMapOvr>
-    <a:masterClrMapping/>
-  </p:clrMapOvr>
-  <mc:AlternateContent xmlns:mc="http://schemas.openxmlformats.org/markup-compatibility/2006" xmlns:p14="http://schemas.microsoft.com/office/powerpoint/2010/main">
-    <mc:Choice Requires="p14">
-      <p:transition p14:dur="0"/>
-    </mc:Choice>
-    <mc:Fallback xmlns="">
-      <p:transition/>
-    </mc:Fallback>
-  </mc:AlternateContent>
-  <p:timing>
-    <p:tnLst>
-      <p:par>
-        <p:cTn id="1" dur="indefinite" restart="never" nodeType="tmRoot"/>
-      </p:par>
-    </p:tnLst>
-  </p:timing>
-</p:sld>
-</file>
-
-<file path=ppt/slides/slide9.xml><?xml version="1.0" encoding="utf-8"?>
-<p:sld xmlns:a="http://schemas.openxmlformats.org/drawingml/2006/main" xmlns:r="http://schemas.openxmlformats.org/officeDocument/2006/relationships" xmlns:p="http://schemas.openxmlformats.org/presentationml/2006/main">
-  <p:cSld>
-    <p:spTree>
-      <p:nvGrpSpPr>
-        <p:cNvPr id="1" name=""/>
-        <p:cNvGrpSpPr/>
-        <p:nvPr/>
-      </p:nvGrpSpPr>
-      <p:grpSpPr>
-        <a:xfrm>
-          <a:off x="0" y="0"/>
-          <a:ext cx="0" cy="0"/>
-          <a:chOff x="0" y="0"/>
-          <a:chExt cx="0" cy="0"/>
-        </a:xfrm>
-      </p:grpSpPr>
-      <p:sp>
-        <p:nvSpPr>
-          <p:cNvPr id="3" name="Content Placeholder 2"/>
-          <p:cNvSpPr>
-            <a:spLocks noGrp="1"/>
-          </p:cNvSpPr>
-          <p:nvPr>
-            <p:ph idx="1"/>
-          </p:nvPr>
-        </p:nvSpPr>
-        <p:spPr/>
-        <p:txBody>
-          <a:bodyPr/>
-          <a:lstStyle/>
-          <a:p>
-            <a:endParaRPr lang="en-GB"/>
-          </a:p>
-        </p:txBody>
-      </p:sp>
-      <p:pic>
-        <p:nvPicPr>
-          <p:cNvPr id="1026" name="Picture 2" descr="C:\Users\User\Downloads\SmartSheetExport (1).png"/>
-          <p:cNvPicPr>
-            <a:picLocks noChangeAspect="1" noChangeArrowheads="1"/>
-          </p:cNvPicPr>
-          <p:nvPr/>
-        </p:nvPicPr>
-        <p:blipFill>
-          <a:blip r:embed="rId2" cstate="print">
-            <a:extLst>
-              <a:ext uri="{28A0092B-C50C-407E-A947-70E740481C1C}">
-                <a14:useLocalDpi xmlns:a14="http://schemas.microsoft.com/office/drawing/2010/main" val="0"/>
-              </a:ext>
-            </a:extLst>
-          </a:blip>
-          <a:srcRect/>
-          <a:stretch>
-            <a:fillRect/>
-          </a:stretch>
-        </p:blipFill>
-        <p:spPr bwMode="auto">
-          <a:xfrm>
-            <a:off x="0" y="959902"/>
-            <a:ext cx="9144000" cy="4938195"/>
-          </a:xfrm>
-          <a:prstGeom prst="rect">
-            <a:avLst/>
-          </a:prstGeom>
-          <a:noFill/>
-          <a:extLst>
-            <a:ext uri="{909E8E84-426E-40DD-AFC4-6F175D3DCCD1}">
-              <a14:hiddenFill xmlns:a14="http://schemas.microsoft.com/office/drawing/2010/main">
-                <a:solidFill>
-                  <a:srgbClr val="FFFFFF"/>
-                </a:solidFill>
-              </a14:hiddenFill>
-            </a:ext>
-          </a:extLst>
-        </p:spPr>
-      </p:pic>
-    </p:spTree>
-    <p:extLst>
-      <p:ext uri="{BB962C8B-B14F-4D97-AF65-F5344CB8AC3E}">
-        <p14:creationId xmlns:p14="http://schemas.microsoft.com/office/powerpoint/2010/main" val="1726562854"/>
-      </p:ext>
-    </p:extLst>
-  </p:cSld>
-  <p:clrMapOvr>
-    <a:masterClrMapping/>
-  </p:clrMapOvr>
-  <mc:AlternateContent xmlns:mc="http://schemas.openxmlformats.org/markup-compatibility/2006" xmlns:p14="http://schemas.microsoft.com/office/powerpoint/2010/main">
-    <mc:Choice Requires="p14">
-      <p:transition p14:dur="0"/>
-    </mc:Choice>
-    <mc:Fallback xmlns="">
-      <p:transition/>
-    </mc:Fallback>
-  </mc:AlternateContent>
-  <p:timing>
-    <p:tnLst>
-      <p:par>
-        <p:cTn id="1" dur="indefinite" restart="never" nodeType="tmRoot"/>
-      </p:par>
-    </p:tnLst>
-  </p:timing>
 </p:sld>
 </file>
 
 <file path=ppt/theme/theme1.xml><?xml version="1.0" encoding="utf-8"?>
-<a:theme xmlns:a="http://schemas.openxmlformats.org/drawingml/2006/main" name="Office Theme">
-  <a:themeElements>
-    <a:clrScheme name="Office">
-      <a:dk1>
-        <a:sysClr val="windowText" lastClr="000000"/>
-      </a:dk1>
-      <a:lt1>
-        <a:sysClr val="window" lastClr="FFFFFF"/>
-      </a:lt1>
-      <a:dk2>
-        <a:srgbClr val="1F497D"/>
-      </a:dk2>
-      <a:lt2>
-        <a:srgbClr val="EEECE1"/>
-      </a:lt2>
-      <a:accent1>
-        <a:srgbClr val="4F81BD"/>
-      </a:accent1>
-      <a:accent2>
-        <a:srgbClr val="C0504D"/>
-      </a:accent2>
-      <a:accent3>
-        <a:srgbClr val="9BBB59"/>
-      </a:accent3>
-      <a:accent4>
-        <a:srgbClr val="8064A2"/>
-      </a:accent4>
-      <a:accent5>
-        <a:srgbClr val="4BACC6"/>
-      </a:accent5>
-      <a:accent6>
-        <a:srgbClr val="F79646"/>
-      </a:accent6>
-      <a:hlink>
-        <a:srgbClr val="0000FF"/>
-      </a:hlink>
-      <a:folHlink>
-        <a:srgbClr val="800080"/>
-      </a:folHlink>
-    </a:clrScheme>
-    <a:fontScheme name="Office">
-      <a:majorFont>
-        <a:latin typeface="Calibri"/>
-        <a:ea typeface=""/>
-        <a:cs typeface=""/>
-        <a:font script="Jpan" typeface="ＭＳ Ｐゴシック"/>
-        <a:font script="Hang" typeface="맑은 고딕"/>
-        <a:font script="Hans" typeface="宋体"/>
-        <a:font script="Hant" typeface="新細明體"/>
-        <a:font script="Arab" typeface="Times New Roman"/>
-        <a:font script="Hebr" typeface="Times New Roman"/>
-        <a:font script="Thai" typeface="Angsana New"/>
-        <a:font script="Ethi" typeface="Nyala"/>
-        <a:font script="Beng" typeface="Vrinda"/>
-        <a:font script="Gujr" typeface="Shruti"/>
-        <a:font script="Khmr" typeface="MoolBoran"/>
-        <a:font script="Knda" typeface="Tunga"/>
-        <a:font script="Guru" typeface="Raavi"/>
-        <a:font script="Cans" typeface="Euphemia"/>
-        <a:font script="Cher" typeface="Plantagenet Cherokee"/>
-        <a:font script="Yiii" typeface="Microsoft Yi Baiti"/>
-        <a:font script="Tibt" typeface="Microsoft Himalaya"/>
-        <a:font script="Thaa" typeface="MV Boli"/>
-        <a:font script="Deva" typeface="Mangal"/>
-        <a:font script="Telu" typeface="Gautami"/>
-        <a:font script="Taml" typeface="Latha"/>
-        <a:font script="Syrc" typeface="Estrangelo Edessa"/>
-        <a:font script="Orya" typeface="Kalinga"/>
-        <a:font script="Mlym" typeface="Kartika"/>
-        <a:font script="Laoo" typeface="DokChampa"/>
-        <a:font script="Sinh" typeface="Iskoola Pota"/>
-        <a:font script="Mong" typeface="Mongolian Baiti"/>
-        <a:font script="Viet" typeface="Times New Roman"/>
-        <a:font script="Uigh" typeface="Microsoft Uighur"/>
-        <a:font script="Geor" typeface="Sylfaen"/>
-      </a:majorFont>
-      <a:minorFont>
-        <a:latin typeface="Calibri"/>
-        <a:ea typeface=""/>
-        <a:cs typeface=""/>
-        <a:font script="Jpan" typeface="ＭＳ Ｐゴシック"/>
-        <a:font script="Hang" typeface="맑은 고딕"/>
-        <a:font script="Hans" typeface="宋体"/>
-        <a:font script="Hant" typeface="新細明體"/>
-        <a:font script="Arab" typeface="Arial"/>
-        <a:font script="Hebr" typeface="Arial"/>
-        <a:font script="Thai" typeface="Cordia New"/>
-        <a:font script="Ethi" typeface="Nyala"/>
-        <a:font script="Beng" typeface="Vrinda"/>
-        <a:font script="Gujr" typeface="Shruti"/>
-        <a:font script="Khmr" typeface="DaunPenh"/>
-        <a:font script="Knda" typeface="Tunga"/>
-        <a:font script="Guru" typeface="Raavi"/>
-        <a:font script="Cans" typeface="Euphemia"/>
-        <a:font script="Cher" typeface="Plantagenet Cherokee"/>
-        <a:font script="Yiii" typeface="Microsoft Yi Baiti"/>
-        <a:font script="Tibt" typeface="Microsoft Himalaya"/>
-        <a:font script="Thaa" typeface="MV Boli"/>
-        <a:font script="Deva" typeface="Mangal"/>
-        <a:font script="Telu" typeface="Gautami"/>
-        <a:font script="Taml" typeface="Latha"/>
-        <a:font script="Syrc" typeface="Estrangelo Edessa"/>
-        <a:font script="Orya" typeface="Kalinga"/>
-        <a:font script="Mlym" typeface="Kartika"/>
-        <a:font script="Laoo" typeface="DokChampa"/>
-        <a:font script="Sinh" typeface="Iskoola Pota"/>
-        <a:font script="Mong" typeface="Mongolian Baiti"/>
-        <a:font script="Viet" typeface="Arial"/>
-        <a:font script="Uigh" typeface="Microsoft Uighur"/>
-        <a:font script="Geor" typeface="Sylfaen"/>
-      </a:minorFont>
-    </a:fontScheme>
-    <a:fmtScheme name="Concourse">
-      <a:fillStyleLst>
-        <a:solidFill>
-          <a:schemeClr val="phClr"/>
-        </a:solidFill>
-        <a:gradFill rotWithShape="1">
-          <a:gsLst>
-            <a:gs pos="0">
-              <a:schemeClr val="phClr">
-                <a:tint val="62000"/>
-                <a:satMod val="180000"/>
-              </a:schemeClr>
-            </a:gs>
-            <a:gs pos="65000">
-              <a:schemeClr val="phClr">
-                <a:tint val="32000"/>
-                <a:satMod val="250000"/>
-              </a:schemeClr>
-            </a:gs>
-            <a:gs pos="100000">
-              <a:schemeClr val="phClr">
-                <a:tint val="23000"/>
-                <a:satMod val="300000"/>
-              </a:schemeClr>
-            </a:gs>
-          </a:gsLst>
-          <a:lin ang="16200000" scaled="0"/>
-        </a:gradFill>
-        <a:gradFill rotWithShape="1">
-          <a:gsLst>
-            <a:gs pos="0">
-              <a:schemeClr val="phClr">
-                <a:shade val="15000"/>
-                <a:satMod val="180000"/>
-              </a:schemeClr>
-            </a:gs>
-            <a:gs pos="50000">
-              <a:schemeClr val="phClr">
-                <a:shade val="45000"/>
-                <a:satMod val="170000"/>
-              </a:schemeClr>
-            </a:gs>
-            <a:gs pos="70000">
-              <a:schemeClr val="phClr">
-                <a:tint val="99000"/>
-                <a:shade val="65000"/>
-                <a:satMod val="155000"/>
-              </a:schemeClr>
-            </a:gs>
-            <a:gs pos="100000">
-              <a:schemeClr val="phClr">
-                <a:tint val="95500"/>
-                <a:shade val="100000"/>
-                <a:satMod val="155000"/>
-              </a:schemeClr>
-            </a:gs>
-          </a:gsLst>
-          <a:lin ang="16200000" scaled="0"/>
-        </a:gradFill>
-      </a:fillStyleLst>
-      <a:lnStyleLst>
-        <a:ln w="9525" cap="flat" cmpd="sng" algn="ctr">
-          <a:solidFill>
-            <a:schemeClr val="phClr"/>
-          </a:solidFill>
-          <a:prstDash val="solid"/>
-        </a:ln>
-        <a:ln w="55000" cap="flat" cmpd="thickThin" algn="ctr">
-          <a:solidFill>
-            <a:schemeClr val="phClr"/>
-          </a:solidFill>
-          <a:prstDash val="solid"/>
-        </a:ln>
-        <a:ln w="63500" cap="flat" cmpd="thickThin" algn="ctr">
-          <a:solidFill>
-            <a:schemeClr val="phClr"/>
-          </a:solidFill>
-          <a:prstDash val="solid"/>
-        </a:ln>
-      </a:lnStyleLst>
-      <a:effectStyleLst>
-        <a:effectStyle>
-          <a:effectLst>
-            <a:outerShdw blurRad="50800" dist="38100" dir="5400000" rotWithShape="0">
-              <a:srgbClr val="000000">
-                <a:alpha val="35000"/>
-              </a:srgbClr>
-            </a:outerShdw>
-          </a:effectLst>
-        </a:effectStyle>
-        <a:effectStyle>
-          <a:effectLst>
-            <a:outerShdw blurRad="50800" dist="38100" dir="5400000" rotWithShape="0">
-              <a:srgbClr val="000000">
-                <a:alpha val="35000"/>
-              </a:srgbClr>
-            </a:outerShdw>
-          </a:effectLst>
-        </a:effectStyle>
-        <a:effectStyle>
-          <a:effectLst>
-            <a:outerShdw blurRad="63500" dist="38100" dir="5400000" rotWithShape="0">
-              <a:srgbClr val="000000">
-                <a:alpha val="45000"/>
-              </a:srgbClr>
-            </a:outerShdw>
-          </a:effectLst>
-          <a:scene3d>
-            <a:camera prst="orthographicFront" fov="0">
-              <a:rot lat="0" lon="0" rev="0"/>
-            </a:camera>
-            <a:lightRig rig="glow" dir="t">
-              <a:rot lat="0" lon="0" rev="6360000"/>
-            </a:lightRig>
-          </a:scene3d>
-          <a:sp3d contourW="1000" prstMaterial="flat">
-            <a:bevelT w="95250" h="101600"/>
-            <a:contourClr>
-              <a:schemeClr val="phClr">
-                <a:satMod val="300000"/>
-              </a:schemeClr>
-            </a:contourClr>
-          </a:sp3d>
-        </a:effectStyle>
-      </a:effectStyleLst>
-      <a:bgFillStyleLst>
-        <a:solidFill>
-          <a:schemeClr val="phClr"/>
-        </a:solidFill>
-        <a:gradFill rotWithShape="1">
-          <a:gsLst>
-            <a:gs pos="0">
-              <a:schemeClr val="phClr">
-                <a:tint val="40000"/>
-                <a:satMod val="350000"/>
-              </a:schemeClr>
-            </a:gs>
-            <a:gs pos="40000">
-              <a:schemeClr val="phClr">
-                <a:tint val="45000"/>
-                <a:shade val="99000"/>
-                <a:satMod val="350000"/>
-              </a:schemeClr>
-            </a:gs>
-            <a:gs pos="100000">
-              <a:schemeClr val="phClr">
-                <a:shade val="20000"/>
-                <a:satMod val="255000"/>
-              </a:schemeClr>
-            </a:gs>
-          </a:gsLst>
-          <a:path path="circle">
-            <a:fillToRect l="50000" t="-80000" r="50000" b="180000"/>
-          </a:path>
-        </a:gradFill>
-        <a:gradFill rotWithShape="1">
-          <a:gsLst>
-            <a:gs pos="0">
-              <a:schemeClr val="phClr">
-                <a:tint val="80000"/>
-                <a:satMod val="300000"/>
-              </a:schemeClr>
-            </a:gs>
-            <a:gs pos="100000">
-              <a:schemeClr val="phClr">
-                <a:shade val="30000"/>
-                <a:satMod val="200000"/>
-              </a:schemeClr>
-            </a:gs>
-          </a:gsLst>
-          <a:path path="circle">
-            <a:fillToRect l="50000" t="50000" r="50000" b="50000"/>
-          </a:path>
-        </a:gradFill>
-      </a:bgFillStyleLst>
-    </a:fmtScheme>
-  </a:themeElements>
-  <a:objectDefaults/>
-  <a:extraClrSchemeLst/>
-</a:theme>
-</file>
-
-<file path=ppt/theme/theme2.xml><?xml version="1.0" encoding="utf-8"?>
 <a:theme xmlns:a="http://schemas.openxmlformats.org/drawingml/2006/main" name="Office Theme">
   <a:themeElements>
     <a:clrScheme name="Office">

</xml_diff>

<commit_message>
* Updated Slides.pptx with more relavent stuff
</commit_message>
<xml_diff>
--- a/doc/Final Presentation/Slides.pptx
+++ b/doc/Final Presentation/Slides.pptx
@@ -3178,6 +3178,13 @@
   <p:clrMapOvr>
     <a:masterClrMapping/>
   </p:clrMapOvr>
+  <p:timing>
+    <p:tnLst>
+      <p:par>
+        <p:cTn id="1" dur="indefinite" restart="never" nodeType="tmRoot"/>
+      </p:par>
+    </p:tnLst>
+  </p:timing>
 </p:sld>
 </file>
 
@@ -3233,15 +3240,25 @@
         </p:nvSpPr>
         <p:spPr/>
         <p:txBody>
-          <a:bodyPr/>
-          <a:lstStyle/>
-          <a:p>
+          <a:bodyPr>
+            <a:normAutofit/>
+          </a:bodyPr>
+          <a:lstStyle/>
+          <a:p>
+            <a:r>
+              <a:rPr lang="en-US" dirty="0" smtClean="0"/>
+              <a:t>We use</a:t>
+            </a:r>
+          </a:p>
+          <a:p>
+            <a:pPr lvl="1"/>
             <a:r>
               <a:rPr lang="en-US" dirty="0" smtClean="0"/>
               <a:t>Spiral model</a:t>
             </a:r>
           </a:p>
           <a:p>
+            <a:pPr lvl="1"/>
             <a:r>
               <a:rPr lang="en-US" dirty="0" smtClean="0"/>
               <a:t>Using Google </a:t>
@@ -3273,6 +3290,13 @@
   <p:clrMapOvr>
     <a:masterClrMapping/>
   </p:clrMapOvr>
+  <p:timing>
+    <p:tnLst>
+      <p:par>
+        <p:cTn id="1" dur="indefinite" restart="never" nodeType="tmRoot"/>
+      </p:par>
+    </p:tnLst>
+  </p:timing>
 </p:sld>
 </file>
 
@@ -3363,7 +3387,7 @@
             </a:r>
             <a:r>
               <a:rPr lang="en-US" dirty="0" smtClean="0"/>
-              <a:t> the main view to show in formation</a:t>
+              <a:t> the main view to show information</a:t>
             </a:r>
           </a:p>
           <a:p>
@@ -3382,20 +3406,27 @@
           <a:p>
             <a:pPr lvl="1"/>
             <a:r>
-              <a:rPr lang="en-US" dirty="0" err="1" smtClean="0"/>
-              <a:t>Colour</a:t>
-            </a:r>
-            <a:r>
               <a:rPr lang="en-US" dirty="0" smtClean="0"/>
-              <a:t> coded keys for values</a:t>
+              <a:t>Advanced runway parameters</a:t>
             </a:r>
           </a:p>
           <a:p>
             <a:pPr lvl="1"/>
             <a:r>
               <a:rPr lang="en-US" dirty="0" smtClean="0"/>
-              <a:t>Advanced runway parameters and XML address books</a:t>
-            </a:r>
+              <a:t>XML address books</a:t>
+            </a:r>
+          </a:p>
+          <a:p>
+            <a:pPr lvl="1"/>
+            <a:r>
+              <a:rPr lang="en-US" dirty="0" smtClean="0"/>
+              <a:t>Open recent</a:t>
+            </a:r>
+          </a:p>
+          <a:p>
+            <a:pPr lvl="1"/>
+            <a:endParaRPr lang="en-US" dirty="0" smtClean="0"/>
           </a:p>
           <a:p>
             <a:pPr lvl="1"/>
@@ -3413,6 +3444,13 @@
   <p:clrMapOvr>
     <a:masterClrMapping/>
   </p:clrMapOvr>
+  <p:timing>
+    <p:tnLst>
+      <p:par>
+        <p:cTn id="1" dur="indefinite" restart="never" nodeType="tmRoot"/>
+      </p:par>
+    </p:tnLst>
+  </p:timing>
 </p:sld>
 </file>
 

</xml_diff>

<commit_message>
* Better slide 2 for D5
</commit_message>
<xml_diff>
--- a/doc/Final Presentation/Slides.pptx
+++ b/doc/Final Presentation/Slides.pptx
@@ -290,7 +290,7 @@
           <a:p>
             <a:fld id="{89FD1625-AD4B-4B8A-9B1A-7AD19B728197}" type="datetimeFigureOut">
               <a:rPr lang="en-US" smtClean="0"/>
-              <a:t>5/9/2012</a:t>
+              <a:t>5/10/2012</a:t>
             </a:fld>
             <a:endParaRPr lang="en-US"/>
           </a:p>
@@ -460,7 +460,7 @@
           <a:p>
             <a:fld id="{89FD1625-AD4B-4B8A-9B1A-7AD19B728197}" type="datetimeFigureOut">
               <a:rPr lang="en-US" smtClean="0"/>
-              <a:t>5/9/2012</a:t>
+              <a:t>5/10/2012</a:t>
             </a:fld>
             <a:endParaRPr lang="en-US"/>
           </a:p>
@@ -640,7 +640,7 @@
           <a:p>
             <a:fld id="{89FD1625-AD4B-4B8A-9B1A-7AD19B728197}" type="datetimeFigureOut">
               <a:rPr lang="en-US" smtClean="0"/>
-              <a:t>5/9/2012</a:t>
+              <a:t>5/10/2012</a:t>
             </a:fld>
             <a:endParaRPr lang="en-US"/>
           </a:p>
@@ -810,7 +810,7 @@
           <a:p>
             <a:fld id="{89FD1625-AD4B-4B8A-9B1A-7AD19B728197}" type="datetimeFigureOut">
               <a:rPr lang="en-US" smtClean="0"/>
-              <a:t>5/9/2012</a:t>
+              <a:t>5/10/2012</a:t>
             </a:fld>
             <a:endParaRPr lang="en-US"/>
           </a:p>
@@ -1056,7 +1056,7 @@
           <a:p>
             <a:fld id="{89FD1625-AD4B-4B8A-9B1A-7AD19B728197}" type="datetimeFigureOut">
               <a:rPr lang="en-US" smtClean="0"/>
-              <a:t>5/9/2012</a:t>
+              <a:t>5/10/2012</a:t>
             </a:fld>
             <a:endParaRPr lang="en-US"/>
           </a:p>
@@ -1344,7 +1344,7 @@
           <a:p>
             <a:fld id="{89FD1625-AD4B-4B8A-9B1A-7AD19B728197}" type="datetimeFigureOut">
               <a:rPr lang="en-US" smtClean="0"/>
-              <a:t>5/9/2012</a:t>
+              <a:t>5/10/2012</a:t>
             </a:fld>
             <a:endParaRPr lang="en-US"/>
           </a:p>
@@ -1766,7 +1766,7 @@
           <a:p>
             <a:fld id="{89FD1625-AD4B-4B8A-9B1A-7AD19B728197}" type="datetimeFigureOut">
               <a:rPr lang="en-US" smtClean="0"/>
-              <a:t>5/9/2012</a:t>
+              <a:t>5/10/2012</a:t>
             </a:fld>
             <a:endParaRPr lang="en-US"/>
           </a:p>
@@ -1884,7 +1884,7 @@
           <a:p>
             <a:fld id="{89FD1625-AD4B-4B8A-9B1A-7AD19B728197}" type="datetimeFigureOut">
               <a:rPr lang="en-US" smtClean="0"/>
-              <a:t>5/9/2012</a:t>
+              <a:t>5/10/2012</a:t>
             </a:fld>
             <a:endParaRPr lang="en-US"/>
           </a:p>
@@ -1979,7 +1979,7 @@
           <a:p>
             <a:fld id="{89FD1625-AD4B-4B8A-9B1A-7AD19B728197}" type="datetimeFigureOut">
               <a:rPr lang="en-US" smtClean="0"/>
-              <a:t>5/9/2012</a:t>
+              <a:t>5/10/2012</a:t>
             </a:fld>
             <a:endParaRPr lang="en-US"/>
           </a:p>
@@ -2256,7 +2256,7 @@
           <a:p>
             <a:fld id="{89FD1625-AD4B-4B8A-9B1A-7AD19B728197}" type="datetimeFigureOut">
               <a:rPr lang="en-US" smtClean="0"/>
-              <a:t>5/9/2012</a:t>
+              <a:t>5/10/2012</a:t>
             </a:fld>
             <a:endParaRPr lang="en-US"/>
           </a:p>
@@ -2509,7 +2509,7 @@
           <a:p>
             <a:fld id="{89FD1625-AD4B-4B8A-9B1A-7AD19B728197}" type="datetimeFigureOut">
               <a:rPr lang="en-US" smtClean="0"/>
-              <a:t>5/9/2012</a:t>
+              <a:t>5/10/2012</a:t>
             </a:fld>
             <a:endParaRPr lang="en-US"/>
           </a:p>
@@ -2739,7 +2739,7 @@
           <a:p>
             <a:fld id="{89FD1625-AD4B-4B8A-9B1A-7AD19B728197}" type="datetimeFigureOut">
               <a:rPr lang="en-US" smtClean="0"/>
-              <a:t>5/9/2012</a:t>
+              <a:t>5/10/2012</a:t>
             </a:fld>
             <a:endParaRPr lang="en-US"/>
           </a:p>
@@ -3247,21 +3247,63 @@
           <a:p>
             <a:r>
               <a:rPr lang="en-US" dirty="0" smtClean="0"/>
-              <a:t>We use</a:t>
+              <a:t>Two working pairs and a lone ranger</a:t>
             </a:r>
           </a:p>
           <a:p>
             <a:pPr lvl="1"/>
             <a:r>
               <a:rPr lang="en-US" dirty="0" smtClean="0"/>
-              <a:t>Spiral model</a:t>
+              <a:t>Edward and </a:t>
+            </a:r>
+            <a:r>
+              <a:rPr lang="en-US" dirty="0" err="1" smtClean="0"/>
+              <a:t>Kristian</a:t>
+            </a:r>
+            <a:r>
+              <a:rPr lang="en-US" dirty="0" smtClean="0"/>
+              <a:t> on View</a:t>
             </a:r>
           </a:p>
           <a:p>
             <a:pPr lvl="1"/>
             <a:r>
               <a:rPr lang="en-US" dirty="0" smtClean="0"/>
-              <a:t>Using Google </a:t>
+              <a:t>Kelvin and Oscar on Model</a:t>
+            </a:r>
+          </a:p>
+          <a:p>
+            <a:pPr lvl="1"/>
+            <a:r>
+              <a:rPr lang="en-US" dirty="0" smtClean="0"/>
+              <a:t>Brian on Controller </a:t>
+            </a:r>
+          </a:p>
+          <a:p>
+            <a:pPr lvl="1"/>
+            <a:r>
+              <a:rPr lang="en-US" dirty="0" smtClean="0"/>
+              <a:t>Edward and Brian both contributed to GUI work</a:t>
+            </a:r>
+          </a:p>
+          <a:p>
+            <a:r>
+              <a:rPr lang="en-US" dirty="0" smtClean="0"/>
+              <a:t>From last time</a:t>
+            </a:r>
+          </a:p>
+          <a:p>
+            <a:pPr lvl="1"/>
+            <a:r>
+              <a:rPr lang="en-US" dirty="0" smtClean="0"/>
+              <a:t>Spiral model methodology</a:t>
+            </a:r>
+          </a:p>
+          <a:p>
+            <a:pPr lvl="1"/>
+            <a:r>
+              <a:rPr lang="en-US" dirty="0" smtClean="0"/>
+              <a:t>Google </a:t>
             </a:r>
             <a:r>
               <a:rPr lang="en-US" dirty="0" err="1" smtClean="0"/>
@@ -3269,8 +3311,11 @@
             </a:r>
             <a:r>
               <a:rPr lang="en-US" dirty="0" smtClean="0"/>
-              <a:t> to build GUI</a:t>
-            </a:r>
+              <a:t> used to speed up GUI building</a:t>
+            </a:r>
+          </a:p>
+          <a:p>
+            <a:endParaRPr lang="en-US" dirty="0" smtClean="0"/>
           </a:p>
           <a:p>
             <a:endParaRPr lang="en-US" dirty="0" smtClean="0"/>

</xml_diff>

<commit_message>
* Updated Slides.pptx with darker background and a better font * Added "HTML user manual" to the final slide
</commit_message>
<xml_diff>
--- a/doc/Final Presentation/Slides.pptx
+++ b/doc/Final Presentation/Slides.pptx
@@ -2578,14 +2578,15 @@
         <a:gradFill flip="none" rotWithShape="1">
           <a:gsLst>
             <a:gs pos="0">
-              <a:schemeClr val="tx1">
+              <a:schemeClr val="bg1">
                 <a:lumMod val="65000"/>
+                <a:lumOff val="35000"/>
               </a:schemeClr>
             </a:gs>
-            <a:gs pos="52000">
+            <a:gs pos="100000">
               <a:schemeClr val="bg1">
-                <a:lumMod val="75000"/>
-                <a:lumOff val="25000"/>
+                <a:lumMod val="85000"/>
+                <a:lumOff val="15000"/>
               </a:schemeClr>
             </a:gs>
           </a:gsLst>
@@ -3130,10 +3131,14 @@
           <a:lstStyle/>
           <a:p>
             <a:r>
-              <a:rPr lang="en-US" dirty="0" smtClean="0"/>
+              <a:rPr lang="en-US" dirty="0" smtClean="0">
+                <a:latin typeface="Gill Sans MT" pitchFamily="34" charset="0"/>
+              </a:rPr>
               <a:t>D5 – Presentation</a:t>
             </a:r>
-            <a:endParaRPr lang="en-US" dirty="0"/>
+            <a:endParaRPr lang="en-US" dirty="0">
+              <a:latin typeface="Gill Sans MT" pitchFamily="34" charset="0"/>
+            </a:endParaRPr>
           </a:p>
         </p:txBody>
       </p:sp>
@@ -3153,18 +3158,24 @@
           <a:lstStyle/>
           <a:p>
             <a:r>
-              <a:rPr lang="en-US" dirty="0" smtClean="0"/>
+              <a:rPr lang="en-US" dirty="0" smtClean="0">
+                <a:latin typeface="Gill Sans MT" pitchFamily="34" charset="0"/>
+              </a:rPr>
               <a:t>Group 9</a:t>
             </a:r>
           </a:p>
           <a:p>
             <a:r>
-              <a:rPr lang="en-US" dirty="0" smtClean="0"/>
+              <a:rPr lang="en-US" dirty="0" smtClean="0">
+                <a:latin typeface="Gill Sans MT" pitchFamily="34" charset="0"/>
+              </a:rPr>
               <a:t>Brian, Edward, Oscar, Kristian, Kelvin</a:t>
             </a:r>
           </a:p>
           <a:p>
-            <a:endParaRPr lang="en-US" dirty="0"/>
+            <a:endParaRPr lang="en-US" dirty="0">
+              <a:latin typeface="Gill Sans MT" pitchFamily="34" charset="0"/>
+            </a:endParaRPr>
           </a:p>
         </p:txBody>
       </p:sp>
@@ -3221,10 +3232,14 @@
           <a:lstStyle/>
           <a:p>
             <a:r>
-              <a:rPr lang="en-US" dirty="0" smtClean="0"/>
+              <a:rPr lang="en-US" dirty="0" smtClean="0">
+                <a:latin typeface="Gill Sans MT" pitchFamily="34" charset="0"/>
+              </a:rPr>
               <a:t>Who we are</a:t>
             </a:r>
-            <a:endParaRPr lang="en-US" dirty="0"/>
+            <a:endParaRPr lang="en-US" dirty="0">
+              <a:latin typeface="Gill Sans MT" pitchFamily="34" charset="0"/>
+            </a:endParaRPr>
           </a:p>
         </p:txBody>
       </p:sp>
@@ -3246,82 +3261,112 @@
           <a:lstStyle/>
           <a:p>
             <a:r>
-              <a:rPr lang="en-US" dirty="0" smtClean="0"/>
+              <a:rPr lang="en-US" dirty="0" smtClean="0">
+                <a:latin typeface="Gill Sans MT" pitchFamily="34" charset="0"/>
+              </a:rPr>
               <a:t>Two working pairs and a lone ranger</a:t>
             </a:r>
           </a:p>
           <a:p>
             <a:pPr lvl="1"/>
             <a:r>
-              <a:rPr lang="en-US" dirty="0" smtClean="0"/>
+              <a:rPr lang="en-US" dirty="0" smtClean="0">
+                <a:latin typeface="Gill Sans MT" pitchFamily="34" charset="0"/>
+              </a:rPr>
               <a:t>Edward and </a:t>
             </a:r>
             <a:r>
-              <a:rPr lang="en-US" dirty="0" err="1" smtClean="0"/>
+              <a:rPr lang="en-US" dirty="0" err="1" smtClean="0">
+                <a:latin typeface="Gill Sans MT" pitchFamily="34" charset="0"/>
+              </a:rPr>
               <a:t>Kristian</a:t>
             </a:r>
             <a:r>
-              <a:rPr lang="en-US" dirty="0" smtClean="0"/>
+              <a:rPr lang="en-US" dirty="0" smtClean="0">
+                <a:latin typeface="Gill Sans MT" pitchFamily="34" charset="0"/>
+              </a:rPr>
               <a:t> on View</a:t>
             </a:r>
           </a:p>
           <a:p>
             <a:pPr lvl="1"/>
             <a:r>
-              <a:rPr lang="en-US" dirty="0" smtClean="0"/>
+              <a:rPr lang="en-US" dirty="0" smtClean="0">
+                <a:latin typeface="Gill Sans MT" pitchFamily="34" charset="0"/>
+              </a:rPr>
               <a:t>Kelvin and Oscar on Model</a:t>
             </a:r>
           </a:p>
           <a:p>
             <a:pPr lvl="1"/>
             <a:r>
-              <a:rPr lang="en-US" dirty="0" smtClean="0"/>
+              <a:rPr lang="en-US" dirty="0" smtClean="0">
+                <a:latin typeface="Gill Sans MT" pitchFamily="34" charset="0"/>
+              </a:rPr>
               <a:t>Brian on Controller </a:t>
             </a:r>
           </a:p>
           <a:p>
             <a:pPr lvl="1"/>
             <a:r>
-              <a:rPr lang="en-US" dirty="0" smtClean="0"/>
+              <a:rPr lang="en-US" dirty="0" smtClean="0">
+                <a:latin typeface="Gill Sans MT" pitchFamily="34" charset="0"/>
+              </a:rPr>
               <a:t>Edward and Brian both contributed to GUI work</a:t>
             </a:r>
           </a:p>
           <a:p>
             <a:r>
-              <a:rPr lang="en-US" dirty="0" smtClean="0"/>
+              <a:rPr lang="en-US" dirty="0" smtClean="0">
+                <a:latin typeface="Gill Sans MT" pitchFamily="34" charset="0"/>
+              </a:rPr>
               <a:t>From last time</a:t>
             </a:r>
           </a:p>
           <a:p>
             <a:pPr lvl="1"/>
             <a:r>
-              <a:rPr lang="en-US" dirty="0" smtClean="0"/>
+              <a:rPr lang="en-US" dirty="0" smtClean="0">
+                <a:latin typeface="Gill Sans MT" pitchFamily="34" charset="0"/>
+              </a:rPr>
               <a:t>Spiral model methodology</a:t>
             </a:r>
           </a:p>
           <a:p>
             <a:pPr lvl="1"/>
             <a:r>
-              <a:rPr lang="en-US" dirty="0" smtClean="0"/>
+              <a:rPr lang="en-US" dirty="0" smtClean="0">
+                <a:latin typeface="Gill Sans MT" pitchFamily="34" charset="0"/>
+              </a:rPr>
               <a:t>Google </a:t>
             </a:r>
             <a:r>
-              <a:rPr lang="en-US" dirty="0" err="1" smtClean="0"/>
+              <a:rPr lang="en-US" dirty="0" err="1" smtClean="0">
+                <a:latin typeface="Gill Sans MT" pitchFamily="34" charset="0"/>
+              </a:rPr>
               <a:t>WBPro</a:t>
             </a:r>
             <a:r>
-              <a:rPr lang="en-US" dirty="0" smtClean="0"/>
+              <a:rPr lang="en-US" dirty="0" smtClean="0">
+                <a:latin typeface="Gill Sans MT" pitchFamily="34" charset="0"/>
+              </a:rPr>
               <a:t> used to speed up GUI building</a:t>
             </a:r>
           </a:p>
           <a:p>
-            <a:endParaRPr lang="en-US" dirty="0" smtClean="0"/>
-          </a:p>
-          <a:p>
-            <a:endParaRPr lang="en-US" dirty="0" smtClean="0"/>
-          </a:p>
-          <a:p>
-            <a:endParaRPr lang="en-US" dirty="0"/>
+            <a:endParaRPr lang="en-US" dirty="0" smtClean="0">
+              <a:latin typeface="Gill Sans MT" pitchFamily="34" charset="0"/>
+            </a:endParaRPr>
+          </a:p>
+          <a:p>
+            <a:endParaRPr lang="en-US" dirty="0" smtClean="0">
+              <a:latin typeface="Gill Sans MT" pitchFamily="34" charset="0"/>
+            </a:endParaRPr>
+          </a:p>
+          <a:p>
+            <a:endParaRPr lang="en-US" dirty="0">
+              <a:latin typeface="Gill Sans MT" pitchFamily="34" charset="0"/>
+            </a:endParaRPr>
           </a:p>
         </p:txBody>
       </p:sp>
@@ -3378,10 +3423,14 @@
           <a:lstStyle/>
           <a:p>
             <a:r>
-              <a:rPr lang="en-US" dirty="0" smtClean="0"/>
+              <a:rPr lang="en-US" dirty="0" smtClean="0">
+                <a:latin typeface="Gill Sans MT" pitchFamily="34" charset="0"/>
+              </a:rPr>
               <a:t>Broad design decisions</a:t>
             </a:r>
-            <a:endParaRPr lang="en-US" dirty="0"/>
+            <a:endParaRPr lang="en-US" dirty="0">
+              <a:latin typeface="Gill Sans MT" pitchFamily="34" charset="0"/>
+            </a:endParaRPr>
           </a:p>
         </p:txBody>
       </p:sp>
@@ -3395,7 +3444,12 @@
             <p:ph idx="1"/>
           </p:nvPr>
         </p:nvSpPr>
-        <p:spPr/>
+        <p:spPr>
+          <a:xfrm>
+            <a:off x="457200" y="1600200"/>
+            <a:ext cx="8229600" cy="5181600"/>
+          </a:xfrm>
+        </p:spPr>
         <p:txBody>
           <a:bodyPr>
             <a:normAutofit lnSpcReduction="10000"/>
@@ -3403,79 +3457,123 @@
           <a:lstStyle/>
           <a:p>
             <a:r>
-              <a:rPr lang="en-US" dirty="0" smtClean="0"/>
+              <a:rPr lang="en-US" dirty="0" smtClean="0">
+                <a:latin typeface="Gill Sans MT" pitchFamily="34" charset="0"/>
+              </a:rPr>
               <a:t>Simple and minimalistic</a:t>
             </a:r>
           </a:p>
           <a:p>
             <a:r>
-              <a:rPr lang="en-US" dirty="0" smtClean="0"/>
+              <a:rPr lang="en-US" dirty="0" smtClean="0">
+                <a:latin typeface="Gill Sans MT" pitchFamily="34" charset="0"/>
+              </a:rPr>
               <a:t>We aim to unclutter the information shown</a:t>
             </a:r>
           </a:p>
           <a:p>
             <a:pPr lvl="1"/>
             <a:r>
-              <a:rPr lang="en-US" dirty="0" smtClean="0"/>
+              <a:rPr lang="en-US" dirty="0" smtClean="0">
+                <a:latin typeface="Gill Sans MT" pitchFamily="34" charset="0"/>
+              </a:rPr>
               <a:t>By hiding data entry inside menus &amp; dialogs</a:t>
             </a:r>
           </a:p>
           <a:p>
             <a:pPr lvl="1"/>
             <a:r>
-              <a:rPr lang="en-US" dirty="0" smtClean="0"/>
+              <a:rPr lang="en-US" dirty="0" smtClean="0">
+                <a:latin typeface="Gill Sans MT" pitchFamily="34" charset="0"/>
+              </a:rPr>
               <a:t>By </a:t>
             </a:r>
             <a:r>
-              <a:rPr lang="en-US" dirty="0" err="1" smtClean="0"/>
+              <a:rPr lang="en-US" dirty="0" err="1" smtClean="0">
+                <a:latin typeface="Gill Sans MT" pitchFamily="34" charset="0"/>
+              </a:rPr>
               <a:t>organising</a:t>
             </a:r>
             <a:r>
-              <a:rPr lang="en-US" dirty="0" smtClean="0"/>
+              <a:rPr lang="en-US" dirty="0" smtClean="0">
+                <a:latin typeface="Gill Sans MT" pitchFamily="34" charset="0"/>
+              </a:rPr>
               <a:t> the main view to show information</a:t>
             </a:r>
           </a:p>
           <a:p>
             <a:r>
-              <a:rPr lang="en-US" dirty="0" smtClean="0"/>
+              <a:rPr lang="en-US" dirty="0" smtClean="0">
+                <a:latin typeface="Gill Sans MT" pitchFamily="34" charset="0"/>
+              </a:rPr>
               <a:t>We aim to provide flexibility and utility</a:t>
             </a:r>
           </a:p>
           <a:p>
             <a:pPr lvl="1"/>
             <a:r>
-              <a:rPr lang="en-US" dirty="0" smtClean="0"/>
+              <a:rPr lang="en-US" dirty="0" smtClean="0">
+                <a:latin typeface="Gill Sans MT" pitchFamily="34" charset="0"/>
+              </a:rPr>
               <a:t>Zoom, panning and scale </a:t>
             </a:r>
           </a:p>
           <a:p>
             <a:pPr lvl="1"/>
             <a:r>
-              <a:rPr lang="en-US" dirty="0" smtClean="0"/>
+              <a:rPr lang="en-US" dirty="0" smtClean="0">
+                <a:latin typeface="Gill Sans MT" pitchFamily="34" charset="0"/>
+              </a:rPr>
               <a:t>Advanced runway parameters</a:t>
             </a:r>
           </a:p>
           <a:p>
             <a:pPr lvl="1"/>
             <a:r>
-              <a:rPr lang="en-US" dirty="0" smtClean="0"/>
+              <a:rPr lang="en-US" dirty="0" smtClean="0">
+                <a:latin typeface="Gill Sans MT" pitchFamily="34" charset="0"/>
+              </a:rPr>
               <a:t>XML address books</a:t>
             </a:r>
           </a:p>
           <a:p>
             <a:pPr lvl="1"/>
             <a:r>
-              <a:rPr lang="en-US" dirty="0" smtClean="0"/>
-              <a:t>Open recent</a:t>
+              <a:rPr lang="en-US" dirty="0" smtClean="0">
+                <a:latin typeface="Gill Sans MT" pitchFamily="34" charset="0"/>
+              </a:rPr>
+              <a:t>Open </a:t>
+            </a:r>
+            <a:r>
+              <a:rPr lang="en-US" dirty="0" smtClean="0">
+                <a:latin typeface="Gill Sans MT" pitchFamily="34" charset="0"/>
+              </a:rPr>
+              <a:t>recent</a:t>
             </a:r>
           </a:p>
           <a:p>
             <a:pPr lvl="1"/>
-            <a:endParaRPr lang="en-US" dirty="0" smtClean="0"/>
+            <a:r>
+              <a:rPr lang="en-US" dirty="0" smtClean="0">
+                <a:latin typeface="Gill Sans MT" pitchFamily="34" charset="0"/>
+              </a:rPr>
+              <a:t>HTML user manual</a:t>
+            </a:r>
+            <a:endParaRPr lang="en-US" dirty="0" smtClean="0">
+              <a:latin typeface="Gill Sans MT" pitchFamily="34" charset="0"/>
+            </a:endParaRPr>
           </a:p>
           <a:p>
             <a:pPr lvl="1"/>
-            <a:endParaRPr lang="en-US" dirty="0"/>
+            <a:endParaRPr lang="en-US" dirty="0" smtClean="0">
+              <a:latin typeface="Gill Sans MT" pitchFamily="34" charset="0"/>
+            </a:endParaRPr>
+          </a:p>
+          <a:p>
+            <a:pPr lvl="1"/>
+            <a:endParaRPr lang="en-US" dirty="0">
+              <a:latin typeface="Gill Sans MT" pitchFamily="34" charset="0"/>
+            </a:endParaRPr>
           </a:p>
         </p:txBody>
       </p:sp>

</xml_diff>

<commit_message>
* Updates Slides.pptx to fit in more with Oscar's speech
</commit_message>
<xml_diff>
--- a/doc/Final Presentation/Slides.pptx
+++ b/doc/Final Presentation/Slides.pptx
@@ -7,7 +7,8 @@
   <p:sldIdLst>
     <p:sldId id="256" r:id="rId2"/>
     <p:sldId id="257" r:id="rId3"/>
-    <p:sldId id="258" r:id="rId4"/>
+    <p:sldId id="259" r:id="rId4"/>
+    <p:sldId id="258" r:id="rId5"/>
   </p:sldIdLst>
   <p:sldSz cx="9144000" cy="6858000" type="screen4x3"/>
   <p:notesSz cx="6858000" cy="9144000"/>
@@ -290,7 +291,7 @@
           <a:p>
             <a:fld id="{89FD1625-AD4B-4B8A-9B1A-7AD19B728197}" type="datetimeFigureOut">
               <a:rPr lang="en-US" smtClean="0"/>
-              <a:t>5/10/2012</a:t>
+              <a:t>5/11/2012</a:t>
             </a:fld>
             <a:endParaRPr lang="en-US"/>
           </a:p>
@@ -460,7 +461,7 @@
           <a:p>
             <a:fld id="{89FD1625-AD4B-4B8A-9B1A-7AD19B728197}" type="datetimeFigureOut">
               <a:rPr lang="en-US" smtClean="0"/>
-              <a:t>5/10/2012</a:t>
+              <a:t>5/11/2012</a:t>
             </a:fld>
             <a:endParaRPr lang="en-US"/>
           </a:p>
@@ -640,7 +641,7 @@
           <a:p>
             <a:fld id="{89FD1625-AD4B-4B8A-9B1A-7AD19B728197}" type="datetimeFigureOut">
               <a:rPr lang="en-US" smtClean="0"/>
-              <a:t>5/10/2012</a:t>
+              <a:t>5/11/2012</a:t>
             </a:fld>
             <a:endParaRPr lang="en-US"/>
           </a:p>
@@ -810,7 +811,7 @@
           <a:p>
             <a:fld id="{89FD1625-AD4B-4B8A-9B1A-7AD19B728197}" type="datetimeFigureOut">
               <a:rPr lang="en-US" smtClean="0"/>
-              <a:t>5/10/2012</a:t>
+              <a:t>5/11/2012</a:t>
             </a:fld>
             <a:endParaRPr lang="en-US"/>
           </a:p>
@@ -1056,7 +1057,7 @@
           <a:p>
             <a:fld id="{89FD1625-AD4B-4B8A-9B1A-7AD19B728197}" type="datetimeFigureOut">
               <a:rPr lang="en-US" smtClean="0"/>
-              <a:t>5/10/2012</a:t>
+              <a:t>5/11/2012</a:t>
             </a:fld>
             <a:endParaRPr lang="en-US"/>
           </a:p>
@@ -1344,7 +1345,7 @@
           <a:p>
             <a:fld id="{89FD1625-AD4B-4B8A-9B1A-7AD19B728197}" type="datetimeFigureOut">
               <a:rPr lang="en-US" smtClean="0"/>
-              <a:t>5/10/2012</a:t>
+              <a:t>5/11/2012</a:t>
             </a:fld>
             <a:endParaRPr lang="en-US"/>
           </a:p>
@@ -1766,7 +1767,7 @@
           <a:p>
             <a:fld id="{89FD1625-AD4B-4B8A-9B1A-7AD19B728197}" type="datetimeFigureOut">
               <a:rPr lang="en-US" smtClean="0"/>
-              <a:t>5/10/2012</a:t>
+              <a:t>5/11/2012</a:t>
             </a:fld>
             <a:endParaRPr lang="en-US"/>
           </a:p>
@@ -1884,7 +1885,7 @@
           <a:p>
             <a:fld id="{89FD1625-AD4B-4B8A-9B1A-7AD19B728197}" type="datetimeFigureOut">
               <a:rPr lang="en-US" smtClean="0"/>
-              <a:t>5/10/2012</a:t>
+              <a:t>5/11/2012</a:t>
             </a:fld>
             <a:endParaRPr lang="en-US"/>
           </a:p>
@@ -1979,7 +1980,7 @@
           <a:p>
             <a:fld id="{89FD1625-AD4B-4B8A-9B1A-7AD19B728197}" type="datetimeFigureOut">
               <a:rPr lang="en-US" smtClean="0"/>
-              <a:t>5/10/2012</a:t>
+              <a:t>5/11/2012</a:t>
             </a:fld>
             <a:endParaRPr lang="en-US"/>
           </a:p>
@@ -2256,7 +2257,7 @@
           <a:p>
             <a:fld id="{89FD1625-AD4B-4B8A-9B1A-7AD19B728197}" type="datetimeFigureOut">
               <a:rPr lang="en-US" smtClean="0"/>
-              <a:t>5/10/2012</a:t>
+              <a:t>5/11/2012</a:t>
             </a:fld>
             <a:endParaRPr lang="en-US"/>
           </a:p>
@@ -2509,7 +2510,7 @@
           <a:p>
             <a:fld id="{89FD1625-AD4B-4B8A-9B1A-7AD19B728197}" type="datetimeFigureOut">
               <a:rPr lang="en-US" smtClean="0"/>
-              <a:t>5/10/2012</a:t>
+              <a:t>5/11/2012</a:t>
             </a:fld>
             <a:endParaRPr lang="en-US"/>
           </a:p>
@@ -2740,7 +2741,7 @@
           <a:p>
             <a:fld id="{89FD1625-AD4B-4B8A-9B1A-7AD19B728197}" type="datetimeFigureOut">
               <a:rPr lang="en-US" smtClean="0"/>
-              <a:t>5/10/2012</a:t>
+              <a:t>5/11/2012</a:t>
             </a:fld>
             <a:endParaRPr lang="en-US"/>
           </a:p>
@@ -3253,7 +3254,12 @@
             <p:ph idx="1"/>
           </p:nvPr>
         </p:nvSpPr>
-        <p:spPr/>
+        <p:spPr>
+          <a:xfrm>
+            <a:off x="457200" y="1600200"/>
+            <a:ext cx="8229600" cy="4953000"/>
+          </a:xfrm>
+        </p:spPr>
         <p:txBody>
           <a:bodyPr>
             <a:normAutofit/>
@@ -3264,7 +3270,19 @@
               <a:rPr lang="en-US" dirty="0" smtClean="0">
                 <a:latin typeface="Gill Sans MT" pitchFamily="34" charset="0"/>
               </a:rPr>
-              <a:t>Two working pairs and a lone ranger</a:t>
+              <a:t>Two </a:t>
+            </a:r>
+            <a:r>
+              <a:rPr lang="en-US" dirty="0" smtClean="0">
+                <a:latin typeface="Gill Sans MT" pitchFamily="34" charset="0"/>
+              </a:rPr>
+              <a:t>programming </a:t>
+            </a:r>
+            <a:r>
+              <a:rPr lang="en-US" dirty="0" smtClean="0">
+                <a:latin typeface="Gill Sans MT" pitchFamily="34" charset="0"/>
+              </a:rPr>
+              <a:t>pairs and a lone ranger</a:t>
             </a:r>
           </a:p>
           <a:p>
@@ -3329,8 +3347,26 @@
               <a:rPr lang="en-US" dirty="0" smtClean="0">
                 <a:latin typeface="Gill Sans MT" pitchFamily="34" charset="0"/>
               </a:rPr>
-              <a:t>Spiral model methodology</a:t>
-            </a:r>
+              <a:t>Spiral model </a:t>
+            </a:r>
+            <a:r>
+              <a:rPr lang="en-US" dirty="0" smtClean="0">
+                <a:latin typeface="Gill Sans MT" pitchFamily="34" charset="0"/>
+              </a:rPr>
+              <a:t>methodology</a:t>
+            </a:r>
+          </a:p>
+          <a:p>
+            <a:pPr lvl="1"/>
+            <a:r>
+              <a:rPr lang="en-US" dirty="0" smtClean="0">
+                <a:latin typeface="Gill Sans MT" pitchFamily="34" charset="0"/>
+              </a:rPr>
+              <a:t>Lots of meetings plus Facebook Group</a:t>
+            </a:r>
+            <a:endParaRPr lang="en-US" dirty="0" smtClean="0">
+              <a:latin typeface="Gill Sans MT" pitchFamily="34" charset="0"/>
+            </a:endParaRPr>
           </a:p>
           <a:p>
             <a:pPr lvl="1"/>
@@ -3426,7 +3462,161 @@
               <a:rPr lang="en-US" dirty="0" smtClean="0">
                 <a:latin typeface="Gill Sans MT" pitchFamily="34" charset="0"/>
               </a:rPr>
-              <a:t>Broad design decisions</a:t>
+              <a:t>Broad Design Decisions</a:t>
+            </a:r>
+            <a:endParaRPr lang="en-US" dirty="0">
+              <a:latin typeface="Gill Sans MT" pitchFamily="34" charset="0"/>
+            </a:endParaRPr>
+          </a:p>
+        </p:txBody>
+      </p:sp>
+      <p:sp>
+        <p:nvSpPr>
+          <p:cNvPr id="3" name="Content Placeholder 2"/>
+          <p:cNvSpPr>
+            <a:spLocks noGrp="1"/>
+          </p:cNvSpPr>
+          <p:nvPr>
+            <p:ph idx="1"/>
+          </p:nvPr>
+        </p:nvSpPr>
+        <p:spPr/>
+        <p:txBody>
+          <a:bodyPr/>
+          <a:lstStyle/>
+          <a:p>
+            <a:r>
+              <a:rPr lang="en-US" dirty="0" smtClean="0">
+                <a:latin typeface="Gill Sans MT" pitchFamily="34" charset="0"/>
+              </a:rPr>
+              <a:t>MVC</a:t>
+            </a:r>
+          </a:p>
+          <a:p>
+            <a:pPr lvl="1"/>
+            <a:r>
+              <a:rPr lang="en-US" dirty="0" smtClean="0">
+                <a:latin typeface="Gill Sans MT" pitchFamily="34" charset="0"/>
+              </a:rPr>
+              <a:t>Package for each module</a:t>
+            </a:r>
+          </a:p>
+          <a:p>
+            <a:pPr lvl="1"/>
+            <a:r>
+              <a:rPr lang="en-US" dirty="0" smtClean="0">
+                <a:latin typeface="Gill Sans MT" pitchFamily="34" charset="0"/>
+              </a:rPr>
+              <a:t>Model: Nouns as basis to Classes</a:t>
+            </a:r>
+          </a:p>
+          <a:p>
+            <a:pPr lvl="1"/>
+            <a:r>
+              <a:rPr lang="en-US" dirty="0" smtClean="0">
+                <a:latin typeface="Gill Sans MT" pitchFamily="34" charset="0"/>
+              </a:rPr>
+              <a:t>View: Swing and Graphics2D</a:t>
+            </a:r>
+          </a:p>
+          <a:p>
+            <a:pPr lvl="1"/>
+            <a:r>
+              <a:rPr lang="en-US" dirty="0" smtClean="0">
+                <a:latin typeface="Gill Sans MT" pitchFamily="34" charset="0"/>
+              </a:rPr>
+              <a:t>Controller: Listeners</a:t>
+            </a:r>
+          </a:p>
+          <a:p>
+            <a:r>
+              <a:rPr lang="en-US" dirty="0" smtClean="0">
+                <a:latin typeface="Gill Sans MT" pitchFamily="34" charset="0"/>
+              </a:rPr>
+              <a:t>Observer pattern</a:t>
+            </a:r>
+          </a:p>
+          <a:p>
+            <a:endParaRPr lang="en-US" dirty="0">
+              <a:latin typeface="Gill Sans MT" pitchFamily="34" charset="0"/>
+            </a:endParaRPr>
+          </a:p>
+        </p:txBody>
+      </p:sp>
+    </p:spTree>
+    <p:extLst>
+      <p:ext uri="{BB962C8B-B14F-4D97-AF65-F5344CB8AC3E}">
+        <p14:creationId xmlns:p14="http://schemas.microsoft.com/office/powerpoint/2010/main" val="3837477068"/>
+      </p:ext>
+    </p:extLst>
+  </p:cSld>
+  <p:clrMapOvr>
+    <a:masterClrMapping/>
+  </p:clrMapOvr>
+</p:sld>
+</file>
+
+<file path=ppt/slides/slide4.xml><?xml version="1.0" encoding="utf-8"?>
+<p:sld xmlns:a="http://schemas.openxmlformats.org/drawingml/2006/main" xmlns:r="http://schemas.openxmlformats.org/officeDocument/2006/relationships" xmlns:p="http://schemas.openxmlformats.org/presentationml/2006/main">
+  <p:cSld>
+    <p:spTree>
+      <p:nvGrpSpPr>
+        <p:cNvPr id="1" name=""/>
+        <p:cNvGrpSpPr/>
+        <p:nvPr/>
+      </p:nvGrpSpPr>
+      <p:grpSpPr>
+        <a:xfrm>
+          <a:off x="0" y="0"/>
+          <a:ext cx="0" cy="0"/>
+          <a:chOff x="0" y="0"/>
+          <a:chExt cx="0" cy="0"/>
+        </a:xfrm>
+      </p:grpSpPr>
+      <p:sp>
+        <p:nvSpPr>
+          <p:cNvPr id="2" name="Title 1"/>
+          <p:cNvSpPr>
+            <a:spLocks noGrp="1"/>
+          </p:cNvSpPr>
+          <p:nvPr>
+            <p:ph type="title"/>
+          </p:nvPr>
+        </p:nvSpPr>
+        <p:spPr/>
+        <p:txBody>
+          <a:bodyPr/>
+          <a:lstStyle/>
+          <a:p>
+            <a:r>
+              <a:rPr lang="en-US" dirty="0" smtClean="0">
+                <a:latin typeface="Gill Sans MT" pitchFamily="34" charset="0"/>
+              </a:rPr>
+              <a:t>Broad </a:t>
+            </a:r>
+            <a:r>
+              <a:rPr lang="en-US" dirty="0">
+                <a:latin typeface="Gill Sans MT" pitchFamily="34" charset="0"/>
+              </a:rPr>
+              <a:t>D</a:t>
+            </a:r>
+            <a:r>
+              <a:rPr lang="en-US" dirty="0" smtClean="0">
+                <a:latin typeface="Gill Sans MT" pitchFamily="34" charset="0"/>
+              </a:rPr>
+              <a:t>esign </a:t>
+            </a:r>
+            <a:r>
+              <a:rPr lang="en-US" dirty="0">
+                <a:latin typeface="Gill Sans MT" pitchFamily="34" charset="0"/>
+              </a:rPr>
+              <a:t>D</a:t>
+            </a:r>
+            <a:r>
+              <a:rPr lang="en-US" dirty="0" smtClean="0">
+                <a:latin typeface="Gill Sans MT" pitchFamily="34" charset="0"/>
+              </a:rPr>
+              <a:t>ecisions</a:t>
             </a:r>
             <a:endParaRPr lang="en-US" dirty="0">
               <a:latin typeface="Gill Sans MT" pitchFamily="34" charset="0"/>
@@ -3542,26 +3732,17 @@
               <a:rPr lang="en-US" dirty="0" smtClean="0">
                 <a:latin typeface="Gill Sans MT" pitchFamily="34" charset="0"/>
               </a:rPr>
-              <a:t>Open </a:t>
-            </a:r>
+              <a:t>Open recent</a:t>
+            </a:r>
+          </a:p>
+          <a:p>
+            <a:pPr lvl="1"/>
             <a:r>
               <a:rPr lang="en-US" dirty="0" smtClean="0">
                 <a:latin typeface="Gill Sans MT" pitchFamily="34" charset="0"/>
               </a:rPr>
-              <a:t>recent</a:t>
-            </a:r>
-          </a:p>
-          <a:p>
-            <a:pPr lvl="1"/>
-            <a:r>
-              <a:rPr lang="en-US" dirty="0" smtClean="0">
-                <a:latin typeface="Gill Sans MT" pitchFamily="34" charset="0"/>
-              </a:rPr>
               <a:t>HTML user manual</a:t>
             </a:r>
-            <a:endParaRPr lang="en-US" dirty="0" smtClean="0">
-              <a:latin typeface="Gill Sans MT" pitchFamily="34" charset="0"/>
-            </a:endParaRPr>
           </a:p>
           <a:p>
             <a:pPr lvl="1"/>

</xml_diff>

<commit_message>
* Slide are better
</commit_message>
<xml_diff>
--- a/doc/Final Presentation/Slides.pptx
+++ b/doc/Final Presentation/Slides.pptx
@@ -3219,26 +3219,32 @@
       </p:grpSpPr>
       <p:sp>
         <p:nvSpPr>
-          <p:cNvPr id="2" name="Title 1"/>
-          <p:cNvSpPr>
-            <a:spLocks noGrp="1"/>
-          </p:cNvSpPr>
-          <p:nvPr>
-            <p:ph type="title"/>
-          </p:nvPr>
-        </p:nvSpPr>
-        <p:spPr/>
-        <p:txBody>
-          <a:bodyPr/>
-          <a:lstStyle/>
-          <a:p>
-            <a:r>
-              <a:rPr lang="en-US" dirty="0" smtClean="0">
+          <p:cNvPr id="9" name="Slide Number Placeholder 3"/>
+          <p:cNvSpPr>
+            <a:spLocks noGrp="1"/>
+          </p:cNvSpPr>
+          <p:nvPr>
+            <p:ph type="sldNum" sz="quarter" idx="10"/>
+          </p:nvPr>
+        </p:nvSpPr>
+        <p:spPr>
+          <a:xfrm>
+            <a:off x="8404225" y="6454775"/>
+            <a:ext cx="282575" cy="266700"/>
+          </a:xfrm>
+        </p:spPr>
+        <p:txBody>
+          <a:bodyPr/>
+          <a:lstStyle/>
+          <a:p>
+            <a:fld id="{A5B05C2E-49A5-42E3-A048-7BA5121127BA}" type="slidenum">
+              <a:rPr lang="en-US">
                 <a:latin typeface="Gill Sans MT" pitchFamily="34" charset="0"/>
               </a:rPr>
-              <a:t>Who we are</a:t>
-            </a:r>
-            <a:endParaRPr lang="en-US" dirty="0">
+              <a:pPr/>
+              <a:t>2</a:t>
+            </a:fld>
+            <a:endParaRPr lang="en-US">
               <a:latin typeface="Gill Sans MT" pitchFamily="34" charset="0"/>
             </a:endParaRPr>
           </a:p>
@@ -3246,161 +3252,238 @@
       </p:sp>
       <p:sp>
         <p:nvSpPr>
-          <p:cNvPr id="3" name="Content Placeholder 2"/>
-          <p:cNvSpPr>
-            <a:spLocks noGrp="1"/>
-          </p:cNvSpPr>
-          <p:nvPr>
-            <p:ph idx="1"/>
+          <p:cNvPr id="10" name="Rectangle 1"/>
+          <p:cNvSpPr>
+            <a:spLocks noChangeArrowheads="1"/>
+          </p:cNvSpPr>
+          <p:nvPr>
+            <p:ph type="title"/>
           </p:nvPr>
         </p:nvSpPr>
         <p:spPr>
           <a:xfrm>
-            <a:off x="457200" y="1600200"/>
-            <a:ext cx="8229600" cy="4953000"/>
+            <a:off x="457200" y="274638"/>
+            <a:ext cx="8229600" cy="1143000"/>
           </a:xfrm>
+          <a:ln/>
         </p:spPr>
         <p:txBody>
-          <a:bodyPr>
+          <a:bodyPr/>
+          <a:lstStyle/>
+          <a:p>
+            <a:r>
+              <a:rPr lang="en-US">
+                <a:latin typeface="Gill Sans MT" pitchFamily="34" charset="0"/>
+              </a:rPr>
+              <a:t>Process</a:t>
+            </a:r>
+          </a:p>
+        </p:txBody>
+      </p:sp>
+      <p:sp>
+        <p:nvSpPr>
+          <p:cNvPr id="11" name="Rectangle 2"/>
+          <p:cNvSpPr txBox="1">
+            <a:spLocks noChangeArrowheads="1"/>
+          </p:cNvSpPr>
+          <p:nvPr/>
+        </p:nvSpPr>
+        <p:spPr>
+          <a:xfrm>
+            <a:off x="457200" y="1598613"/>
+            <a:ext cx="8229600" cy="4527550"/>
+          </a:xfrm>
+          <a:prstGeom prst="rect">
+            <a:avLst/>
+          </a:prstGeom>
+          <a:ln/>
+        </p:spPr>
+        <p:txBody>
+          <a:bodyPr vert="horz" lIns="91440" tIns="45720" rIns="91440" bIns="45720" rtlCol="0">
             <a:normAutofit/>
           </a:bodyPr>
-          <a:lstStyle/>
-          <a:p>
-            <a:r>
-              <a:rPr lang="en-US" dirty="0" smtClean="0">
+          <a:lstStyle>
+            <a:lvl1pPr marL="342900" indent="-342900" algn="l" defTabSz="914400" rtl="0" eaLnBrk="1" latinLnBrk="0" hangingPunct="1">
+              <a:spcBef>
+                <a:spcPct val="20000"/>
+              </a:spcBef>
+              <a:buFont typeface="Arial" pitchFamily="34" charset="0"/>
+              <a:buChar char="•"/>
+              <a:defRPr sz="3200" kern="1200">
+                <a:solidFill>
+                  <a:schemeClr val="tx1"/>
+                </a:solidFill>
+                <a:latin typeface="+mn-lt"/>
+                <a:ea typeface="+mn-ea"/>
+                <a:cs typeface="+mn-cs"/>
+              </a:defRPr>
+            </a:lvl1pPr>
+            <a:lvl2pPr marL="742950" indent="-285750" algn="l" defTabSz="914400" rtl="0" eaLnBrk="1" latinLnBrk="0" hangingPunct="1">
+              <a:spcBef>
+                <a:spcPct val="20000"/>
+              </a:spcBef>
+              <a:buFont typeface="Arial" pitchFamily="34" charset="0"/>
+              <a:buChar char="–"/>
+              <a:defRPr sz="2800" kern="1200">
+                <a:solidFill>
+                  <a:schemeClr val="tx1"/>
+                </a:solidFill>
+                <a:latin typeface="+mn-lt"/>
+                <a:ea typeface="+mn-ea"/>
+                <a:cs typeface="+mn-cs"/>
+              </a:defRPr>
+            </a:lvl2pPr>
+            <a:lvl3pPr marL="1143000" indent="-228600" algn="l" defTabSz="914400" rtl="0" eaLnBrk="1" latinLnBrk="0" hangingPunct="1">
+              <a:spcBef>
+                <a:spcPct val="20000"/>
+              </a:spcBef>
+              <a:buFont typeface="Arial" pitchFamily="34" charset="0"/>
+              <a:buChar char="•"/>
+              <a:defRPr sz="2400" kern="1200">
+                <a:solidFill>
+                  <a:schemeClr val="tx1"/>
+                </a:solidFill>
+                <a:latin typeface="+mn-lt"/>
+                <a:ea typeface="+mn-ea"/>
+                <a:cs typeface="+mn-cs"/>
+              </a:defRPr>
+            </a:lvl3pPr>
+            <a:lvl4pPr marL="1600200" indent="-228600" algn="l" defTabSz="914400" rtl="0" eaLnBrk="1" latinLnBrk="0" hangingPunct="1">
+              <a:spcBef>
+                <a:spcPct val="20000"/>
+              </a:spcBef>
+              <a:buFont typeface="Arial" pitchFamily="34" charset="0"/>
+              <a:buChar char="–"/>
+              <a:defRPr sz="2000" kern="1200">
+                <a:solidFill>
+                  <a:schemeClr val="tx1"/>
+                </a:solidFill>
+                <a:latin typeface="+mn-lt"/>
+                <a:ea typeface="+mn-ea"/>
+                <a:cs typeface="+mn-cs"/>
+              </a:defRPr>
+            </a:lvl4pPr>
+            <a:lvl5pPr marL="2057400" indent="-228600" algn="l" defTabSz="914400" rtl="0" eaLnBrk="1" latinLnBrk="0" hangingPunct="1">
+              <a:spcBef>
+                <a:spcPct val="20000"/>
+              </a:spcBef>
+              <a:buFont typeface="Arial" pitchFamily="34" charset="0"/>
+              <a:buChar char="»"/>
+              <a:defRPr sz="2000" kern="1200">
+                <a:solidFill>
+                  <a:schemeClr val="tx1"/>
+                </a:solidFill>
+                <a:latin typeface="+mn-lt"/>
+                <a:ea typeface="+mn-ea"/>
+                <a:cs typeface="+mn-cs"/>
+              </a:defRPr>
+            </a:lvl5pPr>
+            <a:lvl6pPr marL="2514600" indent="-228600" algn="l" defTabSz="914400" rtl="0" eaLnBrk="1" latinLnBrk="0" hangingPunct="1">
+              <a:spcBef>
+                <a:spcPct val="20000"/>
+              </a:spcBef>
+              <a:buFont typeface="Arial" pitchFamily="34" charset="0"/>
+              <a:buChar char="•"/>
+              <a:defRPr sz="2000" kern="1200">
+                <a:solidFill>
+                  <a:schemeClr val="tx1"/>
+                </a:solidFill>
+                <a:latin typeface="+mn-lt"/>
+                <a:ea typeface="+mn-ea"/>
+                <a:cs typeface="+mn-cs"/>
+              </a:defRPr>
+            </a:lvl6pPr>
+            <a:lvl7pPr marL="2971800" indent="-228600" algn="l" defTabSz="914400" rtl="0" eaLnBrk="1" latinLnBrk="0" hangingPunct="1">
+              <a:spcBef>
+                <a:spcPct val="20000"/>
+              </a:spcBef>
+              <a:buFont typeface="Arial" pitchFamily="34" charset="0"/>
+              <a:buChar char="•"/>
+              <a:defRPr sz="2000" kern="1200">
+                <a:solidFill>
+                  <a:schemeClr val="tx1"/>
+                </a:solidFill>
+                <a:latin typeface="+mn-lt"/>
+                <a:ea typeface="+mn-ea"/>
+                <a:cs typeface="+mn-cs"/>
+              </a:defRPr>
+            </a:lvl7pPr>
+            <a:lvl8pPr marL="3429000" indent="-228600" algn="l" defTabSz="914400" rtl="0" eaLnBrk="1" latinLnBrk="0" hangingPunct="1">
+              <a:spcBef>
+                <a:spcPct val="20000"/>
+              </a:spcBef>
+              <a:buFont typeface="Arial" pitchFamily="34" charset="0"/>
+              <a:buChar char="•"/>
+              <a:defRPr sz="2000" kern="1200">
+                <a:solidFill>
+                  <a:schemeClr val="tx1"/>
+                </a:solidFill>
+                <a:latin typeface="+mn-lt"/>
+                <a:ea typeface="+mn-ea"/>
+                <a:cs typeface="+mn-cs"/>
+              </a:defRPr>
+            </a:lvl8pPr>
+            <a:lvl9pPr marL="3886200" indent="-228600" algn="l" defTabSz="914400" rtl="0" eaLnBrk="1" latinLnBrk="0" hangingPunct="1">
+              <a:spcBef>
+                <a:spcPct val="20000"/>
+              </a:spcBef>
+              <a:buFont typeface="Arial" pitchFamily="34" charset="0"/>
+              <a:buChar char="•"/>
+              <a:defRPr sz="2000" kern="1200">
+                <a:solidFill>
+                  <a:schemeClr val="tx1"/>
+                </a:solidFill>
+                <a:latin typeface="+mn-lt"/>
+                <a:ea typeface="+mn-ea"/>
+                <a:cs typeface="+mn-cs"/>
+              </a:defRPr>
+            </a:lvl9pPr>
+          </a:lstStyle>
+          <a:p>
+            <a:endParaRPr lang="en-US" smtClean="0">
+              <a:latin typeface="Gill Sans MT" pitchFamily="34" charset="0"/>
+            </a:endParaRPr>
+          </a:p>
+          <a:p>
+            <a:r>
+              <a:rPr lang="en-US" smtClean="0">
                 <a:latin typeface="Gill Sans MT" pitchFamily="34" charset="0"/>
               </a:rPr>
-              <a:t>Two </a:t>
-            </a:r>
-            <a:r>
-              <a:rPr lang="en-US" dirty="0" smtClean="0">
+              <a:t>Task Breakdown</a:t>
+            </a:r>
+          </a:p>
+          <a:p>
+            <a:r>
+              <a:rPr lang="en-US" smtClean="0">
                 <a:latin typeface="Gill Sans MT" pitchFamily="34" charset="0"/>
               </a:rPr>
-              <a:t>programming </a:t>
-            </a:r>
-            <a:r>
-              <a:rPr lang="en-US" dirty="0" smtClean="0">
+              <a:t>Task Allocation</a:t>
+            </a:r>
+          </a:p>
+          <a:p>
+            <a:r>
+              <a:rPr lang="en-US" smtClean="0">
                 <a:latin typeface="Gill Sans MT" pitchFamily="34" charset="0"/>
               </a:rPr>
-              <a:t>pairs and a lone ranger</a:t>
-            </a:r>
-          </a:p>
-          <a:p>
-            <a:pPr lvl="1"/>
-            <a:r>
-              <a:rPr lang="en-US" dirty="0" smtClean="0">
+              <a:t>Development Process</a:t>
+            </a:r>
+          </a:p>
+          <a:p>
+            <a:r>
+              <a:rPr lang="en-US" smtClean="0">
                 <a:latin typeface="Gill Sans MT" pitchFamily="34" charset="0"/>
               </a:rPr>
-              <a:t>Edward and </a:t>
-            </a:r>
-            <a:r>
-              <a:rPr lang="en-US" dirty="0" err="1" smtClean="0">
+              <a:t>Tools</a:t>
+            </a:r>
+          </a:p>
+          <a:p>
+            <a:r>
+              <a:rPr lang="en-US" smtClean="0">
                 <a:latin typeface="Gill Sans MT" pitchFamily="34" charset="0"/>
               </a:rPr>
-              <a:t>Kristian</a:t>
-            </a:r>
-            <a:r>
-              <a:rPr lang="en-US" dirty="0" smtClean="0">
-                <a:latin typeface="Gill Sans MT" pitchFamily="34" charset="0"/>
-              </a:rPr>
-              <a:t> on View</a:t>
-            </a:r>
-          </a:p>
-          <a:p>
-            <a:pPr lvl="1"/>
-            <a:r>
-              <a:rPr lang="en-US" dirty="0" smtClean="0">
-                <a:latin typeface="Gill Sans MT" pitchFamily="34" charset="0"/>
-              </a:rPr>
-              <a:t>Kelvin and Oscar on Model</a:t>
-            </a:r>
-          </a:p>
-          <a:p>
-            <a:pPr lvl="1"/>
-            <a:r>
-              <a:rPr lang="en-US" dirty="0" smtClean="0">
-                <a:latin typeface="Gill Sans MT" pitchFamily="34" charset="0"/>
-              </a:rPr>
-              <a:t>Brian on Controller </a:t>
-            </a:r>
-          </a:p>
-          <a:p>
-            <a:pPr lvl="1"/>
-            <a:r>
-              <a:rPr lang="en-US" dirty="0" smtClean="0">
-                <a:latin typeface="Gill Sans MT" pitchFamily="34" charset="0"/>
-              </a:rPr>
-              <a:t>Edward and Brian both contributed to GUI work</a:t>
-            </a:r>
-          </a:p>
-          <a:p>
-            <a:r>
-              <a:rPr lang="en-US" dirty="0" smtClean="0">
-                <a:latin typeface="Gill Sans MT" pitchFamily="34" charset="0"/>
-              </a:rPr>
-              <a:t>From last time</a:t>
-            </a:r>
-          </a:p>
-          <a:p>
-            <a:pPr lvl="1"/>
-            <a:r>
-              <a:rPr lang="en-US" dirty="0" smtClean="0">
-                <a:latin typeface="Gill Sans MT" pitchFamily="34" charset="0"/>
-              </a:rPr>
-              <a:t>Spiral model </a:t>
-            </a:r>
-            <a:r>
-              <a:rPr lang="en-US" dirty="0" smtClean="0">
-                <a:latin typeface="Gill Sans MT" pitchFamily="34" charset="0"/>
-              </a:rPr>
-              <a:t>methodology</a:t>
-            </a:r>
-          </a:p>
-          <a:p>
-            <a:pPr lvl="1"/>
-            <a:r>
-              <a:rPr lang="en-US" dirty="0" smtClean="0">
-                <a:latin typeface="Gill Sans MT" pitchFamily="34" charset="0"/>
-              </a:rPr>
-              <a:t>Lots of meetings plus Facebook Group</a:t>
-            </a:r>
-            <a:endParaRPr lang="en-US" dirty="0" smtClean="0">
-              <a:latin typeface="Gill Sans MT" pitchFamily="34" charset="0"/>
-            </a:endParaRPr>
-          </a:p>
-          <a:p>
-            <a:pPr lvl="1"/>
-            <a:r>
-              <a:rPr lang="en-US" dirty="0" smtClean="0">
-                <a:latin typeface="Gill Sans MT" pitchFamily="34" charset="0"/>
-              </a:rPr>
-              <a:t>Google </a:t>
-            </a:r>
-            <a:r>
-              <a:rPr lang="en-US" dirty="0" err="1" smtClean="0">
-                <a:latin typeface="Gill Sans MT" pitchFamily="34" charset="0"/>
-              </a:rPr>
-              <a:t>WBPro</a:t>
-            </a:r>
-            <a:r>
-              <a:rPr lang="en-US" dirty="0" smtClean="0">
-                <a:latin typeface="Gill Sans MT" pitchFamily="34" charset="0"/>
-              </a:rPr>
-              <a:t> used to speed up GUI building</a:t>
-            </a:r>
-          </a:p>
-          <a:p>
-            <a:endParaRPr lang="en-US" dirty="0" smtClean="0">
-              <a:latin typeface="Gill Sans MT" pitchFamily="34" charset="0"/>
-            </a:endParaRPr>
-          </a:p>
-          <a:p>
-            <a:endParaRPr lang="en-US" dirty="0" smtClean="0">
-              <a:latin typeface="Gill Sans MT" pitchFamily="34" charset="0"/>
-            </a:endParaRPr>
-          </a:p>
-          <a:p>
-            <a:endParaRPr lang="en-US" dirty="0">
+              <a:t>Meetings</a:t>
+            </a:r>
+            <a:endParaRPr lang="en-US">
               <a:latin typeface="Gill Sans MT" pitchFamily="34" charset="0"/>
             </a:endParaRPr>
           </a:p>
@@ -3445,26 +3528,32 @@
       </p:grpSpPr>
       <p:sp>
         <p:nvSpPr>
-          <p:cNvPr id="2" name="Title 1"/>
-          <p:cNvSpPr>
-            <a:spLocks noGrp="1"/>
-          </p:cNvSpPr>
-          <p:nvPr>
-            <p:ph type="title"/>
-          </p:nvPr>
-        </p:nvSpPr>
-        <p:spPr/>
-        <p:txBody>
-          <a:bodyPr/>
-          <a:lstStyle/>
-          <a:p>
-            <a:r>
-              <a:rPr lang="en-US" dirty="0" smtClean="0">
+          <p:cNvPr id="6" name="Slide Number Placeholder 3"/>
+          <p:cNvSpPr>
+            <a:spLocks noGrp="1"/>
+          </p:cNvSpPr>
+          <p:nvPr>
+            <p:ph type="sldNum" sz="quarter" idx="10"/>
+          </p:nvPr>
+        </p:nvSpPr>
+        <p:spPr>
+          <a:xfrm>
+            <a:off x="8404225" y="6454775"/>
+            <a:ext cx="282575" cy="266700"/>
+          </a:xfrm>
+        </p:spPr>
+        <p:txBody>
+          <a:bodyPr/>
+          <a:lstStyle/>
+          <a:p>
+            <a:fld id="{0131F770-F55E-442C-9C7D-183437E6F59A}" type="slidenum">
+              <a:rPr lang="en-US">
                 <a:latin typeface="Gill Sans MT" pitchFamily="34" charset="0"/>
               </a:rPr>
-              <a:t>Broad Design Decisions</a:t>
-            </a:r>
-            <a:endParaRPr lang="en-US" dirty="0">
+              <a:pPr/>
+              <a:t>3</a:t>
+            </a:fld>
+            <a:endParaRPr lang="en-US">
               <a:latin typeface="Gill Sans MT" pitchFamily="34" charset="0"/>
             </a:endParaRPr>
           </a:p>
@@ -3472,72 +3561,230 @@
       </p:sp>
       <p:sp>
         <p:nvSpPr>
-          <p:cNvPr id="3" name="Content Placeholder 2"/>
-          <p:cNvSpPr>
-            <a:spLocks noGrp="1"/>
-          </p:cNvSpPr>
-          <p:nvPr>
-            <p:ph idx="1"/>
-          </p:nvPr>
-        </p:nvSpPr>
-        <p:spPr/>
-        <p:txBody>
-          <a:bodyPr/>
-          <a:lstStyle/>
-          <a:p>
-            <a:r>
-              <a:rPr lang="en-US" dirty="0" smtClean="0">
+          <p:cNvPr id="7" name="Rectangle 1"/>
+          <p:cNvSpPr>
+            <a:spLocks noChangeArrowheads="1"/>
+          </p:cNvSpPr>
+          <p:nvPr>
+            <p:ph type="title"/>
+          </p:nvPr>
+        </p:nvSpPr>
+        <p:spPr>
+          <a:xfrm>
+            <a:off x="457200" y="274638"/>
+            <a:ext cx="8229600" cy="1143000"/>
+          </a:xfrm>
+          <a:ln/>
+        </p:spPr>
+        <p:txBody>
+          <a:bodyPr/>
+          <a:lstStyle/>
+          <a:p>
+            <a:r>
+              <a:rPr lang="en-US">
                 <a:latin typeface="Gill Sans MT" pitchFamily="34" charset="0"/>
               </a:rPr>
-              <a:t>MVC</a:t>
-            </a:r>
-          </a:p>
-          <a:p>
-            <a:pPr lvl="1"/>
-            <a:r>
-              <a:rPr lang="en-US" dirty="0" smtClean="0">
+              <a:t>Dynamics</a:t>
+            </a:r>
+          </a:p>
+        </p:txBody>
+      </p:sp>
+      <p:sp>
+        <p:nvSpPr>
+          <p:cNvPr id="8" name="Rectangle 2"/>
+          <p:cNvSpPr txBox="1">
+            <a:spLocks noChangeArrowheads="1"/>
+          </p:cNvSpPr>
+          <p:nvPr/>
+        </p:nvSpPr>
+        <p:spPr>
+          <a:xfrm>
+            <a:off x="457200" y="1598613"/>
+            <a:ext cx="8229600" cy="4527550"/>
+          </a:xfrm>
+          <a:prstGeom prst="rect">
+            <a:avLst/>
+          </a:prstGeom>
+          <a:ln/>
+        </p:spPr>
+        <p:txBody>
+          <a:bodyPr vert="horz" lIns="91440" tIns="45720" rIns="91440" bIns="45720" rtlCol="0">
+            <a:normAutofit/>
+          </a:bodyPr>
+          <a:lstStyle>
+            <a:lvl1pPr marL="342900" indent="-342900" algn="l" defTabSz="914400" rtl="0" eaLnBrk="1" latinLnBrk="0" hangingPunct="1">
+              <a:spcBef>
+                <a:spcPct val="20000"/>
+              </a:spcBef>
+              <a:buFont typeface="Arial" pitchFamily="34" charset="0"/>
+              <a:buChar char="•"/>
+              <a:defRPr sz="3200" kern="1200">
+                <a:solidFill>
+                  <a:schemeClr val="tx1"/>
+                </a:solidFill>
+                <a:latin typeface="+mn-lt"/>
+                <a:ea typeface="+mn-ea"/>
+                <a:cs typeface="+mn-cs"/>
+              </a:defRPr>
+            </a:lvl1pPr>
+            <a:lvl2pPr marL="742950" indent="-285750" algn="l" defTabSz="914400" rtl="0" eaLnBrk="1" latinLnBrk="0" hangingPunct="1">
+              <a:spcBef>
+                <a:spcPct val="20000"/>
+              </a:spcBef>
+              <a:buFont typeface="Arial" pitchFamily="34" charset="0"/>
+              <a:buChar char="–"/>
+              <a:defRPr sz="2800" kern="1200">
+                <a:solidFill>
+                  <a:schemeClr val="tx1"/>
+                </a:solidFill>
+                <a:latin typeface="+mn-lt"/>
+                <a:ea typeface="+mn-ea"/>
+                <a:cs typeface="+mn-cs"/>
+              </a:defRPr>
+            </a:lvl2pPr>
+            <a:lvl3pPr marL="1143000" indent="-228600" algn="l" defTabSz="914400" rtl="0" eaLnBrk="1" latinLnBrk="0" hangingPunct="1">
+              <a:spcBef>
+                <a:spcPct val="20000"/>
+              </a:spcBef>
+              <a:buFont typeface="Arial" pitchFamily="34" charset="0"/>
+              <a:buChar char="•"/>
+              <a:defRPr sz="2400" kern="1200">
+                <a:solidFill>
+                  <a:schemeClr val="tx1"/>
+                </a:solidFill>
+                <a:latin typeface="+mn-lt"/>
+                <a:ea typeface="+mn-ea"/>
+                <a:cs typeface="+mn-cs"/>
+              </a:defRPr>
+            </a:lvl3pPr>
+            <a:lvl4pPr marL="1600200" indent="-228600" algn="l" defTabSz="914400" rtl="0" eaLnBrk="1" latinLnBrk="0" hangingPunct="1">
+              <a:spcBef>
+                <a:spcPct val="20000"/>
+              </a:spcBef>
+              <a:buFont typeface="Arial" pitchFamily="34" charset="0"/>
+              <a:buChar char="–"/>
+              <a:defRPr sz="2000" kern="1200">
+                <a:solidFill>
+                  <a:schemeClr val="tx1"/>
+                </a:solidFill>
+                <a:latin typeface="+mn-lt"/>
+                <a:ea typeface="+mn-ea"/>
+                <a:cs typeface="+mn-cs"/>
+              </a:defRPr>
+            </a:lvl4pPr>
+            <a:lvl5pPr marL="2057400" indent="-228600" algn="l" defTabSz="914400" rtl="0" eaLnBrk="1" latinLnBrk="0" hangingPunct="1">
+              <a:spcBef>
+                <a:spcPct val="20000"/>
+              </a:spcBef>
+              <a:buFont typeface="Arial" pitchFamily="34" charset="0"/>
+              <a:buChar char="»"/>
+              <a:defRPr sz="2000" kern="1200">
+                <a:solidFill>
+                  <a:schemeClr val="tx1"/>
+                </a:solidFill>
+                <a:latin typeface="+mn-lt"/>
+                <a:ea typeface="+mn-ea"/>
+                <a:cs typeface="+mn-cs"/>
+              </a:defRPr>
+            </a:lvl5pPr>
+            <a:lvl6pPr marL="2514600" indent="-228600" algn="l" defTabSz="914400" rtl="0" eaLnBrk="1" latinLnBrk="0" hangingPunct="1">
+              <a:spcBef>
+                <a:spcPct val="20000"/>
+              </a:spcBef>
+              <a:buFont typeface="Arial" pitchFamily="34" charset="0"/>
+              <a:buChar char="•"/>
+              <a:defRPr sz="2000" kern="1200">
+                <a:solidFill>
+                  <a:schemeClr val="tx1"/>
+                </a:solidFill>
+                <a:latin typeface="+mn-lt"/>
+                <a:ea typeface="+mn-ea"/>
+                <a:cs typeface="+mn-cs"/>
+              </a:defRPr>
+            </a:lvl6pPr>
+            <a:lvl7pPr marL="2971800" indent="-228600" algn="l" defTabSz="914400" rtl="0" eaLnBrk="1" latinLnBrk="0" hangingPunct="1">
+              <a:spcBef>
+                <a:spcPct val="20000"/>
+              </a:spcBef>
+              <a:buFont typeface="Arial" pitchFamily="34" charset="0"/>
+              <a:buChar char="•"/>
+              <a:defRPr sz="2000" kern="1200">
+                <a:solidFill>
+                  <a:schemeClr val="tx1"/>
+                </a:solidFill>
+                <a:latin typeface="+mn-lt"/>
+                <a:ea typeface="+mn-ea"/>
+                <a:cs typeface="+mn-cs"/>
+              </a:defRPr>
+            </a:lvl7pPr>
+            <a:lvl8pPr marL="3429000" indent="-228600" algn="l" defTabSz="914400" rtl="0" eaLnBrk="1" latinLnBrk="0" hangingPunct="1">
+              <a:spcBef>
+                <a:spcPct val="20000"/>
+              </a:spcBef>
+              <a:buFont typeface="Arial" pitchFamily="34" charset="0"/>
+              <a:buChar char="•"/>
+              <a:defRPr sz="2000" kern="1200">
+                <a:solidFill>
+                  <a:schemeClr val="tx1"/>
+                </a:solidFill>
+                <a:latin typeface="+mn-lt"/>
+                <a:ea typeface="+mn-ea"/>
+                <a:cs typeface="+mn-cs"/>
+              </a:defRPr>
+            </a:lvl8pPr>
+            <a:lvl9pPr marL="3886200" indent="-228600" algn="l" defTabSz="914400" rtl="0" eaLnBrk="1" latinLnBrk="0" hangingPunct="1">
+              <a:spcBef>
+                <a:spcPct val="20000"/>
+              </a:spcBef>
+              <a:buFont typeface="Arial" pitchFamily="34" charset="0"/>
+              <a:buChar char="•"/>
+              <a:defRPr sz="2000" kern="1200">
+                <a:solidFill>
+                  <a:schemeClr val="tx1"/>
+                </a:solidFill>
+                <a:latin typeface="+mn-lt"/>
+                <a:ea typeface="+mn-ea"/>
+                <a:cs typeface="+mn-cs"/>
+              </a:defRPr>
+            </a:lvl9pPr>
+          </a:lstStyle>
+          <a:p>
+            <a:endParaRPr lang="en-US" smtClean="0">
+              <a:latin typeface="Gill Sans MT" pitchFamily="34" charset="0"/>
+            </a:endParaRPr>
+          </a:p>
+          <a:p>
+            <a:r>
+              <a:rPr lang="en-US" smtClean="0">
                 <a:latin typeface="Gill Sans MT" pitchFamily="34" charset="0"/>
               </a:rPr>
-              <a:t>Package for each module</a:t>
-            </a:r>
-          </a:p>
-          <a:p>
-            <a:pPr lvl="1"/>
-            <a:r>
-              <a:rPr lang="en-US" dirty="0" smtClean="0">
+              <a:t>Formal Meetings</a:t>
+            </a:r>
+          </a:p>
+          <a:p>
+            <a:r>
+              <a:rPr lang="en-US" smtClean="0">
                 <a:latin typeface="Gill Sans MT" pitchFamily="34" charset="0"/>
               </a:rPr>
-              <a:t>Model: Nouns as basis to Classes</a:t>
-            </a:r>
-          </a:p>
-          <a:p>
-            <a:pPr lvl="1"/>
-            <a:r>
-              <a:rPr lang="en-US" dirty="0" smtClean="0">
+              <a:t>Informal Meetings</a:t>
+            </a:r>
+          </a:p>
+          <a:p>
+            <a:r>
+              <a:rPr lang="en-US" smtClean="0">
                 <a:latin typeface="Gill Sans MT" pitchFamily="34" charset="0"/>
               </a:rPr>
-              <a:t>View: Swing and Graphics2D</a:t>
-            </a:r>
-          </a:p>
-          <a:p>
-            <a:pPr lvl="1"/>
-            <a:r>
-              <a:rPr lang="en-US" dirty="0" smtClean="0">
+              <a:t>Facebook Group</a:t>
+            </a:r>
+          </a:p>
+          <a:p>
+            <a:r>
+              <a:rPr lang="en-US" smtClean="0">
                 <a:latin typeface="Gill Sans MT" pitchFamily="34" charset="0"/>
               </a:rPr>
-              <a:t>Controller: Listeners</a:t>
-            </a:r>
-          </a:p>
-          <a:p>
-            <a:r>
-              <a:rPr lang="en-US" dirty="0" smtClean="0">
-                <a:latin typeface="Gill Sans MT" pitchFamily="34" charset="0"/>
-              </a:rPr>
-              <a:t>Observer pattern</a:t>
-            </a:r>
-          </a:p>
-          <a:p>
-            <a:endParaRPr lang="en-US" dirty="0">
+              <a:t>Pair Programming</a:t>
+            </a:r>
+            <a:endParaRPr lang="en-US">
               <a:latin typeface="Gill Sans MT" pitchFamily="34" charset="0"/>
             </a:endParaRPr>
           </a:p>
@@ -3575,184 +3822,263 @@
       </p:grpSpPr>
       <p:sp>
         <p:nvSpPr>
-          <p:cNvPr id="2" name="Title 1"/>
-          <p:cNvSpPr>
-            <a:spLocks noGrp="1"/>
-          </p:cNvSpPr>
-          <p:nvPr>
-            <p:ph type="title"/>
-          </p:nvPr>
-        </p:nvSpPr>
-        <p:spPr/>
-        <p:txBody>
-          <a:bodyPr/>
-          <a:lstStyle/>
-          <a:p>
-            <a:r>
-              <a:rPr lang="en-US" dirty="0" smtClean="0">
+          <p:cNvPr id="6" name="Slide Number Placeholder 3"/>
+          <p:cNvSpPr>
+            <a:spLocks noGrp="1"/>
+          </p:cNvSpPr>
+          <p:nvPr>
+            <p:ph type="sldNum" sz="quarter" idx="10"/>
+          </p:nvPr>
+        </p:nvSpPr>
+        <p:spPr>
+          <a:xfrm>
+            <a:off x="8404225" y="6454775"/>
+            <a:ext cx="282575" cy="266700"/>
+          </a:xfrm>
+        </p:spPr>
+        <p:txBody>
+          <a:bodyPr/>
+          <a:lstStyle/>
+          <a:p>
+            <a:fld id="{2AFE2A32-D363-4CAE-90D0-B1A13627C828}" type="slidenum">
+              <a:rPr lang="en-US">
                 <a:latin typeface="Gill Sans MT" pitchFamily="34" charset="0"/>
               </a:rPr>
-              <a:t>Broad </a:t>
-            </a:r>
-            <a:r>
-              <a:rPr lang="en-US" dirty="0">
+              <a:pPr/>
+              <a:t>4</a:t>
+            </a:fld>
+            <a:endParaRPr lang="en-US">
+              <a:latin typeface="Gill Sans MT" pitchFamily="34" charset="0"/>
+            </a:endParaRPr>
+          </a:p>
+        </p:txBody>
+      </p:sp>
+      <p:sp>
+        <p:nvSpPr>
+          <p:cNvPr id="7" name="Rectangle 1"/>
+          <p:cNvSpPr>
+            <a:spLocks noChangeArrowheads="1"/>
+          </p:cNvSpPr>
+          <p:nvPr>
+            <p:ph type="title"/>
+          </p:nvPr>
+        </p:nvSpPr>
+        <p:spPr>
+          <a:xfrm>
+            <a:off x="457200" y="274638"/>
+            <a:ext cx="8229600" cy="1143000"/>
+          </a:xfrm>
+          <a:ln/>
+        </p:spPr>
+        <p:txBody>
+          <a:bodyPr/>
+          <a:lstStyle/>
+          <a:p>
+            <a:r>
+              <a:rPr lang="en-US">
                 <a:latin typeface="Gill Sans MT" pitchFamily="34" charset="0"/>
               </a:rPr>
-              <a:t>D</a:t>
-            </a:r>
-            <a:r>
-              <a:rPr lang="en-US" dirty="0" smtClean="0">
+              <a:t>Design</a:t>
+            </a:r>
+          </a:p>
+        </p:txBody>
+      </p:sp>
+      <p:sp>
+        <p:nvSpPr>
+          <p:cNvPr id="8" name="Rectangle 2"/>
+          <p:cNvSpPr txBox="1">
+            <a:spLocks noChangeArrowheads="1"/>
+          </p:cNvSpPr>
+          <p:nvPr/>
+        </p:nvSpPr>
+        <p:spPr>
+          <a:xfrm>
+            <a:off x="457200" y="1598613"/>
+            <a:ext cx="8229600" cy="4527550"/>
+          </a:xfrm>
+          <a:prstGeom prst="rect">
+            <a:avLst/>
+          </a:prstGeom>
+          <a:ln/>
+        </p:spPr>
+        <p:txBody>
+          <a:bodyPr vert="horz" lIns="91440" tIns="45720" rIns="91440" bIns="45720" rtlCol="0">
+            <a:normAutofit/>
+          </a:bodyPr>
+          <a:lstStyle>
+            <a:lvl1pPr marL="342900" indent="-342900" algn="l" defTabSz="914400" rtl="0" eaLnBrk="1" latinLnBrk="0" hangingPunct="1">
+              <a:spcBef>
+                <a:spcPct val="20000"/>
+              </a:spcBef>
+              <a:buFont typeface="Arial" pitchFamily="34" charset="0"/>
+              <a:buChar char="•"/>
+              <a:defRPr sz="3200" kern="1200">
+                <a:solidFill>
+                  <a:schemeClr val="tx1"/>
+                </a:solidFill>
+                <a:latin typeface="+mn-lt"/>
+                <a:ea typeface="+mn-ea"/>
+                <a:cs typeface="+mn-cs"/>
+              </a:defRPr>
+            </a:lvl1pPr>
+            <a:lvl2pPr marL="742950" indent="-285750" algn="l" defTabSz="914400" rtl="0" eaLnBrk="1" latinLnBrk="0" hangingPunct="1">
+              <a:spcBef>
+                <a:spcPct val="20000"/>
+              </a:spcBef>
+              <a:buFont typeface="Arial" pitchFamily="34" charset="0"/>
+              <a:buChar char="–"/>
+              <a:defRPr sz="2800" kern="1200">
+                <a:solidFill>
+                  <a:schemeClr val="tx1"/>
+                </a:solidFill>
+                <a:latin typeface="+mn-lt"/>
+                <a:ea typeface="+mn-ea"/>
+                <a:cs typeface="+mn-cs"/>
+              </a:defRPr>
+            </a:lvl2pPr>
+            <a:lvl3pPr marL="1143000" indent="-228600" algn="l" defTabSz="914400" rtl="0" eaLnBrk="1" latinLnBrk="0" hangingPunct="1">
+              <a:spcBef>
+                <a:spcPct val="20000"/>
+              </a:spcBef>
+              <a:buFont typeface="Arial" pitchFamily="34" charset="0"/>
+              <a:buChar char="•"/>
+              <a:defRPr sz="2400" kern="1200">
+                <a:solidFill>
+                  <a:schemeClr val="tx1"/>
+                </a:solidFill>
+                <a:latin typeface="+mn-lt"/>
+                <a:ea typeface="+mn-ea"/>
+                <a:cs typeface="+mn-cs"/>
+              </a:defRPr>
+            </a:lvl3pPr>
+            <a:lvl4pPr marL="1600200" indent="-228600" algn="l" defTabSz="914400" rtl="0" eaLnBrk="1" latinLnBrk="0" hangingPunct="1">
+              <a:spcBef>
+                <a:spcPct val="20000"/>
+              </a:spcBef>
+              <a:buFont typeface="Arial" pitchFamily="34" charset="0"/>
+              <a:buChar char="–"/>
+              <a:defRPr sz="2000" kern="1200">
+                <a:solidFill>
+                  <a:schemeClr val="tx1"/>
+                </a:solidFill>
+                <a:latin typeface="+mn-lt"/>
+                <a:ea typeface="+mn-ea"/>
+                <a:cs typeface="+mn-cs"/>
+              </a:defRPr>
+            </a:lvl4pPr>
+            <a:lvl5pPr marL="2057400" indent="-228600" algn="l" defTabSz="914400" rtl="0" eaLnBrk="1" latinLnBrk="0" hangingPunct="1">
+              <a:spcBef>
+                <a:spcPct val="20000"/>
+              </a:spcBef>
+              <a:buFont typeface="Arial" pitchFamily="34" charset="0"/>
+              <a:buChar char="»"/>
+              <a:defRPr sz="2000" kern="1200">
+                <a:solidFill>
+                  <a:schemeClr val="tx1"/>
+                </a:solidFill>
+                <a:latin typeface="+mn-lt"/>
+                <a:ea typeface="+mn-ea"/>
+                <a:cs typeface="+mn-cs"/>
+              </a:defRPr>
+            </a:lvl5pPr>
+            <a:lvl6pPr marL="2514600" indent="-228600" algn="l" defTabSz="914400" rtl="0" eaLnBrk="1" latinLnBrk="0" hangingPunct="1">
+              <a:spcBef>
+                <a:spcPct val="20000"/>
+              </a:spcBef>
+              <a:buFont typeface="Arial" pitchFamily="34" charset="0"/>
+              <a:buChar char="•"/>
+              <a:defRPr sz="2000" kern="1200">
+                <a:solidFill>
+                  <a:schemeClr val="tx1"/>
+                </a:solidFill>
+                <a:latin typeface="+mn-lt"/>
+                <a:ea typeface="+mn-ea"/>
+                <a:cs typeface="+mn-cs"/>
+              </a:defRPr>
+            </a:lvl6pPr>
+            <a:lvl7pPr marL="2971800" indent="-228600" algn="l" defTabSz="914400" rtl="0" eaLnBrk="1" latinLnBrk="0" hangingPunct="1">
+              <a:spcBef>
+                <a:spcPct val="20000"/>
+              </a:spcBef>
+              <a:buFont typeface="Arial" pitchFamily="34" charset="0"/>
+              <a:buChar char="•"/>
+              <a:defRPr sz="2000" kern="1200">
+                <a:solidFill>
+                  <a:schemeClr val="tx1"/>
+                </a:solidFill>
+                <a:latin typeface="+mn-lt"/>
+                <a:ea typeface="+mn-ea"/>
+                <a:cs typeface="+mn-cs"/>
+              </a:defRPr>
+            </a:lvl7pPr>
+            <a:lvl8pPr marL="3429000" indent="-228600" algn="l" defTabSz="914400" rtl="0" eaLnBrk="1" latinLnBrk="0" hangingPunct="1">
+              <a:spcBef>
+                <a:spcPct val="20000"/>
+              </a:spcBef>
+              <a:buFont typeface="Arial" pitchFamily="34" charset="0"/>
+              <a:buChar char="•"/>
+              <a:defRPr sz="2000" kern="1200">
+                <a:solidFill>
+                  <a:schemeClr val="tx1"/>
+                </a:solidFill>
+                <a:latin typeface="+mn-lt"/>
+                <a:ea typeface="+mn-ea"/>
+                <a:cs typeface="+mn-cs"/>
+              </a:defRPr>
+            </a:lvl8pPr>
+            <a:lvl9pPr marL="3886200" indent="-228600" algn="l" defTabSz="914400" rtl="0" eaLnBrk="1" latinLnBrk="0" hangingPunct="1">
+              <a:spcBef>
+                <a:spcPct val="20000"/>
+              </a:spcBef>
+              <a:buFont typeface="Arial" pitchFamily="34" charset="0"/>
+              <a:buChar char="•"/>
+              <a:defRPr sz="2000" kern="1200">
+                <a:solidFill>
+                  <a:schemeClr val="tx1"/>
+                </a:solidFill>
+                <a:latin typeface="+mn-lt"/>
+                <a:ea typeface="+mn-ea"/>
+                <a:cs typeface="+mn-cs"/>
+              </a:defRPr>
+            </a:lvl9pPr>
+          </a:lstStyle>
+          <a:p>
+            <a:endParaRPr lang="en-US" smtClean="0">
+              <a:latin typeface="Gill Sans MT" pitchFamily="34" charset="0"/>
+            </a:endParaRPr>
+          </a:p>
+          <a:p>
+            <a:r>
+              <a:rPr lang="en-US" smtClean="0">
                 <a:latin typeface="Gill Sans MT" pitchFamily="34" charset="0"/>
               </a:rPr>
-              <a:t>esign </a:t>
-            </a:r>
-            <a:r>
-              <a:rPr lang="en-US" dirty="0">
+              <a:t>Model</a:t>
+            </a:r>
+          </a:p>
+          <a:p>
+            <a:r>
+              <a:rPr lang="en-US" smtClean="0">
                 <a:latin typeface="Gill Sans MT" pitchFamily="34" charset="0"/>
               </a:rPr>
-              <a:t>D</a:t>
-            </a:r>
-            <a:r>
-              <a:rPr lang="en-US" dirty="0" smtClean="0">
+              <a:t>View</a:t>
+            </a:r>
+          </a:p>
+          <a:p>
+            <a:r>
+              <a:rPr lang="en-US" smtClean="0">
                 <a:latin typeface="Gill Sans MT" pitchFamily="34" charset="0"/>
               </a:rPr>
-              <a:t>ecisions</a:t>
-            </a:r>
-            <a:endParaRPr lang="en-US" dirty="0">
-              <a:latin typeface="Gill Sans MT" pitchFamily="34" charset="0"/>
-            </a:endParaRPr>
-          </a:p>
-        </p:txBody>
-      </p:sp>
-      <p:sp>
-        <p:nvSpPr>
-          <p:cNvPr id="3" name="Content Placeholder 2"/>
-          <p:cNvSpPr>
-            <a:spLocks noGrp="1"/>
-          </p:cNvSpPr>
-          <p:nvPr>
-            <p:ph idx="1"/>
-          </p:nvPr>
-        </p:nvSpPr>
-        <p:spPr>
-          <a:xfrm>
-            <a:off x="457200" y="1600200"/>
-            <a:ext cx="8229600" cy="5181600"/>
-          </a:xfrm>
-        </p:spPr>
-        <p:txBody>
-          <a:bodyPr>
-            <a:normAutofit lnSpcReduction="10000"/>
-          </a:bodyPr>
-          <a:lstStyle/>
-          <a:p>
-            <a:r>
-              <a:rPr lang="en-US" dirty="0" smtClean="0">
+              <a:t>Controller</a:t>
+            </a:r>
+          </a:p>
+          <a:p>
+            <a:r>
+              <a:rPr lang="en-US" smtClean="0">
                 <a:latin typeface="Gill Sans MT" pitchFamily="34" charset="0"/>
               </a:rPr>
-              <a:t>Simple and minimalistic</a:t>
-            </a:r>
-          </a:p>
-          <a:p>
-            <a:r>
-              <a:rPr lang="en-US" dirty="0" smtClean="0">
-                <a:latin typeface="Gill Sans MT" pitchFamily="34" charset="0"/>
-              </a:rPr>
-              <a:t>We aim to unclutter the information shown</a:t>
-            </a:r>
-          </a:p>
-          <a:p>
-            <a:pPr lvl="1"/>
-            <a:r>
-              <a:rPr lang="en-US" dirty="0" smtClean="0">
-                <a:latin typeface="Gill Sans MT" pitchFamily="34" charset="0"/>
-              </a:rPr>
-              <a:t>By hiding data entry inside menus &amp; dialogs</a:t>
-            </a:r>
-          </a:p>
-          <a:p>
-            <a:pPr lvl="1"/>
-            <a:r>
-              <a:rPr lang="en-US" dirty="0" smtClean="0">
-                <a:latin typeface="Gill Sans MT" pitchFamily="34" charset="0"/>
-              </a:rPr>
-              <a:t>By </a:t>
-            </a:r>
-            <a:r>
-              <a:rPr lang="en-US" dirty="0" err="1" smtClean="0">
-                <a:latin typeface="Gill Sans MT" pitchFamily="34" charset="0"/>
-              </a:rPr>
-              <a:t>organising</a:t>
-            </a:r>
-            <a:r>
-              <a:rPr lang="en-US" dirty="0" smtClean="0">
-                <a:latin typeface="Gill Sans MT" pitchFamily="34" charset="0"/>
-              </a:rPr>
-              <a:t> the main view to show information</a:t>
-            </a:r>
-          </a:p>
-          <a:p>
-            <a:r>
-              <a:rPr lang="en-US" dirty="0" smtClean="0">
-                <a:latin typeface="Gill Sans MT" pitchFamily="34" charset="0"/>
-              </a:rPr>
-              <a:t>We aim to provide flexibility and utility</a:t>
-            </a:r>
-          </a:p>
-          <a:p>
-            <a:pPr lvl="1"/>
-            <a:r>
-              <a:rPr lang="en-US" dirty="0" smtClean="0">
-                <a:latin typeface="Gill Sans MT" pitchFamily="34" charset="0"/>
-              </a:rPr>
-              <a:t>Zoom, panning and scale </a:t>
-            </a:r>
-          </a:p>
-          <a:p>
-            <a:pPr lvl="1"/>
-            <a:r>
-              <a:rPr lang="en-US" dirty="0" smtClean="0">
-                <a:latin typeface="Gill Sans MT" pitchFamily="34" charset="0"/>
-              </a:rPr>
-              <a:t>Advanced runway parameters</a:t>
-            </a:r>
-          </a:p>
-          <a:p>
-            <a:pPr lvl="1"/>
-            <a:r>
-              <a:rPr lang="en-US" dirty="0" smtClean="0">
-                <a:latin typeface="Gill Sans MT" pitchFamily="34" charset="0"/>
-              </a:rPr>
-              <a:t>XML address books</a:t>
-            </a:r>
-          </a:p>
-          <a:p>
-            <a:pPr lvl="1"/>
-            <a:r>
-              <a:rPr lang="en-US" dirty="0" smtClean="0">
-                <a:latin typeface="Gill Sans MT" pitchFamily="34" charset="0"/>
-              </a:rPr>
-              <a:t>Open recent</a:t>
-            </a:r>
-          </a:p>
-          <a:p>
-            <a:pPr lvl="1"/>
-            <a:r>
-              <a:rPr lang="en-US" dirty="0" smtClean="0">
-                <a:latin typeface="Gill Sans MT" pitchFamily="34" charset="0"/>
-              </a:rPr>
-              <a:t>HTML user manual</a:t>
-            </a:r>
-          </a:p>
-          <a:p>
-            <a:pPr lvl="1"/>
-            <a:endParaRPr lang="en-US" dirty="0" smtClean="0">
-              <a:latin typeface="Gill Sans MT" pitchFamily="34" charset="0"/>
-            </a:endParaRPr>
-          </a:p>
-          <a:p>
-            <a:pPr lvl="1"/>
-            <a:endParaRPr lang="en-US" dirty="0">
+              <a:t>Observer Pattern</a:t>
+            </a:r>
+            <a:endParaRPr lang="en-US">
               <a:latin typeface="Gill Sans MT" pitchFamily="34" charset="0"/>
             </a:endParaRPr>
           </a:p>

</xml_diff>

<commit_message>
* Font tweaks to Slides.pptx
</commit_message>
<xml_diff>
--- a/doc/Final Presentation/Slides.pptx
+++ b/doc/Final Presentation/Slides.pptx
@@ -3128,16 +3128,30 @@
         </p:nvSpPr>
         <p:spPr/>
         <p:txBody>
-          <a:bodyPr/>
-          <a:lstStyle/>
-          <a:p>
-            <a:r>
-              <a:rPr lang="en-US" dirty="0" smtClean="0">
+          <a:bodyPr>
+            <a:normAutofit/>
+          </a:bodyPr>
+          <a:lstStyle/>
+          <a:p>
+            <a:r>
+              <a:rPr lang="en-US" sz="7200" dirty="0" smtClean="0">
+                <a:solidFill>
+                  <a:schemeClr val="accent3">
+                    <a:lumMod val="40000"/>
+                    <a:lumOff val="60000"/>
+                  </a:schemeClr>
+                </a:solidFill>
                 <a:latin typeface="Gill Sans MT" pitchFamily="34" charset="0"/>
               </a:rPr>
               <a:t>D5 – Presentation</a:t>
             </a:r>
-            <a:endParaRPr lang="en-US" dirty="0">
+            <a:endParaRPr lang="en-US" sz="7200" dirty="0">
+              <a:solidFill>
+                <a:schemeClr val="accent3">
+                  <a:lumMod val="40000"/>
+                  <a:lumOff val="60000"/>
+                </a:schemeClr>
+              </a:solidFill>
               <a:latin typeface="Gill Sans MT" pitchFamily="34" charset="0"/>
             </a:endParaRPr>
           </a:p>
@@ -3153,13 +3167,26 @@
             <p:ph type="subTitle" idx="1"/>
           </p:nvPr>
         </p:nvSpPr>
-        <p:spPr/>
-        <p:txBody>
-          <a:bodyPr/>
-          <a:lstStyle/>
-          <a:p>
-            <a:r>
-              <a:rPr lang="en-US" dirty="0" smtClean="0">
+        <p:spPr>
+          <a:xfrm>
+            <a:off x="1981200" y="3886200"/>
+            <a:ext cx="5334000" cy="1752600"/>
+          </a:xfrm>
+        </p:spPr>
+        <p:txBody>
+          <a:bodyPr>
+            <a:noAutofit/>
+          </a:bodyPr>
+          <a:lstStyle/>
+          <a:p>
+            <a:r>
+              <a:rPr lang="en-US" sz="3600" dirty="0" smtClean="0">
+                <a:solidFill>
+                  <a:schemeClr val="accent3">
+                    <a:lumMod val="20000"/>
+                    <a:lumOff val="80000"/>
+                  </a:schemeClr>
+                </a:solidFill>
                 <a:latin typeface="Gill Sans MT" pitchFamily="34" charset="0"/>
               </a:rPr>
               <a:t>Group 9</a:t>
@@ -3167,14 +3194,47 @@
           </a:p>
           <a:p>
             <a:r>
-              <a:rPr lang="en-US" dirty="0" smtClean="0">
+              <a:rPr lang="en-US" sz="3600" dirty="0" smtClean="0">
+                <a:solidFill>
+                  <a:schemeClr val="accent3">
+                    <a:lumMod val="20000"/>
+                    <a:lumOff val="80000"/>
+                  </a:schemeClr>
+                </a:solidFill>
                 <a:latin typeface="Gill Sans MT" pitchFamily="34" charset="0"/>
               </a:rPr>
-              <a:t>Brian, Edward, Oscar, Kristian, Kelvin</a:t>
-            </a:r>
-          </a:p>
-          <a:p>
-            <a:endParaRPr lang="en-US" dirty="0">
+              <a:t>Brian, Edward, Oscar, </a:t>
+            </a:r>
+            <a:r>
+              <a:rPr lang="en-US" sz="3600" dirty="0" smtClean="0">
+                <a:solidFill>
+                  <a:schemeClr val="accent3">
+                    <a:lumMod val="20000"/>
+                    <a:lumOff val="80000"/>
+                  </a:schemeClr>
+                </a:solidFill>
+                <a:latin typeface="Gill Sans MT" pitchFamily="34" charset="0"/>
+              </a:rPr>
+              <a:t>Kristian &amp; Kelvin</a:t>
+            </a:r>
+            <a:endParaRPr lang="en-US" sz="3600" dirty="0" smtClean="0">
+              <a:solidFill>
+                <a:schemeClr val="accent3">
+                  <a:lumMod val="20000"/>
+                  <a:lumOff val="80000"/>
+                </a:schemeClr>
+              </a:solidFill>
+              <a:latin typeface="Gill Sans MT" pitchFamily="34" charset="0"/>
+            </a:endParaRPr>
+          </a:p>
+          <a:p>
+            <a:endParaRPr lang="en-US" sz="3600" dirty="0">
+              <a:solidFill>
+                <a:schemeClr val="accent3">
+                  <a:lumMod val="20000"/>
+                  <a:lumOff val="80000"/>
+                </a:schemeClr>
+              </a:solidFill>
               <a:latin typeface="Gill Sans MT" pitchFamily="34" charset="0"/>
             </a:endParaRPr>
           </a:p>
@@ -3239,12 +3299,24 @@
           <a:p>
             <a:fld id="{A5B05C2E-49A5-42E3-A048-7BA5121127BA}" type="slidenum">
               <a:rPr lang="en-US">
+                <a:solidFill>
+                  <a:schemeClr val="accent3">
+                    <a:lumMod val="20000"/>
+                    <a:lumOff val="80000"/>
+                  </a:schemeClr>
+                </a:solidFill>
                 <a:latin typeface="Gill Sans MT" pitchFamily="34" charset="0"/>
               </a:rPr>
               <a:pPr/>
               <a:t>2</a:t>
             </a:fld>
             <a:endParaRPr lang="en-US">
+              <a:solidFill>
+                <a:schemeClr val="accent3">
+                  <a:lumMod val="20000"/>
+                  <a:lumOff val="80000"/>
+                </a:schemeClr>
+              </a:solidFill>
               <a:latin typeface="Gill Sans MT" pitchFamily="34" charset="0"/>
             </a:endParaRPr>
           </a:p>
@@ -3254,7 +3326,7 @@
         <p:nvSpPr>
           <p:cNvPr id="10" name="Rectangle 1"/>
           <p:cNvSpPr>
-            <a:spLocks noChangeArrowheads="1"/>
+            <a:spLocks noGrp="1" noChangeArrowheads="1"/>
           </p:cNvSpPr>
           <p:nvPr>
             <p:ph type="title"/>
@@ -3268,15 +3340,32 @@
           <a:ln/>
         </p:spPr>
         <p:txBody>
-          <a:bodyPr/>
-          <a:lstStyle/>
-          <a:p>
-            <a:r>
-              <a:rPr lang="en-US">
+          <a:bodyPr>
+            <a:normAutofit/>
+          </a:bodyPr>
+          <a:lstStyle/>
+          <a:p>
+            <a:r>
+              <a:rPr lang="en-US" sz="6600" dirty="0">
+                <a:solidFill>
+                  <a:schemeClr val="accent3">
+                    <a:lumMod val="40000"/>
+                    <a:lumOff val="60000"/>
+                  </a:schemeClr>
+                </a:solidFill>
                 <a:latin typeface="Gill Sans MT" pitchFamily="34" charset="0"/>
               </a:rPr>
               <a:t>Process</a:t>
             </a:r>
+            <a:endParaRPr lang="en-US" sz="4800" dirty="0">
+              <a:solidFill>
+                <a:schemeClr val="accent3">
+                  <a:lumMod val="40000"/>
+                  <a:lumOff val="60000"/>
+                </a:schemeClr>
+              </a:solidFill>
+              <a:latin typeface="Gill Sans MT" pitchFamily="34" charset="0"/>
+            </a:endParaRPr>
           </a:p>
         </p:txBody>
       </p:sp>
@@ -3440,13 +3529,25 @@
             </a:lvl9pPr>
           </a:lstStyle>
           <a:p>
-            <a:endParaRPr lang="en-US" smtClean="0">
+            <a:endParaRPr lang="en-US" sz="3600" dirty="0" smtClean="0">
+              <a:solidFill>
+                <a:schemeClr val="accent3">
+                  <a:lumMod val="20000"/>
+                  <a:lumOff val="80000"/>
+                </a:schemeClr>
+              </a:solidFill>
               <a:latin typeface="Gill Sans MT" pitchFamily="34" charset="0"/>
             </a:endParaRPr>
           </a:p>
           <a:p>
             <a:r>
-              <a:rPr lang="en-US" smtClean="0">
+              <a:rPr lang="en-US" sz="3600" dirty="0" smtClean="0">
+                <a:solidFill>
+                  <a:schemeClr val="accent3">
+                    <a:lumMod val="20000"/>
+                    <a:lumOff val="80000"/>
+                  </a:schemeClr>
+                </a:solidFill>
                 <a:latin typeface="Gill Sans MT" pitchFamily="34" charset="0"/>
               </a:rPr>
               <a:t>Task Breakdown</a:t>
@@ -3454,36 +3555,117 @@
           </a:p>
           <a:p>
             <a:r>
-              <a:rPr lang="en-US" smtClean="0">
+              <a:rPr lang="en-US" sz="3600" dirty="0" smtClean="0">
+                <a:solidFill>
+                  <a:schemeClr val="accent3">
+                    <a:lumMod val="20000"/>
+                    <a:lumOff val="80000"/>
+                  </a:schemeClr>
+                </a:solidFill>
                 <a:latin typeface="Gill Sans MT" pitchFamily="34" charset="0"/>
               </a:rPr>
-              <a:t>Task Allocation</a:t>
-            </a:r>
-          </a:p>
-          <a:p>
-            <a:r>
-              <a:rPr lang="en-US" smtClean="0">
+              <a:t>Task </a:t>
+            </a:r>
+            <a:r>
+              <a:rPr lang="en-US" sz="3600" dirty="0" smtClean="0">
+                <a:solidFill>
+                  <a:schemeClr val="accent3">
+                    <a:lumMod val="20000"/>
+                    <a:lumOff val="80000"/>
+                  </a:schemeClr>
+                </a:solidFill>
                 <a:latin typeface="Gill Sans MT" pitchFamily="34" charset="0"/>
               </a:rPr>
-              <a:t>Development Process</a:t>
-            </a:r>
-          </a:p>
-          <a:p>
-            <a:r>
-              <a:rPr lang="en-US" smtClean="0">
+              <a:t> Allocation</a:t>
+            </a:r>
+            <a:endParaRPr lang="en-US" sz="3600" dirty="0" smtClean="0">
+              <a:solidFill>
+                <a:schemeClr val="accent3">
+                  <a:lumMod val="20000"/>
+                  <a:lumOff val="80000"/>
+                </a:schemeClr>
+              </a:solidFill>
+              <a:latin typeface="Gill Sans MT" pitchFamily="34" charset="0"/>
+            </a:endParaRPr>
+          </a:p>
+          <a:p>
+            <a:r>
+              <a:rPr lang="en-US" sz="3600" dirty="0" smtClean="0">
+                <a:solidFill>
+                  <a:schemeClr val="accent3">
+                    <a:lumMod val="20000"/>
+                    <a:lumOff val="80000"/>
+                  </a:schemeClr>
+                </a:solidFill>
                 <a:latin typeface="Gill Sans MT" pitchFamily="34" charset="0"/>
               </a:rPr>
-              <a:t>Tools</a:t>
-            </a:r>
-          </a:p>
-          <a:p>
-            <a:r>
-              <a:rPr lang="en-US" smtClean="0">
+              <a:t>Development </a:t>
+            </a:r>
+            <a:r>
+              <a:rPr lang="en-US" sz="3600" dirty="0" smtClean="0">
+                <a:solidFill>
+                  <a:schemeClr val="accent3">
+                    <a:lumMod val="20000"/>
+                    <a:lumOff val="80000"/>
+                  </a:schemeClr>
+                </a:solidFill>
+                <a:latin typeface="Gill Sans MT" pitchFamily="34" charset="0"/>
+              </a:rPr>
+              <a:t>Process - Spiral</a:t>
+            </a:r>
+            <a:endParaRPr lang="en-US" sz="3600" dirty="0" smtClean="0">
+              <a:solidFill>
+                <a:schemeClr val="accent3">
+                  <a:lumMod val="20000"/>
+                  <a:lumOff val="80000"/>
+                </a:schemeClr>
+              </a:solidFill>
+              <a:latin typeface="Gill Sans MT" pitchFamily="34" charset="0"/>
+            </a:endParaRPr>
+          </a:p>
+          <a:p>
+            <a:r>
+              <a:rPr lang="en-US" sz="3600" dirty="0" smtClean="0">
+                <a:solidFill>
+                  <a:schemeClr val="accent3">
+                    <a:lumMod val="20000"/>
+                    <a:lumOff val="80000"/>
+                  </a:schemeClr>
+                </a:solidFill>
+                <a:latin typeface="Gill Sans MT" pitchFamily="34" charset="0"/>
+              </a:rPr>
+              <a:t>Tools - Eclipse, GWBP &amp; SVN</a:t>
+            </a:r>
+            <a:endParaRPr lang="en-US" sz="3600" dirty="0" smtClean="0">
+              <a:solidFill>
+                <a:schemeClr val="accent3">
+                  <a:lumMod val="20000"/>
+                  <a:lumOff val="80000"/>
+                </a:schemeClr>
+              </a:solidFill>
+              <a:latin typeface="Gill Sans MT" pitchFamily="34" charset="0"/>
+            </a:endParaRPr>
+          </a:p>
+          <a:p>
+            <a:r>
+              <a:rPr lang="en-US" sz="3600" dirty="0" smtClean="0">
+                <a:solidFill>
+                  <a:schemeClr val="accent3">
+                    <a:lumMod val="20000"/>
+                    <a:lumOff val="80000"/>
+                  </a:schemeClr>
+                </a:solidFill>
                 <a:latin typeface="Gill Sans MT" pitchFamily="34" charset="0"/>
               </a:rPr>
               <a:t>Meetings</a:t>
             </a:r>
-            <a:endParaRPr lang="en-US">
+            <a:endParaRPr lang="en-US" sz="3600" dirty="0">
+              <a:solidFill>
+                <a:schemeClr val="accent3">
+                  <a:lumMod val="20000"/>
+                  <a:lumOff val="80000"/>
+                </a:schemeClr>
+              </a:solidFill>
               <a:latin typeface="Gill Sans MT" pitchFamily="34" charset="0"/>
             </a:endParaRPr>
           </a:p>
@@ -3548,12 +3730,24 @@
           <a:p>
             <a:fld id="{0131F770-F55E-442C-9C7D-183437E6F59A}" type="slidenum">
               <a:rPr lang="en-US">
+                <a:solidFill>
+                  <a:schemeClr val="accent3">
+                    <a:lumMod val="20000"/>
+                    <a:lumOff val="80000"/>
+                  </a:schemeClr>
+                </a:solidFill>
                 <a:latin typeface="Gill Sans MT" pitchFamily="34" charset="0"/>
               </a:rPr>
               <a:pPr/>
               <a:t>3</a:t>
             </a:fld>
             <a:endParaRPr lang="en-US">
+              <a:solidFill>
+                <a:schemeClr val="accent3">
+                  <a:lumMod val="20000"/>
+                  <a:lumOff val="80000"/>
+                </a:schemeClr>
+              </a:solidFill>
               <a:latin typeface="Gill Sans MT" pitchFamily="34" charset="0"/>
             </a:endParaRPr>
           </a:p>
@@ -3563,7 +3757,7 @@
         <p:nvSpPr>
           <p:cNvPr id="7" name="Rectangle 1"/>
           <p:cNvSpPr>
-            <a:spLocks noChangeArrowheads="1"/>
+            <a:spLocks noGrp="1" noChangeArrowheads="1"/>
           </p:cNvSpPr>
           <p:nvPr>
             <p:ph type="title"/>
@@ -3581,11 +3775,26 @@
           <a:lstStyle/>
           <a:p>
             <a:r>
-              <a:rPr lang="en-US">
+              <a:rPr lang="en-US" sz="6600" dirty="0">
+                <a:solidFill>
+                  <a:schemeClr val="accent3">
+                    <a:lumMod val="40000"/>
+                    <a:lumOff val="60000"/>
+                  </a:schemeClr>
+                </a:solidFill>
                 <a:latin typeface="Gill Sans MT" pitchFamily="34" charset="0"/>
               </a:rPr>
               <a:t>Dynamics</a:t>
             </a:r>
+            <a:endParaRPr lang="en-US" dirty="0">
+              <a:solidFill>
+                <a:schemeClr val="accent3">
+                  <a:lumMod val="40000"/>
+                  <a:lumOff val="60000"/>
+                </a:schemeClr>
+              </a:solidFill>
+              <a:latin typeface="Gill Sans MT" pitchFamily="34" charset="0"/>
+            </a:endParaRPr>
           </a:p>
         </p:txBody>
       </p:sp>
@@ -3749,42 +3958,120 @@
             </a:lvl9pPr>
           </a:lstStyle>
           <a:p>
-            <a:endParaRPr lang="en-US" smtClean="0">
+            <a:endParaRPr lang="en-US" sz="3600" dirty="0" smtClean="0">
+              <a:solidFill>
+                <a:schemeClr val="accent3">
+                  <a:lumMod val="20000"/>
+                  <a:lumOff val="80000"/>
+                </a:schemeClr>
+              </a:solidFill>
               <a:latin typeface="Gill Sans MT" pitchFamily="34" charset="0"/>
             </a:endParaRPr>
           </a:p>
           <a:p>
             <a:r>
-              <a:rPr lang="en-US" smtClean="0">
+              <a:rPr lang="en-US" sz="3600" dirty="0" smtClean="0">
+                <a:solidFill>
+                  <a:schemeClr val="accent3">
+                    <a:lumMod val="20000"/>
+                    <a:lumOff val="80000"/>
+                  </a:schemeClr>
+                </a:solidFill>
                 <a:latin typeface="Gill Sans MT" pitchFamily="34" charset="0"/>
               </a:rPr>
-              <a:t>Formal Meetings</a:t>
-            </a:r>
-          </a:p>
-          <a:p>
-            <a:r>
-              <a:rPr lang="en-US" smtClean="0">
+              <a:t>Formal Meetings - Structured &amp; Regular</a:t>
+            </a:r>
+            <a:endParaRPr lang="en-US" sz="3600" dirty="0" smtClean="0">
+              <a:solidFill>
+                <a:schemeClr val="accent3">
+                  <a:lumMod val="20000"/>
+                  <a:lumOff val="80000"/>
+                </a:schemeClr>
+              </a:solidFill>
+              <a:latin typeface="Gill Sans MT" pitchFamily="34" charset="0"/>
+            </a:endParaRPr>
+          </a:p>
+          <a:p>
+            <a:r>
+              <a:rPr lang="en-US" sz="3600" dirty="0" smtClean="0">
+                <a:solidFill>
+                  <a:schemeClr val="accent3">
+                    <a:lumMod val="20000"/>
+                    <a:lumOff val="80000"/>
+                  </a:schemeClr>
+                </a:solidFill>
                 <a:latin typeface="Gill Sans MT" pitchFamily="34" charset="0"/>
               </a:rPr>
-              <a:t>Informal Meetings</a:t>
-            </a:r>
-          </a:p>
-          <a:p>
-            <a:r>
-              <a:rPr lang="en-US" smtClean="0">
+              <a:t>Informal </a:t>
+            </a:r>
+            <a:r>
+              <a:rPr lang="en-US" sz="3600" dirty="0" smtClean="0">
+                <a:solidFill>
+                  <a:schemeClr val="accent3">
+                    <a:lumMod val="20000"/>
+                    <a:lumOff val="80000"/>
+                  </a:schemeClr>
+                </a:solidFill>
                 <a:latin typeface="Gill Sans MT" pitchFamily="34" charset="0"/>
               </a:rPr>
-              <a:t>Facebook Group</a:t>
-            </a:r>
-          </a:p>
-          <a:p>
-            <a:r>
-              <a:rPr lang="en-US" smtClean="0">
+              <a:t>Meetings - Ad-hoc</a:t>
+            </a:r>
+            <a:endParaRPr lang="en-US" sz="3600" dirty="0" smtClean="0">
+              <a:solidFill>
+                <a:schemeClr val="accent3">
+                  <a:lumMod val="20000"/>
+                  <a:lumOff val="80000"/>
+                </a:schemeClr>
+              </a:solidFill>
+              <a:latin typeface="Gill Sans MT" pitchFamily="34" charset="0"/>
+            </a:endParaRPr>
+          </a:p>
+          <a:p>
+            <a:r>
+              <a:rPr lang="en-US" sz="3600" dirty="0" smtClean="0">
+                <a:solidFill>
+                  <a:schemeClr val="accent3">
+                    <a:lumMod val="20000"/>
+                    <a:lumOff val="80000"/>
+                  </a:schemeClr>
+                </a:solidFill>
                 <a:latin typeface="Gill Sans MT" pitchFamily="34" charset="0"/>
               </a:rPr>
               <a:t>Pair Programming</a:t>
             </a:r>
-            <a:endParaRPr lang="en-US">
+          </a:p>
+          <a:p>
+            <a:r>
+              <a:rPr lang="en-US" sz="3600" dirty="0">
+                <a:solidFill>
+                  <a:schemeClr val="accent3">
+                    <a:lumMod val="20000"/>
+                    <a:lumOff val="80000"/>
+                  </a:schemeClr>
+                </a:solidFill>
+                <a:latin typeface="Gill Sans MT" pitchFamily="34" charset="0"/>
+              </a:rPr>
+              <a:t>Facebook </a:t>
+            </a:r>
+            <a:r>
+              <a:rPr lang="en-US" sz="3600" dirty="0" smtClean="0">
+                <a:solidFill>
+                  <a:schemeClr val="accent3">
+                    <a:lumMod val="20000"/>
+                    <a:lumOff val="80000"/>
+                  </a:schemeClr>
+                </a:solidFill>
+                <a:latin typeface="Gill Sans MT" pitchFamily="34" charset="0"/>
+              </a:rPr>
+              <a:t>Group</a:t>
+            </a:r>
+            <a:endParaRPr lang="en-US" sz="3600" dirty="0">
+              <a:solidFill>
+                <a:schemeClr val="accent3">
+                  <a:lumMod val="20000"/>
+                  <a:lumOff val="80000"/>
+                </a:schemeClr>
+              </a:solidFill>
               <a:latin typeface="Gill Sans MT" pitchFamily="34" charset="0"/>
             </a:endParaRPr>
           </a:p>
@@ -3800,6 +4087,13 @@
   <p:clrMapOvr>
     <a:masterClrMapping/>
   </p:clrMapOvr>
+  <p:timing>
+    <p:tnLst>
+      <p:par>
+        <p:cTn id="1" dur="indefinite" restart="never" nodeType="tmRoot"/>
+      </p:par>
+    </p:tnLst>
+  </p:timing>
 </p:sld>
 </file>
 
@@ -3857,7 +4151,7 @@
         <p:nvSpPr>
           <p:cNvPr id="7" name="Rectangle 1"/>
           <p:cNvSpPr>
-            <a:spLocks noChangeArrowheads="1"/>
+            <a:spLocks noGrp="1" noChangeArrowheads="1"/>
           </p:cNvSpPr>
           <p:nvPr>
             <p:ph type="title"/>
@@ -3875,11 +4169,26 @@
           <a:lstStyle/>
           <a:p>
             <a:r>
-              <a:rPr lang="en-US">
+              <a:rPr lang="en-US" sz="6600" dirty="0">
+                <a:solidFill>
+                  <a:schemeClr val="accent3">
+                    <a:lumMod val="40000"/>
+                    <a:lumOff val="60000"/>
+                  </a:schemeClr>
+                </a:solidFill>
                 <a:latin typeface="Gill Sans MT" pitchFamily="34" charset="0"/>
               </a:rPr>
               <a:t>Design</a:t>
             </a:r>
+            <a:endParaRPr lang="en-US" dirty="0">
+              <a:solidFill>
+                <a:schemeClr val="accent3">
+                  <a:lumMod val="40000"/>
+                  <a:lumOff val="60000"/>
+                </a:schemeClr>
+              </a:solidFill>
+              <a:latin typeface="Gill Sans MT" pitchFamily="34" charset="0"/>
+            </a:endParaRPr>
           </a:p>
         </p:txBody>
       </p:sp>
@@ -4043,43 +4352,145 @@
             </a:lvl9pPr>
           </a:lstStyle>
           <a:p>
-            <a:endParaRPr lang="en-US" smtClean="0">
+            <a:endParaRPr lang="en-US" sz="3600" dirty="0" smtClean="0">
+              <a:solidFill>
+                <a:schemeClr val="accent3">
+                  <a:lumMod val="20000"/>
+                  <a:lumOff val="80000"/>
+                </a:schemeClr>
+              </a:solidFill>
               <a:latin typeface="Gill Sans MT" pitchFamily="34" charset="0"/>
             </a:endParaRPr>
           </a:p>
           <a:p>
             <a:r>
-              <a:rPr lang="en-US" smtClean="0">
+              <a:rPr lang="en-US" sz="3600" dirty="0" smtClean="0">
+                <a:solidFill>
+                  <a:schemeClr val="accent3">
+                    <a:lumMod val="20000"/>
+                    <a:lumOff val="80000"/>
+                  </a:schemeClr>
+                </a:solidFill>
                 <a:latin typeface="Gill Sans MT" pitchFamily="34" charset="0"/>
               </a:rPr>
-              <a:t>Model</a:t>
-            </a:r>
-          </a:p>
-          <a:p>
-            <a:r>
-              <a:rPr lang="en-US" smtClean="0">
+              <a:t>Model - Nouns</a:t>
+            </a:r>
+            <a:endParaRPr lang="en-US" sz="3600" dirty="0" smtClean="0">
+              <a:solidFill>
+                <a:schemeClr val="accent3">
+                  <a:lumMod val="20000"/>
+                  <a:lumOff val="80000"/>
+                </a:schemeClr>
+              </a:solidFill>
+              <a:latin typeface="Gill Sans MT" pitchFamily="34" charset="0"/>
+            </a:endParaRPr>
+          </a:p>
+          <a:p>
+            <a:r>
+              <a:rPr lang="en-US" sz="3600" dirty="0" smtClean="0">
+                <a:solidFill>
+                  <a:schemeClr val="accent3">
+                    <a:lumMod val="20000"/>
+                    <a:lumOff val="80000"/>
+                  </a:schemeClr>
+                </a:solidFill>
                 <a:latin typeface="Gill Sans MT" pitchFamily="34" charset="0"/>
               </a:rPr>
-              <a:t>View</a:t>
-            </a:r>
-          </a:p>
-          <a:p>
-            <a:r>
-              <a:rPr lang="en-US" smtClean="0">
+              <a:t>View - Swing &amp; Graphics2D</a:t>
+            </a:r>
+            <a:endParaRPr lang="en-US" sz="3600" dirty="0" smtClean="0">
+              <a:solidFill>
+                <a:schemeClr val="accent3">
+                  <a:lumMod val="20000"/>
+                  <a:lumOff val="80000"/>
+                </a:schemeClr>
+              </a:solidFill>
+              <a:latin typeface="Gill Sans MT" pitchFamily="34" charset="0"/>
+            </a:endParaRPr>
+          </a:p>
+          <a:p>
+            <a:r>
+              <a:rPr lang="en-US" sz="3600" dirty="0" smtClean="0">
+                <a:solidFill>
+                  <a:schemeClr val="accent3">
+                    <a:lumMod val="20000"/>
+                    <a:lumOff val="80000"/>
+                  </a:schemeClr>
+                </a:solidFill>
                 <a:latin typeface="Gill Sans MT" pitchFamily="34" charset="0"/>
               </a:rPr>
-              <a:t>Controller</a:t>
-            </a:r>
-          </a:p>
-          <a:p>
-            <a:r>
-              <a:rPr lang="en-US" smtClean="0">
+              <a:t>Controller - Listeners</a:t>
+            </a:r>
+            <a:endParaRPr lang="en-US" sz="3600" dirty="0" smtClean="0">
+              <a:solidFill>
+                <a:schemeClr val="accent3">
+                  <a:lumMod val="20000"/>
+                  <a:lumOff val="80000"/>
+                </a:schemeClr>
+              </a:solidFill>
+              <a:latin typeface="Gill Sans MT" pitchFamily="34" charset="0"/>
+            </a:endParaRPr>
+          </a:p>
+          <a:p>
+            <a:r>
+              <a:rPr lang="en-US" sz="3600" dirty="0" smtClean="0">
+                <a:solidFill>
+                  <a:schemeClr val="accent3">
+                    <a:lumMod val="20000"/>
+                    <a:lumOff val="80000"/>
+                  </a:schemeClr>
+                </a:solidFill>
                 <a:latin typeface="Gill Sans MT" pitchFamily="34" charset="0"/>
               </a:rPr>
-              <a:t>Observer Pattern</a:t>
-            </a:r>
-            <a:endParaRPr lang="en-US">
+              <a:t>Observer </a:t>
+            </a:r>
+            <a:r>
+              <a:rPr lang="en-US" sz="3600" dirty="0" smtClean="0">
+                <a:solidFill>
+                  <a:schemeClr val="accent3">
+                    <a:lumMod val="20000"/>
+                    <a:lumOff val="80000"/>
+                  </a:schemeClr>
+                </a:solidFill>
+                <a:latin typeface="Gill Sans MT" pitchFamily="34" charset="0"/>
+              </a:rPr>
+              <a:t>Pattern - </a:t>
+            </a:r>
+            <a:r>
+              <a:rPr lang="en-US" sz="3600" dirty="0" err="1" smtClean="0">
+                <a:solidFill>
+                  <a:schemeClr val="accent3">
+                    <a:lumMod val="20000"/>
+                    <a:lumOff val="80000"/>
+                  </a:schemeClr>
+                </a:solidFill>
+                <a:latin typeface="Consolas" pitchFamily="49" charset="0"/>
+                <a:cs typeface="Consolas" pitchFamily="49" charset="0"/>
+              </a:rPr>
+              <a:t>AirportObserver</a:t>
+            </a:r>
+            <a:r>
+              <a:rPr lang="en-US" sz="3600" dirty="0" err="1" smtClean="0">
+                <a:solidFill>
+                  <a:schemeClr val="accent3">
+                    <a:lumMod val="20000"/>
+                    <a:lumOff val="80000"/>
+                  </a:schemeClr>
+                </a:solidFill>
+                <a:latin typeface="Gill Sans MT" pitchFamily="34" charset="0"/>
+                <a:cs typeface="Consolas" pitchFamily="49" charset="0"/>
+              </a:rPr>
+              <a:t>s</a:t>
+            </a:r>
+            <a:endParaRPr lang="en-US" sz="3600" dirty="0">
+              <a:solidFill>
+                <a:schemeClr val="accent3">
+                  <a:lumMod val="20000"/>
+                  <a:lumOff val="80000"/>
+                </a:schemeClr>
+              </a:solidFill>
               <a:latin typeface="Gill Sans MT" pitchFamily="34" charset="0"/>
+              <a:cs typeface="Consolas" pitchFamily="49" charset="0"/>
             </a:endParaRPr>
           </a:p>
         </p:txBody>

</xml_diff>